<commit_message>
added exercise for EM and padding details
</commit_message>
<xml_diff>
--- a/figures/resources/filter_neighbourhood.pptx
+++ b/figures/resources/filter_neighbourhood.pptx
@@ -266,7 +266,7 @@
           <a:p>
             <a:fld id="{137E0969-D8B9-1B40-A5E3-40294251B92B}" type="datetimeFigureOut">
               <a:rPr lang="de-DE" smtClean="0"/>
-              <a:t>26.01.21</a:t>
+              <a:t>03.03.2022</a:t>
             </a:fld>
             <a:endParaRPr lang="de-DE"/>
           </a:p>
@@ -466,7 +466,7 @@
           <a:p>
             <a:fld id="{137E0969-D8B9-1B40-A5E3-40294251B92B}" type="datetimeFigureOut">
               <a:rPr lang="de-DE" smtClean="0"/>
-              <a:t>26.01.21</a:t>
+              <a:t>03.03.2022</a:t>
             </a:fld>
             <a:endParaRPr lang="de-DE"/>
           </a:p>
@@ -676,7 +676,7 @@
           <a:p>
             <a:fld id="{137E0969-D8B9-1B40-A5E3-40294251B92B}" type="datetimeFigureOut">
               <a:rPr lang="de-DE" smtClean="0"/>
-              <a:t>26.01.21</a:t>
+              <a:t>03.03.2022</a:t>
             </a:fld>
             <a:endParaRPr lang="de-DE"/>
           </a:p>
@@ -876,7 +876,7 @@
           <a:p>
             <a:fld id="{137E0969-D8B9-1B40-A5E3-40294251B92B}" type="datetimeFigureOut">
               <a:rPr lang="de-DE" smtClean="0"/>
-              <a:t>26.01.21</a:t>
+              <a:t>03.03.2022</a:t>
             </a:fld>
             <a:endParaRPr lang="de-DE"/>
           </a:p>
@@ -1152,7 +1152,7 @@
           <a:p>
             <a:fld id="{137E0969-D8B9-1B40-A5E3-40294251B92B}" type="datetimeFigureOut">
               <a:rPr lang="de-DE" smtClean="0"/>
-              <a:t>26.01.21</a:t>
+              <a:t>03.03.2022</a:t>
             </a:fld>
             <a:endParaRPr lang="de-DE"/>
           </a:p>
@@ -1420,7 +1420,7 @@
           <a:p>
             <a:fld id="{137E0969-D8B9-1B40-A5E3-40294251B92B}" type="datetimeFigureOut">
               <a:rPr lang="de-DE" smtClean="0"/>
-              <a:t>26.01.21</a:t>
+              <a:t>03.03.2022</a:t>
             </a:fld>
             <a:endParaRPr lang="de-DE"/>
           </a:p>
@@ -1835,7 +1835,7 @@
           <a:p>
             <a:fld id="{137E0969-D8B9-1B40-A5E3-40294251B92B}" type="datetimeFigureOut">
               <a:rPr lang="de-DE" smtClean="0"/>
-              <a:t>26.01.21</a:t>
+              <a:t>03.03.2022</a:t>
             </a:fld>
             <a:endParaRPr lang="de-DE"/>
           </a:p>
@@ -1977,7 +1977,7 @@
           <a:p>
             <a:fld id="{137E0969-D8B9-1B40-A5E3-40294251B92B}" type="datetimeFigureOut">
               <a:rPr lang="de-DE" smtClean="0"/>
-              <a:t>26.01.21</a:t>
+              <a:t>03.03.2022</a:t>
             </a:fld>
             <a:endParaRPr lang="de-DE"/>
           </a:p>
@@ -2090,7 +2090,7 @@
           <a:p>
             <a:fld id="{137E0969-D8B9-1B40-A5E3-40294251B92B}" type="datetimeFigureOut">
               <a:rPr lang="de-DE" smtClean="0"/>
-              <a:t>26.01.21</a:t>
+              <a:t>03.03.2022</a:t>
             </a:fld>
             <a:endParaRPr lang="de-DE"/>
           </a:p>
@@ -2403,7 +2403,7 @@
           <a:p>
             <a:fld id="{137E0969-D8B9-1B40-A5E3-40294251B92B}" type="datetimeFigureOut">
               <a:rPr lang="de-DE" smtClean="0"/>
-              <a:t>26.01.21</a:t>
+              <a:t>03.03.2022</a:t>
             </a:fld>
             <a:endParaRPr lang="de-DE"/>
           </a:p>
@@ -2692,7 +2692,7 @@
           <a:p>
             <a:fld id="{137E0969-D8B9-1B40-A5E3-40294251B92B}" type="datetimeFigureOut">
               <a:rPr lang="de-DE" smtClean="0"/>
-              <a:t>26.01.21</a:t>
+              <a:t>03.03.2022</a:t>
             </a:fld>
             <a:endParaRPr lang="de-DE"/>
           </a:p>
@@ -2935,7 +2935,7 @@
           <a:p>
             <a:fld id="{137E0969-D8B9-1B40-A5E3-40294251B92B}" type="datetimeFigureOut">
               <a:rPr lang="de-DE" smtClean="0"/>
-              <a:t>26.01.21</a:t>
+              <a:t>03.03.2022</a:t>
             </a:fld>
             <a:endParaRPr lang="de-DE"/>
           </a:p>
@@ -3563,7 +3563,7 @@
         <p:spPr bwMode="auto">
           <a:xfrm>
             <a:off x="600075" y="2524292"/>
-            <a:ext cx="4356100" cy="2019300"/>
+            <a:ext cx="1842558" cy="854130"/>
           </a:xfrm>
           <a:prstGeom prst="rect">
             <a:avLst/>
@@ -3765,159 +3765,3429 @@
           </p:cNvPicPr>
           <p:nvPr/>
         </p:nvPicPr>
-        <p:blipFill>
+        <p:blipFill rotWithShape="1">
           <a:blip r:embed="rId2"/>
-          <a:stretch>
-            <a:fillRect/>
-          </a:stretch>
+          <a:srcRect l="28525" t="30807" r="34254" b="28979"/>
+          <a:stretch/>
         </p:blipFill>
         <p:spPr>
           <a:xfrm>
-            <a:off x="1528011" y="342781"/>
-            <a:ext cx="2823411" cy="2952869"/>
+            <a:off x="1777999" y="1190625"/>
+            <a:ext cx="1092202" cy="1187448"/>
           </a:xfrm>
           <a:prstGeom prst="rect">
             <a:avLst/>
           </a:prstGeom>
+          <a:gradFill>
+            <a:gsLst>
+              <a:gs pos="0">
+                <a:schemeClr val="accent1">
+                  <a:lumMod val="5000"/>
+                  <a:lumOff val="95000"/>
+                </a:schemeClr>
+              </a:gs>
+              <a:gs pos="74000">
+                <a:schemeClr val="accent1">
+                  <a:lumMod val="45000"/>
+                  <a:lumOff val="55000"/>
+                </a:schemeClr>
+              </a:gs>
+              <a:gs pos="83000">
+                <a:schemeClr val="accent1">
+                  <a:lumMod val="45000"/>
+                  <a:lumOff val="55000"/>
+                </a:schemeClr>
+              </a:gs>
+              <a:gs pos="100000">
+                <a:schemeClr val="accent1">
+                  <a:lumMod val="30000"/>
+                  <a:lumOff val="70000"/>
+                </a:schemeClr>
+              </a:gs>
+            </a:gsLst>
+            <a:lin ang="5400000" scaled="1"/>
+          </a:gradFill>
         </p:spPr>
       </p:pic>
-      <p:pic>
-        <p:nvPicPr>
-          <p:cNvPr id="5" name="Picture 4">
-            <a:extLst>
-              <a:ext uri="{FF2B5EF4-FFF2-40B4-BE49-F238E27FC236}">
-                <a16:creationId xmlns:a16="http://schemas.microsoft.com/office/drawing/2014/main" id="{658CE385-04F7-4541-A4C6-9DF4D0C4DB04}"/>
-              </a:ext>
-            </a:extLst>
-          </p:cNvPr>
-          <p:cNvPicPr>
-            <a:picLocks noChangeAspect="1"/>
-          </p:cNvPicPr>
+      <p:graphicFrame>
+        <p:nvGraphicFramePr>
+          <p:cNvPr id="9" name="Table 8">
+            <a:extLst>
+              <a:ext uri="{FF2B5EF4-FFF2-40B4-BE49-F238E27FC236}">
+                <a16:creationId xmlns:a16="http://schemas.microsoft.com/office/drawing/2014/main" id="{A7C80C6B-20CC-485C-92A1-96B0991B85B9}"/>
+              </a:ext>
+            </a:extLst>
+          </p:cNvPr>
+          <p:cNvGraphicFramePr>
+            <a:graphicFrameLocks noGrp="1"/>
+          </p:cNvGraphicFramePr>
+          <p:nvPr>
+            <p:extLst>
+              <p:ext uri="{D42A27DB-BD31-4B8C-83A1-F6EECF244321}">
+                <p14:modId xmlns:p14="http://schemas.microsoft.com/office/powerpoint/2010/main" val="3092246966"/>
+              </p:ext>
+            </p:extLst>
+          </p:nvPr>
+        </p:nvGraphicFramePr>
+        <p:xfrm>
+          <a:off x="3222705" y="1186389"/>
+          <a:ext cx="1092203" cy="1187448"/>
+        </p:xfrm>
+        <a:graphic>
+          <a:graphicData uri="http://schemas.openxmlformats.org/drawingml/2006/table">
+            <a:tbl>
+              <a:tblPr>
+                <a:tableStyleId>{5C22544A-7EE6-4342-B048-85BDC9FD1C3A}</a:tableStyleId>
+              </a:tblPr>
+              <a:tblGrid>
+                <a:gridCol w="156029">
+                  <a:extLst>
+                    <a:ext uri="{9D8B030D-6E8A-4147-A177-3AD203B41FA5}">
+                      <a16:colId xmlns:a16="http://schemas.microsoft.com/office/drawing/2014/main" val="28804164"/>
+                    </a:ext>
+                  </a:extLst>
+                </a:gridCol>
+                <a:gridCol w="156029">
+                  <a:extLst>
+                    <a:ext uri="{9D8B030D-6E8A-4147-A177-3AD203B41FA5}">
+                      <a16:colId xmlns:a16="http://schemas.microsoft.com/office/drawing/2014/main" val="3402452667"/>
+                    </a:ext>
+                  </a:extLst>
+                </a:gridCol>
+                <a:gridCol w="156029">
+                  <a:extLst>
+                    <a:ext uri="{9D8B030D-6E8A-4147-A177-3AD203B41FA5}">
+                      <a16:colId xmlns:a16="http://schemas.microsoft.com/office/drawing/2014/main" val="2822267976"/>
+                    </a:ext>
+                  </a:extLst>
+                </a:gridCol>
+                <a:gridCol w="156029">
+                  <a:extLst>
+                    <a:ext uri="{9D8B030D-6E8A-4147-A177-3AD203B41FA5}">
+                      <a16:colId xmlns:a16="http://schemas.microsoft.com/office/drawing/2014/main" val="758336612"/>
+                    </a:ext>
+                  </a:extLst>
+                </a:gridCol>
+                <a:gridCol w="156029">
+                  <a:extLst>
+                    <a:ext uri="{9D8B030D-6E8A-4147-A177-3AD203B41FA5}">
+                      <a16:colId xmlns:a16="http://schemas.microsoft.com/office/drawing/2014/main" val="1083904867"/>
+                    </a:ext>
+                  </a:extLst>
+                </a:gridCol>
+                <a:gridCol w="156029">
+                  <a:extLst>
+                    <a:ext uri="{9D8B030D-6E8A-4147-A177-3AD203B41FA5}">
+                      <a16:colId xmlns:a16="http://schemas.microsoft.com/office/drawing/2014/main" val="518805580"/>
+                    </a:ext>
+                  </a:extLst>
+                </a:gridCol>
+                <a:gridCol w="156029">
+                  <a:extLst>
+                    <a:ext uri="{9D8B030D-6E8A-4147-A177-3AD203B41FA5}">
+                      <a16:colId xmlns:a16="http://schemas.microsoft.com/office/drawing/2014/main" val="871853914"/>
+                    </a:ext>
+                  </a:extLst>
+                </a:gridCol>
+              </a:tblGrid>
+              <a:tr h="148431">
+                <a:tc>
+                  <a:txBody>
+                    <a:bodyPr/>
+                    <a:lstStyle/>
+                    <a:p>
+                      <a:pPr algn="l" fontAlgn="b"/>
+                      <a:endParaRPr lang="en-DE" sz="800" b="0" i="0" u="none" strike="noStrike" dirty="0">
+                        <a:solidFill>
+                          <a:srgbClr val="000000"/>
+                        </a:solidFill>
+                        <a:effectLst/>
+                        <a:latin typeface="Courier"/>
+                      </a:endParaRPr>
+                    </a:p>
+                  </a:txBody>
+                  <a:tcPr marL="6350" marR="6350" marT="6350" marB="0" anchor="b"/>
+                </a:tc>
+                <a:tc>
+                  <a:txBody>
+                    <a:bodyPr/>
+                    <a:lstStyle/>
+                    <a:p>
+                      <a:pPr algn="l" fontAlgn="b"/>
+                      <a:endParaRPr lang="en-DE" sz="800" b="0" i="0" u="none" strike="noStrike" dirty="0">
+                        <a:solidFill>
+                          <a:srgbClr val="000000"/>
+                        </a:solidFill>
+                        <a:effectLst/>
+                        <a:latin typeface="Courier"/>
+                      </a:endParaRPr>
+                    </a:p>
+                  </a:txBody>
+                  <a:tcPr marL="6350" marR="6350" marT="6350" marB="0" anchor="b"/>
+                </a:tc>
+                <a:tc>
+                  <a:txBody>
+                    <a:bodyPr/>
+                    <a:lstStyle/>
+                    <a:p>
+                      <a:pPr algn="l" fontAlgn="b"/>
+                      <a:endParaRPr lang="en-DE" sz="800" b="0" i="0" u="none" strike="noStrike">
+                        <a:solidFill>
+                          <a:srgbClr val="000000"/>
+                        </a:solidFill>
+                        <a:effectLst/>
+                        <a:latin typeface="Courier"/>
+                      </a:endParaRPr>
+                    </a:p>
+                  </a:txBody>
+                  <a:tcPr marL="6350" marR="6350" marT="6350" marB="0" anchor="b"/>
+                </a:tc>
+                <a:tc>
+                  <a:txBody>
+                    <a:bodyPr/>
+                    <a:lstStyle/>
+                    <a:p>
+                      <a:pPr algn="l" fontAlgn="b"/>
+                      <a:endParaRPr lang="en-DE" sz="800" b="0" i="0" u="none" strike="noStrike">
+                        <a:solidFill>
+                          <a:srgbClr val="000000"/>
+                        </a:solidFill>
+                        <a:effectLst/>
+                        <a:latin typeface="Courier"/>
+                      </a:endParaRPr>
+                    </a:p>
+                  </a:txBody>
+                  <a:tcPr marL="6350" marR="6350" marT="6350" marB="0" anchor="b"/>
+                </a:tc>
+                <a:tc>
+                  <a:txBody>
+                    <a:bodyPr/>
+                    <a:lstStyle/>
+                    <a:p>
+                      <a:pPr algn="l" fontAlgn="b"/>
+                      <a:endParaRPr lang="en-DE" sz="800" b="0" i="0" u="none" strike="noStrike">
+                        <a:solidFill>
+                          <a:srgbClr val="000000"/>
+                        </a:solidFill>
+                        <a:effectLst/>
+                        <a:latin typeface="Courier"/>
+                      </a:endParaRPr>
+                    </a:p>
+                  </a:txBody>
+                  <a:tcPr marL="6350" marR="6350" marT="6350" marB="0" anchor="b"/>
+                </a:tc>
+                <a:tc>
+                  <a:txBody>
+                    <a:bodyPr/>
+                    <a:lstStyle/>
+                    <a:p>
+                      <a:pPr algn="l" fontAlgn="b"/>
+                      <a:endParaRPr lang="en-DE" sz="800" b="0" i="0" u="none" strike="noStrike">
+                        <a:solidFill>
+                          <a:srgbClr val="000000"/>
+                        </a:solidFill>
+                        <a:effectLst/>
+                        <a:latin typeface="Courier"/>
+                      </a:endParaRPr>
+                    </a:p>
+                  </a:txBody>
+                  <a:tcPr marL="6350" marR="6350" marT="6350" marB="0" anchor="b"/>
+                </a:tc>
+                <a:tc>
+                  <a:txBody>
+                    <a:bodyPr/>
+                    <a:lstStyle/>
+                    <a:p>
+                      <a:pPr algn="l" fontAlgn="b"/>
+                      <a:endParaRPr lang="en-DE" sz="800" b="0" i="0" u="none" strike="noStrike">
+                        <a:solidFill>
+                          <a:srgbClr val="000000"/>
+                        </a:solidFill>
+                        <a:effectLst/>
+                        <a:latin typeface="Courier"/>
+                      </a:endParaRPr>
+                    </a:p>
+                  </a:txBody>
+                  <a:tcPr marL="6350" marR="6350" marT="6350" marB="0" anchor="b"/>
+                </a:tc>
+                <a:extLst>
+                  <a:ext uri="{0D108BD9-81ED-4DB2-BD59-A6C34878D82A}">
+                    <a16:rowId xmlns:a16="http://schemas.microsoft.com/office/drawing/2014/main" val="1078223716"/>
+                  </a:ext>
+                </a:extLst>
+              </a:tr>
+              <a:tr h="148431">
+                <a:tc>
+                  <a:txBody>
+                    <a:bodyPr/>
+                    <a:lstStyle/>
+                    <a:p>
+                      <a:pPr algn="l" fontAlgn="b"/>
+                      <a:endParaRPr lang="en-DE" sz="800" b="0" i="0" u="none" strike="noStrike" dirty="0">
+                        <a:solidFill>
+                          <a:srgbClr val="000000"/>
+                        </a:solidFill>
+                        <a:effectLst/>
+                        <a:latin typeface="Courier"/>
+                      </a:endParaRPr>
+                    </a:p>
+                  </a:txBody>
+                  <a:tcPr marL="6350" marR="6350" marT="6350" marB="0" anchor="b"/>
+                </a:tc>
+                <a:tc>
+                  <a:txBody>
+                    <a:bodyPr/>
+                    <a:lstStyle/>
+                    <a:p>
+                      <a:pPr algn="ctr" fontAlgn="b"/>
+                      <a:r>
+                        <a:rPr lang="en-DE" sz="800" u="none" strike="noStrike" dirty="0">
+                          <a:effectLst/>
+                        </a:rPr>
+                        <a:t>48</a:t>
+                      </a:r>
+                      <a:endParaRPr lang="en-DE" sz="800" b="1" i="0" u="none" strike="noStrike" dirty="0">
+                        <a:solidFill>
+                          <a:srgbClr val="000000"/>
+                        </a:solidFill>
+                        <a:effectLst/>
+                        <a:latin typeface="Courier"/>
+                      </a:endParaRPr>
+                    </a:p>
+                  </a:txBody>
+                  <a:tcPr marL="6350" marR="6350" marT="6350" marB="0" anchor="b">
+                    <a:lnBlToTr w="12700" cap="flat" cmpd="sng" algn="ctr">
+                      <a:noFill/>
+                      <a:prstDash val="solid"/>
+                      <a:round/>
+                      <a:headEnd type="none" w="med" len="med"/>
+                      <a:tailEnd type="none" w="med" len="med"/>
+                    </a:lnBlToTr>
+                    <a:solidFill>
+                      <a:srgbClr val="92D050"/>
+                    </a:solidFill>
+                  </a:tcPr>
+                </a:tc>
+                <a:tc>
+                  <a:txBody>
+                    <a:bodyPr/>
+                    <a:lstStyle/>
+                    <a:p>
+                      <a:pPr algn="ctr" fontAlgn="b"/>
+                      <a:r>
+                        <a:rPr lang="en-DE" sz="800" u="none" strike="noStrike" dirty="0">
+                          <a:effectLst/>
+                        </a:rPr>
+                        <a:t>65</a:t>
+                      </a:r>
+                      <a:endParaRPr lang="en-DE" sz="800" b="1" i="0" u="none" strike="noStrike" dirty="0">
+                        <a:solidFill>
+                          <a:srgbClr val="000000"/>
+                        </a:solidFill>
+                        <a:effectLst/>
+                        <a:latin typeface="Courier"/>
+                      </a:endParaRPr>
+                    </a:p>
+                  </a:txBody>
+                  <a:tcPr marL="6350" marR="6350" marT="6350" marB="0" anchor="b">
+                    <a:lnBlToTr w="12700" cap="flat" cmpd="sng" algn="ctr">
+                      <a:noFill/>
+                      <a:prstDash val="solid"/>
+                      <a:round/>
+                      <a:headEnd type="none" w="med" len="med"/>
+                      <a:tailEnd type="none" w="med" len="med"/>
+                    </a:lnBlToTr>
+                    <a:solidFill>
+                      <a:srgbClr val="92D050"/>
+                    </a:solidFill>
+                  </a:tcPr>
+                </a:tc>
+                <a:tc>
+                  <a:txBody>
+                    <a:bodyPr/>
+                    <a:lstStyle/>
+                    <a:p>
+                      <a:pPr algn="ctr" fontAlgn="b"/>
+                      <a:r>
+                        <a:rPr lang="en-DE" sz="800" u="none" strike="noStrike" dirty="0">
+                          <a:effectLst/>
+                        </a:rPr>
+                        <a:t>57</a:t>
+                      </a:r>
+                      <a:endParaRPr lang="en-DE" sz="800" b="1" i="0" u="none" strike="noStrike" dirty="0">
+                        <a:solidFill>
+                          <a:srgbClr val="000000"/>
+                        </a:solidFill>
+                        <a:effectLst/>
+                        <a:latin typeface="Courier"/>
+                      </a:endParaRPr>
+                    </a:p>
+                  </a:txBody>
+                  <a:tcPr marL="6350" marR="6350" marT="6350" marB="0" anchor="b">
+                    <a:lnBlToTr w="12700" cap="flat" cmpd="sng" algn="ctr">
+                      <a:noFill/>
+                      <a:prstDash val="solid"/>
+                      <a:round/>
+                      <a:headEnd type="none" w="med" len="med"/>
+                      <a:tailEnd type="none" w="med" len="med"/>
+                    </a:lnBlToTr>
+                    <a:solidFill>
+                      <a:srgbClr val="92D050"/>
+                    </a:solidFill>
+                  </a:tcPr>
+                </a:tc>
+                <a:tc>
+                  <a:txBody>
+                    <a:bodyPr/>
+                    <a:lstStyle/>
+                    <a:p>
+                      <a:pPr algn="ctr" fontAlgn="b"/>
+                      <a:r>
+                        <a:rPr lang="en-DE" sz="800" u="none" strike="noStrike">
+                          <a:effectLst/>
+                        </a:rPr>
+                        <a:t>63</a:t>
+                      </a:r>
+                      <a:endParaRPr lang="en-DE" sz="800" b="1" i="0" u="none" strike="noStrike">
+                        <a:solidFill>
+                          <a:srgbClr val="000000"/>
+                        </a:solidFill>
+                        <a:effectLst/>
+                        <a:latin typeface="Courier"/>
+                      </a:endParaRPr>
+                    </a:p>
+                  </a:txBody>
+                  <a:tcPr marL="6350" marR="6350" marT="6350" marB="0" anchor="b">
+                    <a:lnBlToTr w="12700" cap="flat" cmpd="sng" algn="ctr">
+                      <a:noFill/>
+                      <a:prstDash val="solid"/>
+                      <a:round/>
+                      <a:headEnd type="none" w="med" len="med"/>
+                      <a:tailEnd type="none" w="med" len="med"/>
+                    </a:lnBlToTr>
+                    <a:solidFill>
+                      <a:srgbClr val="92D050"/>
+                    </a:solidFill>
+                  </a:tcPr>
+                </a:tc>
+                <a:tc>
+                  <a:txBody>
+                    <a:bodyPr/>
+                    <a:lstStyle/>
+                    <a:p>
+                      <a:pPr algn="ctr" fontAlgn="b"/>
+                      <a:r>
+                        <a:rPr lang="en-DE" sz="800" u="none" strike="noStrike">
+                          <a:effectLst/>
+                        </a:rPr>
+                        <a:t>90</a:t>
+                      </a:r>
+                      <a:endParaRPr lang="en-DE" sz="800" b="1" i="0" u="none" strike="noStrike">
+                        <a:solidFill>
+                          <a:srgbClr val="000000"/>
+                        </a:solidFill>
+                        <a:effectLst/>
+                        <a:latin typeface="Courier"/>
+                      </a:endParaRPr>
+                    </a:p>
+                  </a:txBody>
+                  <a:tcPr marL="6350" marR="6350" marT="6350" marB="0" anchor="b">
+                    <a:lnBlToTr w="12700" cap="flat" cmpd="sng" algn="ctr">
+                      <a:noFill/>
+                      <a:prstDash val="solid"/>
+                      <a:round/>
+                      <a:headEnd type="none" w="med" len="med"/>
+                      <a:tailEnd type="none" w="med" len="med"/>
+                    </a:lnBlToTr>
+                    <a:solidFill>
+                      <a:srgbClr val="92D050"/>
+                    </a:solidFill>
+                  </a:tcPr>
+                </a:tc>
+                <a:tc>
+                  <a:txBody>
+                    <a:bodyPr/>
+                    <a:lstStyle/>
+                    <a:p>
+                      <a:pPr algn="l" fontAlgn="b"/>
+                      <a:endParaRPr lang="en-DE" sz="800" b="0" i="0" u="none" strike="noStrike">
+                        <a:solidFill>
+                          <a:srgbClr val="000000"/>
+                        </a:solidFill>
+                        <a:effectLst/>
+                        <a:latin typeface="Courier"/>
+                      </a:endParaRPr>
+                    </a:p>
+                  </a:txBody>
+                  <a:tcPr marL="6350" marR="6350" marT="6350" marB="0" anchor="b"/>
+                </a:tc>
+                <a:extLst>
+                  <a:ext uri="{0D108BD9-81ED-4DB2-BD59-A6C34878D82A}">
+                    <a16:rowId xmlns:a16="http://schemas.microsoft.com/office/drawing/2014/main" val="3342974667"/>
+                  </a:ext>
+                </a:extLst>
+              </a:tr>
+              <a:tr h="148431">
+                <a:tc>
+                  <a:txBody>
+                    <a:bodyPr/>
+                    <a:lstStyle/>
+                    <a:p>
+                      <a:pPr algn="l" fontAlgn="b"/>
+                      <a:endParaRPr lang="en-DE" sz="800" b="0" i="0" u="none" strike="noStrike" dirty="0">
+                        <a:solidFill>
+                          <a:srgbClr val="000000"/>
+                        </a:solidFill>
+                        <a:effectLst/>
+                        <a:latin typeface="Courier"/>
+                      </a:endParaRPr>
+                    </a:p>
+                  </a:txBody>
+                  <a:tcPr marL="6350" marR="6350" marT="6350" marB="0" anchor="b"/>
+                </a:tc>
+                <a:tc>
+                  <a:txBody>
+                    <a:bodyPr/>
+                    <a:lstStyle/>
+                    <a:p>
+                      <a:pPr algn="ctr" fontAlgn="b"/>
+                      <a:r>
+                        <a:rPr lang="en-DE" sz="800" u="none" strike="noStrike" dirty="0">
+                          <a:effectLst/>
+                        </a:rPr>
+                        <a:t>56</a:t>
+                      </a:r>
+                      <a:endParaRPr lang="en-DE" sz="800" b="1" i="0" u="none" strike="noStrike" dirty="0">
+                        <a:solidFill>
+                          <a:srgbClr val="000000"/>
+                        </a:solidFill>
+                        <a:effectLst/>
+                        <a:latin typeface="Courier"/>
+                      </a:endParaRPr>
+                    </a:p>
+                  </a:txBody>
+                  <a:tcPr marL="6350" marR="6350" marT="6350" marB="0" anchor="b">
+                    <a:lnBlToTr w="12700" cap="flat" cmpd="sng" algn="ctr">
+                      <a:noFill/>
+                      <a:prstDash val="solid"/>
+                      <a:round/>
+                      <a:headEnd type="none" w="med" len="med"/>
+                      <a:tailEnd type="none" w="med" len="med"/>
+                    </a:lnBlToTr>
+                    <a:solidFill>
+                      <a:srgbClr val="92D050"/>
+                    </a:solidFill>
+                  </a:tcPr>
+                </a:tc>
+                <a:tc>
+                  <a:txBody>
+                    <a:bodyPr/>
+                    <a:lstStyle/>
+                    <a:p>
+                      <a:pPr algn="ctr" fontAlgn="b"/>
+                      <a:r>
+                        <a:rPr lang="en-DE" sz="800" u="none" strike="noStrike" dirty="0">
+                          <a:effectLst/>
+                        </a:rPr>
+                        <a:t>73</a:t>
+                      </a:r>
+                      <a:endParaRPr lang="en-DE" sz="800" b="1" i="0" u="none" strike="noStrike" dirty="0">
+                        <a:solidFill>
+                          <a:srgbClr val="000000"/>
+                        </a:solidFill>
+                        <a:effectLst/>
+                        <a:latin typeface="Courier"/>
+                      </a:endParaRPr>
+                    </a:p>
+                  </a:txBody>
+                  <a:tcPr marL="6350" marR="6350" marT="6350" marB="0" anchor="b">
+                    <a:lnBlToTr w="12700" cap="flat" cmpd="sng" algn="ctr">
+                      <a:noFill/>
+                      <a:prstDash val="solid"/>
+                      <a:round/>
+                      <a:headEnd type="none" w="med" len="med"/>
+                      <a:tailEnd type="none" w="med" len="med"/>
+                    </a:lnBlToTr>
+                    <a:solidFill>
+                      <a:srgbClr val="92D050"/>
+                    </a:solidFill>
+                  </a:tcPr>
+                </a:tc>
+                <a:tc>
+                  <a:txBody>
+                    <a:bodyPr/>
+                    <a:lstStyle/>
+                    <a:p>
+                      <a:pPr algn="ctr" fontAlgn="b"/>
+                      <a:r>
+                        <a:rPr lang="en-DE" sz="800" u="none" strike="noStrike" dirty="0">
+                          <a:effectLst/>
+                        </a:rPr>
+                        <a:t>61</a:t>
+                      </a:r>
+                      <a:endParaRPr lang="en-DE" sz="800" b="1" i="0" u="none" strike="noStrike" dirty="0">
+                        <a:solidFill>
+                          <a:srgbClr val="000000"/>
+                        </a:solidFill>
+                        <a:effectLst/>
+                        <a:latin typeface="Courier"/>
+                      </a:endParaRPr>
+                    </a:p>
+                  </a:txBody>
+                  <a:tcPr marL="6350" marR="6350" marT="6350" marB="0" anchor="b">
+                    <a:lnBlToTr w="12700" cap="flat" cmpd="sng" algn="ctr">
+                      <a:noFill/>
+                      <a:prstDash val="solid"/>
+                      <a:round/>
+                      <a:headEnd type="none" w="med" len="med"/>
+                      <a:tailEnd type="none" w="med" len="med"/>
+                    </a:lnBlToTr>
+                    <a:solidFill>
+                      <a:srgbClr val="92D050"/>
+                    </a:solidFill>
+                  </a:tcPr>
+                </a:tc>
+                <a:tc>
+                  <a:txBody>
+                    <a:bodyPr/>
+                    <a:lstStyle/>
+                    <a:p>
+                      <a:pPr algn="ctr" fontAlgn="b"/>
+                      <a:r>
+                        <a:rPr lang="en-DE" sz="800" u="none" strike="noStrike" dirty="0">
+                          <a:effectLst/>
+                        </a:rPr>
+                        <a:t>60</a:t>
+                      </a:r>
+                      <a:endParaRPr lang="en-DE" sz="800" b="1" i="0" u="none" strike="noStrike" dirty="0">
+                        <a:solidFill>
+                          <a:srgbClr val="000000"/>
+                        </a:solidFill>
+                        <a:effectLst/>
+                        <a:latin typeface="Courier"/>
+                      </a:endParaRPr>
+                    </a:p>
+                  </a:txBody>
+                  <a:tcPr marL="6350" marR="6350" marT="6350" marB="0" anchor="b">
+                    <a:lnBlToTr w="12700" cap="flat" cmpd="sng" algn="ctr">
+                      <a:noFill/>
+                      <a:prstDash val="solid"/>
+                      <a:round/>
+                      <a:headEnd type="none" w="med" len="med"/>
+                      <a:tailEnd type="none" w="med" len="med"/>
+                    </a:lnBlToTr>
+                    <a:solidFill>
+                      <a:srgbClr val="92D050"/>
+                    </a:solidFill>
+                  </a:tcPr>
+                </a:tc>
+                <a:tc>
+                  <a:txBody>
+                    <a:bodyPr/>
+                    <a:lstStyle/>
+                    <a:p>
+                      <a:pPr algn="ctr" fontAlgn="b"/>
+                      <a:r>
+                        <a:rPr lang="en-DE" sz="800" u="none" strike="noStrike" dirty="0">
+                          <a:effectLst/>
+                        </a:rPr>
+                        <a:t>73</a:t>
+                      </a:r>
+                      <a:endParaRPr lang="en-DE" sz="800" b="1" i="0" u="none" strike="noStrike" dirty="0">
+                        <a:solidFill>
+                          <a:srgbClr val="000000"/>
+                        </a:solidFill>
+                        <a:effectLst/>
+                        <a:latin typeface="Courier"/>
+                      </a:endParaRPr>
+                    </a:p>
+                  </a:txBody>
+                  <a:tcPr marL="6350" marR="6350" marT="6350" marB="0" anchor="b">
+                    <a:lnBlToTr w="12700" cap="flat" cmpd="sng" algn="ctr">
+                      <a:noFill/>
+                      <a:prstDash val="solid"/>
+                      <a:round/>
+                      <a:headEnd type="none" w="med" len="med"/>
+                      <a:tailEnd type="none" w="med" len="med"/>
+                    </a:lnBlToTr>
+                    <a:solidFill>
+                      <a:srgbClr val="92D050"/>
+                    </a:solidFill>
+                  </a:tcPr>
+                </a:tc>
+                <a:tc>
+                  <a:txBody>
+                    <a:bodyPr/>
+                    <a:lstStyle/>
+                    <a:p>
+                      <a:pPr algn="l" fontAlgn="b"/>
+                      <a:endParaRPr lang="en-DE" sz="800" b="0" i="0" u="none" strike="noStrike">
+                        <a:solidFill>
+                          <a:srgbClr val="000000"/>
+                        </a:solidFill>
+                        <a:effectLst/>
+                        <a:latin typeface="Courier"/>
+                      </a:endParaRPr>
+                    </a:p>
+                  </a:txBody>
+                  <a:tcPr marL="6350" marR="6350" marT="6350" marB="0" anchor="b"/>
+                </a:tc>
+                <a:extLst>
+                  <a:ext uri="{0D108BD9-81ED-4DB2-BD59-A6C34878D82A}">
+                    <a16:rowId xmlns:a16="http://schemas.microsoft.com/office/drawing/2014/main" val="736121480"/>
+                  </a:ext>
+                </a:extLst>
+              </a:tr>
+              <a:tr h="148431">
+                <a:tc>
+                  <a:txBody>
+                    <a:bodyPr/>
+                    <a:lstStyle/>
+                    <a:p>
+                      <a:pPr algn="l" fontAlgn="b"/>
+                      <a:endParaRPr lang="en-DE" sz="800" b="0" i="0" u="none" strike="noStrike" dirty="0">
+                        <a:solidFill>
+                          <a:srgbClr val="000000"/>
+                        </a:solidFill>
+                        <a:effectLst/>
+                        <a:latin typeface="Courier"/>
+                      </a:endParaRPr>
+                    </a:p>
+                  </a:txBody>
+                  <a:tcPr marL="6350" marR="6350" marT="6350" marB="0" anchor="b"/>
+                </a:tc>
+                <a:tc>
+                  <a:txBody>
+                    <a:bodyPr/>
+                    <a:lstStyle/>
+                    <a:p>
+                      <a:pPr algn="ctr" fontAlgn="b"/>
+                      <a:r>
+                        <a:rPr lang="en-DE" sz="800" u="none" strike="noStrike">
+                          <a:effectLst/>
+                        </a:rPr>
+                        <a:t>46</a:t>
+                      </a:r>
+                      <a:endParaRPr lang="en-DE" sz="800" b="1" i="0" u="none" strike="noStrike">
+                        <a:solidFill>
+                          <a:srgbClr val="000000"/>
+                        </a:solidFill>
+                        <a:effectLst/>
+                        <a:latin typeface="Courier"/>
+                      </a:endParaRPr>
+                    </a:p>
+                  </a:txBody>
+                  <a:tcPr marL="6350" marR="6350" marT="6350" marB="0" anchor="b">
+                    <a:lnBlToTr w="12700" cap="flat" cmpd="sng" algn="ctr">
+                      <a:noFill/>
+                      <a:prstDash val="solid"/>
+                      <a:round/>
+                      <a:headEnd type="none" w="med" len="med"/>
+                      <a:tailEnd type="none" w="med" len="med"/>
+                    </a:lnBlToTr>
+                    <a:solidFill>
+                      <a:srgbClr val="92D050"/>
+                    </a:solidFill>
+                  </a:tcPr>
+                </a:tc>
+                <a:tc>
+                  <a:txBody>
+                    <a:bodyPr/>
+                    <a:lstStyle/>
+                    <a:p>
+                      <a:pPr algn="ctr" fontAlgn="b"/>
+                      <a:r>
+                        <a:rPr lang="en-DE" sz="800" u="none" strike="noStrike">
+                          <a:effectLst/>
+                        </a:rPr>
+                        <a:t>56</a:t>
+                      </a:r>
+                      <a:endParaRPr lang="en-DE" sz="800" b="1" i="0" u="none" strike="noStrike">
+                        <a:solidFill>
+                          <a:srgbClr val="000000"/>
+                        </a:solidFill>
+                        <a:effectLst/>
+                        <a:latin typeface="Courier"/>
+                      </a:endParaRPr>
+                    </a:p>
+                  </a:txBody>
+                  <a:tcPr marL="6350" marR="6350" marT="6350" marB="0" anchor="b">
+                    <a:lnBlToTr w="12700" cap="flat" cmpd="sng" algn="ctr">
+                      <a:noFill/>
+                      <a:prstDash val="solid"/>
+                      <a:round/>
+                      <a:headEnd type="none" w="med" len="med"/>
+                      <a:tailEnd type="none" w="med" len="med"/>
+                    </a:lnBlToTr>
+                    <a:solidFill>
+                      <a:srgbClr val="92D050"/>
+                    </a:solidFill>
+                  </a:tcPr>
+                </a:tc>
+                <a:tc>
+                  <a:txBody>
+                    <a:bodyPr/>
+                    <a:lstStyle/>
+                    <a:p>
+                      <a:pPr algn="ctr" fontAlgn="b"/>
+                      <a:r>
+                        <a:rPr lang="en-DE" sz="800" u="none" strike="noStrike" dirty="0">
+                          <a:solidFill>
+                            <a:srgbClr val="FF0000"/>
+                          </a:solidFill>
+                          <a:effectLst/>
+                        </a:rPr>
+                        <a:t>57</a:t>
+                      </a:r>
+                      <a:endParaRPr lang="en-DE" sz="800" b="1" i="0" u="none" strike="noStrike" dirty="0">
+                        <a:solidFill>
+                          <a:srgbClr val="FF0000"/>
+                        </a:solidFill>
+                        <a:effectLst/>
+                        <a:latin typeface="Courier"/>
+                      </a:endParaRPr>
+                    </a:p>
+                  </a:txBody>
+                  <a:tcPr marL="6350" marR="6350" marT="6350" marB="0" anchor="b">
+                    <a:lnBlToTr w="12700" cap="flat" cmpd="sng" algn="ctr">
+                      <a:noFill/>
+                      <a:prstDash val="solid"/>
+                      <a:round/>
+                      <a:headEnd type="none" w="med" len="med"/>
+                      <a:tailEnd type="none" w="med" len="med"/>
+                    </a:lnBlToTr>
+                    <a:solidFill>
+                      <a:srgbClr val="92D050"/>
+                    </a:solidFill>
+                  </a:tcPr>
+                </a:tc>
+                <a:tc>
+                  <a:txBody>
+                    <a:bodyPr/>
+                    <a:lstStyle/>
+                    <a:p>
+                      <a:pPr algn="ctr" fontAlgn="b"/>
+                      <a:r>
+                        <a:rPr lang="en-DE" sz="800" u="none" strike="noStrike" dirty="0">
+                          <a:effectLst/>
+                        </a:rPr>
+                        <a:t>61</a:t>
+                      </a:r>
+                      <a:endParaRPr lang="en-DE" sz="800" b="1" i="0" u="none" strike="noStrike" dirty="0">
+                        <a:solidFill>
+                          <a:srgbClr val="000000"/>
+                        </a:solidFill>
+                        <a:effectLst/>
+                        <a:latin typeface="Courier"/>
+                      </a:endParaRPr>
+                    </a:p>
+                  </a:txBody>
+                  <a:tcPr marL="6350" marR="6350" marT="6350" marB="0" anchor="b">
+                    <a:lnBlToTr w="12700" cap="flat" cmpd="sng" algn="ctr">
+                      <a:noFill/>
+                      <a:prstDash val="solid"/>
+                      <a:round/>
+                      <a:headEnd type="none" w="med" len="med"/>
+                      <a:tailEnd type="none" w="med" len="med"/>
+                    </a:lnBlToTr>
+                    <a:solidFill>
+                      <a:srgbClr val="92D050"/>
+                    </a:solidFill>
+                  </a:tcPr>
+                </a:tc>
+                <a:tc>
+                  <a:txBody>
+                    <a:bodyPr/>
+                    <a:lstStyle/>
+                    <a:p>
+                      <a:pPr algn="ctr" fontAlgn="b"/>
+                      <a:r>
+                        <a:rPr lang="en-DE" sz="800" u="none" strike="noStrike">
+                          <a:effectLst/>
+                        </a:rPr>
+                        <a:t>83</a:t>
+                      </a:r>
+                      <a:endParaRPr lang="en-DE" sz="800" b="1" i="0" u="none" strike="noStrike">
+                        <a:solidFill>
+                          <a:srgbClr val="000000"/>
+                        </a:solidFill>
+                        <a:effectLst/>
+                        <a:latin typeface="Courier"/>
+                      </a:endParaRPr>
+                    </a:p>
+                  </a:txBody>
+                  <a:tcPr marL="6350" marR="6350" marT="6350" marB="0" anchor="b">
+                    <a:lnBlToTr w="12700" cap="flat" cmpd="sng" algn="ctr">
+                      <a:noFill/>
+                      <a:prstDash val="solid"/>
+                      <a:round/>
+                      <a:headEnd type="none" w="med" len="med"/>
+                      <a:tailEnd type="none" w="med" len="med"/>
+                    </a:lnBlToTr>
+                    <a:solidFill>
+                      <a:srgbClr val="92D050"/>
+                    </a:solidFill>
+                  </a:tcPr>
+                </a:tc>
+                <a:tc>
+                  <a:txBody>
+                    <a:bodyPr/>
+                    <a:lstStyle/>
+                    <a:p>
+                      <a:pPr algn="l" fontAlgn="b"/>
+                      <a:endParaRPr lang="en-DE" sz="800" b="0" i="0" u="none" strike="noStrike">
+                        <a:solidFill>
+                          <a:srgbClr val="000000"/>
+                        </a:solidFill>
+                        <a:effectLst/>
+                        <a:latin typeface="Courier"/>
+                      </a:endParaRPr>
+                    </a:p>
+                  </a:txBody>
+                  <a:tcPr marL="6350" marR="6350" marT="6350" marB="0" anchor="b"/>
+                </a:tc>
+                <a:extLst>
+                  <a:ext uri="{0D108BD9-81ED-4DB2-BD59-A6C34878D82A}">
+                    <a16:rowId xmlns:a16="http://schemas.microsoft.com/office/drawing/2014/main" val="2968588688"/>
+                  </a:ext>
+                </a:extLst>
+              </a:tr>
+              <a:tr h="148431">
+                <a:tc>
+                  <a:txBody>
+                    <a:bodyPr/>
+                    <a:lstStyle/>
+                    <a:p>
+                      <a:pPr algn="l" fontAlgn="b"/>
+                      <a:endParaRPr lang="en-DE" sz="800" b="0" i="0" u="none" strike="noStrike" dirty="0">
+                        <a:solidFill>
+                          <a:srgbClr val="000000"/>
+                        </a:solidFill>
+                        <a:effectLst/>
+                        <a:latin typeface="Courier"/>
+                      </a:endParaRPr>
+                    </a:p>
+                  </a:txBody>
+                  <a:tcPr marL="6350" marR="6350" marT="6350" marB="0" anchor="b"/>
+                </a:tc>
+                <a:tc>
+                  <a:txBody>
+                    <a:bodyPr/>
+                    <a:lstStyle/>
+                    <a:p>
+                      <a:pPr algn="ctr" fontAlgn="b"/>
+                      <a:r>
+                        <a:rPr lang="en-DE" sz="800" u="none" strike="noStrike">
+                          <a:effectLst/>
+                        </a:rPr>
+                        <a:t>54</a:t>
+                      </a:r>
+                      <a:endParaRPr lang="en-DE" sz="800" b="1" i="0" u="none" strike="noStrike">
+                        <a:solidFill>
+                          <a:srgbClr val="000000"/>
+                        </a:solidFill>
+                        <a:effectLst/>
+                        <a:latin typeface="Courier"/>
+                      </a:endParaRPr>
+                    </a:p>
+                  </a:txBody>
+                  <a:tcPr marL="6350" marR="6350" marT="6350" marB="0" anchor="b">
+                    <a:lnBlToTr w="12700" cap="flat" cmpd="sng" algn="ctr">
+                      <a:noFill/>
+                      <a:prstDash val="solid"/>
+                      <a:round/>
+                      <a:headEnd type="none" w="med" len="med"/>
+                      <a:tailEnd type="none" w="med" len="med"/>
+                    </a:lnBlToTr>
+                    <a:solidFill>
+                      <a:srgbClr val="92D050"/>
+                    </a:solidFill>
+                  </a:tcPr>
+                </a:tc>
+                <a:tc>
+                  <a:txBody>
+                    <a:bodyPr/>
+                    <a:lstStyle/>
+                    <a:p>
+                      <a:pPr algn="ctr" fontAlgn="b"/>
+                      <a:r>
+                        <a:rPr lang="en-DE" sz="800" u="none" strike="noStrike">
+                          <a:effectLst/>
+                        </a:rPr>
+                        <a:t>55</a:t>
+                      </a:r>
+                      <a:endParaRPr lang="en-DE" sz="800" b="1" i="0" u="none" strike="noStrike">
+                        <a:solidFill>
+                          <a:srgbClr val="000000"/>
+                        </a:solidFill>
+                        <a:effectLst/>
+                        <a:latin typeface="Courier"/>
+                      </a:endParaRPr>
+                    </a:p>
+                  </a:txBody>
+                  <a:tcPr marL="6350" marR="6350" marT="6350" marB="0" anchor="b">
+                    <a:lnBlToTr w="12700" cap="flat" cmpd="sng" algn="ctr">
+                      <a:noFill/>
+                      <a:prstDash val="solid"/>
+                      <a:round/>
+                      <a:headEnd type="none" w="med" len="med"/>
+                      <a:tailEnd type="none" w="med" len="med"/>
+                    </a:lnBlToTr>
+                    <a:solidFill>
+                      <a:srgbClr val="92D050"/>
+                    </a:solidFill>
+                  </a:tcPr>
+                </a:tc>
+                <a:tc>
+                  <a:txBody>
+                    <a:bodyPr/>
+                    <a:lstStyle/>
+                    <a:p>
+                      <a:pPr algn="ctr" fontAlgn="b"/>
+                      <a:r>
+                        <a:rPr lang="en-DE" sz="800" u="none" strike="noStrike">
+                          <a:effectLst/>
+                        </a:rPr>
+                        <a:t>58</a:t>
+                      </a:r>
+                      <a:endParaRPr lang="en-DE" sz="800" b="1" i="0" u="none" strike="noStrike">
+                        <a:solidFill>
+                          <a:srgbClr val="000000"/>
+                        </a:solidFill>
+                        <a:effectLst/>
+                        <a:latin typeface="Courier"/>
+                      </a:endParaRPr>
+                    </a:p>
+                  </a:txBody>
+                  <a:tcPr marL="6350" marR="6350" marT="6350" marB="0" anchor="b">
+                    <a:lnBlToTr w="12700" cap="flat" cmpd="sng" algn="ctr">
+                      <a:noFill/>
+                      <a:prstDash val="solid"/>
+                      <a:round/>
+                      <a:headEnd type="none" w="med" len="med"/>
+                      <a:tailEnd type="none" w="med" len="med"/>
+                    </a:lnBlToTr>
+                    <a:solidFill>
+                      <a:srgbClr val="92D050"/>
+                    </a:solidFill>
+                  </a:tcPr>
+                </a:tc>
+                <a:tc>
+                  <a:txBody>
+                    <a:bodyPr/>
+                    <a:lstStyle/>
+                    <a:p>
+                      <a:pPr algn="ctr" fontAlgn="b"/>
+                      <a:r>
+                        <a:rPr lang="en-DE" sz="800" u="none" strike="noStrike" dirty="0">
+                          <a:effectLst/>
+                        </a:rPr>
+                        <a:t>80</a:t>
+                      </a:r>
+                      <a:endParaRPr lang="en-DE" sz="800" b="1" i="0" u="none" strike="noStrike" dirty="0">
+                        <a:solidFill>
+                          <a:srgbClr val="000000"/>
+                        </a:solidFill>
+                        <a:effectLst/>
+                        <a:latin typeface="Courier"/>
+                      </a:endParaRPr>
+                    </a:p>
+                  </a:txBody>
+                  <a:tcPr marL="6350" marR="6350" marT="6350" marB="0" anchor="b">
+                    <a:lnBlToTr w="12700" cap="flat" cmpd="sng" algn="ctr">
+                      <a:noFill/>
+                      <a:prstDash val="solid"/>
+                      <a:round/>
+                      <a:headEnd type="none" w="med" len="med"/>
+                      <a:tailEnd type="none" w="med" len="med"/>
+                    </a:lnBlToTr>
+                    <a:solidFill>
+                      <a:srgbClr val="92D050"/>
+                    </a:solidFill>
+                  </a:tcPr>
+                </a:tc>
+                <a:tc>
+                  <a:txBody>
+                    <a:bodyPr/>
+                    <a:lstStyle/>
+                    <a:p>
+                      <a:pPr algn="ctr" fontAlgn="b"/>
+                      <a:r>
+                        <a:rPr lang="en-DE" sz="800" u="none" strike="noStrike" dirty="0">
+                          <a:effectLst/>
+                        </a:rPr>
+                        <a:t>89</a:t>
+                      </a:r>
+                      <a:endParaRPr lang="en-DE" sz="800" b="1" i="0" u="none" strike="noStrike" dirty="0">
+                        <a:solidFill>
+                          <a:srgbClr val="000000"/>
+                        </a:solidFill>
+                        <a:effectLst/>
+                        <a:latin typeface="Courier"/>
+                      </a:endParaRPr>
+                    </a:p>
+                  </a:txBody>
+                  <a:tcPr marL="6350" marR="6350" marT="6350" marB="0" anchor="b">
+                    <a:lnBlToTr w="12700" cap="flat" cmpd="sng" algn="ctr">
+                      <a:noFill/>
+                      <a:prstDash val="solid"/>
+                      <a:round/>
+                      <a:headEnd type="none" w="med" len="med"/>
+                      <a:tailEnd type="none" w="med" len="med"/>
+                    </a:lnBlToTr>
+                    <a:solidFill>
+                      <a:srgbClr val="92D050"/>
+                    </a:solidFill>
+                  </a:tcPr>
+                </a:tc>
+                <a:tc>
+                  <a:txBody>
+                    <a:bodyPr/>
+                    <a:lstStyle/>
+                    <a:p>
+                      <a:pPr algn="l" fontAlgn="b"/>
+                      <a:endParaRPr lang="en-DE" sz="800" b="0" i="0" u="none" strike="noStrike">
+                        <a:solidFill>
+                          <a:srgbClr val="000000"/>
+                        </a:solidFill>
+                        <a:effectLst/>
+                        <a:latin typeface="Courier"/>
+                      </a:endParaRPr>
+                    </a:p>
+                  </a:txBody>
+                  <a:tcPr marL="6350" marR="6350" marT="6350" marB="0" anchor="b"/>
+                </a:tc>
+                <a:extLst>
+                  <a:ext uri="{0D108BD9-81ED-4DB2-BD59-A6C34878D82A}">
+                    <a16:rowId xmlns:a16="http://schemas.microsoft.com/office/drawing/2014/main" val="1128576129"/>
+                  </a:ext>
+                </a:extLst>
+              </a:tr>
+              <a:tr h="148431">
+                <a:tc>
+                  <a:txBody>
+                    <a:bodyPr/>
+                    <a:lstStyle/>
+                    <a:p>
+                      <a:pPr algn="l" fontAlgn="b"/>
+                      <a:endParaRPr lang="en-DE" sz="800" b="0" i="0" u="none" strike="noStrike" dirty="0">
+                        <a:solidFill>
+                          <a:srgbClr val="000000"/>
+                        </a:solidFill>
+                        <a:effectLst/>
+                        <a:latin typeface="Courier"/>
+                      </a:endParaRPr>
+                    </a:p>
+                  </a:txBody>
+                  <a:tcPr marL="6350" marR="6350" marT="6350" marB="0" anchor="b"/>
+                </a:tc>
+                <a:tc>
+                  <a:txBody>
+                    <a:bodyPr/>
+                    <a:lstStyle/>
+                    <a:p>
+                      <a:pPr algn="ctr" fontAlgn="b"/>
+                      <a:r>
+                        <a:rPr lang="en-DE" sz="800" u="none" strike="noStrike">
+                          <a:effectLst/>
+                        </a:rPr>
+                        <a:t>45</a:t>
+                      </a:r>
+                      <a:endParaRPr lang="en-DE" sz="800" b="1" i="0" u="none" strike="noStrike">
+                        <a:solidFill>
+                          <a:srgbClr val="000000"/>
+                        </a:solidFill>
+                        <a:effectLst/>
+                        <a:latin typeface="Courier"/>
+                      </a:endParaRPr>
+                    </a:p>
+                  </a:txBody>
+                  <a:tcPr marL="6350" marR="6350" marT="6350" marB="0" anchor="b">
+                    <a:lnBlToTr w="12700" cap="flat" cmpd="sng" algn="ctr">
+                      <a:noFill/>
+                      <a:prstDash val="solid"/>
+                      <a:round/>
+                      <a:headEnd type="none" w="med" len="med"/>
+                      <a:tailEnd type="none" w="med" len="med"/>
+                    </a:lnBlToTr>
+                    <a:solidFill>
+                      <a:srgbClr val="92D050"/>
+                    </a:solidFill>
+                  </a:tcPr>
+                </a:tc>
+                <a:tc>
+                  <a:txBody>
+                    <a:bodyPr/>
+                    <a:lstStyle/>
+                    <a:p>
+                      <a:pPr algn="ctr" fontAlgn="b"/>
+                      <a:r>
+                        <a:rPr lang="en-DE" sz="800" u="none" strike="noStrike">
+                          <a:effectLst/>
+                        </a:rPr>
+                        <a:t>68</a:t>
+                      </a:r>
+                      <a:endParaRPr lang="en-DE" sz="800" b="1" i="0" u="none" strike="noStrike">
+                        <a:solidFill>
+                          <a:srgbClr val="000000"/>
+                        </a:solidFill>
+                        <a:effectLst/>
+                        <a:latin typeface="Courier"/>
+                      </a:endParaRPr>
+                    </a:p>
+                  </a:txBody>
+                  <a:tcPr marL="6350" marR="6350" marT="6350" marB="0" anchor="b">
+                    <a:lnBlToTr w="12700" cap="flat" cmpd="sng" algn="ctr">
+                      <a:noFill/>
+                      <a:prstDash val="solid"/>
+                      <a:round/>
+                      <a:headEnd type="none" w="med" len="med"/>
+                      <a:tailEnd type="none" w="med" len="med"/>
+                    </a:lnBlToTr>
+                    <a:solidFill>
+                      <a:srgbClr val="92D050"/>
+                    </a:solidFill>
+                  </a:tcPr>
+                </a:tc>
+                <a:tc>
+                  <a:txBody>
+                    <a:bodyPr/>
+                    <a:lstStyle/>
+                    <a:p>
+                      <a:pPr algn="ctr" fontAlgn="b"/>
+                      <a:r>
+                        <a:rPr lang="en-DE" sz="800" u="none" strike="noStrike">
+                          <a:effectLst/>
+                        </a:rPr>
+                        <a:t>73</a:t>
+                      </a:r>
+                      <a:endParaRPr lang="en-DE" sz="800" b="1" i="0" u="none" strike="noStrike">
+                        <a:solidFill>
+                          <a:srgbClr val="000000"/>
+                        </a:solidFill>
+                        <a:effectLst/>
+                        <a:latin typeface="Courier"/>
+                      </a:endParaRPr>
+                    </a:p>
+                  </a:txBody>
+                  <a:tcPr marL="6350" marR="6350" marT="6350" marB="0" anchor="b">
+                    <a:lnBlToTr w="12700" cap="flat" cmpd="sng" algn="ctr">
+                      <a:noFill/>
+                      <a:prstDash val="solid"/>
+                      <a:round/>
+                      <a:headEnd type="none" w="med" len="med"/>
+                      <a:tailEnd type="none" w="med" len="med"/>
+                    </a:lnBlToTr>
+                    <a:solidFill>
+                      <a:srgbClr val="92D050"/>
+                    </a:solidFill>
+                  </a:tcPr>
+                </a:tc>
+                <a:tc>
+                  <a:txBody>
+                    <a:bodyPr/>
+                    <a:lstStyle/>
+                    <a:p>
+                      <a:pPr algn="ctr" fontAlgn="b"/>
+                      <a:r>
+                        <a:rPr lang="en-DE" sz="800" u="none" strike="noStrike" dirty="0">
+                          <a:effectLst/>
+                        </a:rPr>
+                        <a:t>74</a:t>
+                      </a:r>
+                      <a:endParaRPr lang="en-DE" sz="800" b="1" i="0" u="none" strike="noStrike" dirty="0">
+                        <a:solidFill>
+                          <a:srgbClr val="000000"/>
+                        </a:solidFill>
+                        <a:effectLst/>
+                        <a:latin typeface="Courier"/>
+                      </a:endParaRPr>
+                    </a:p>
+                  </a:txBody>
+                  <a:tcPr marL="6350" marR="6350" marT="6350" marB="0" anchor="b">
+                    <a:lnBlToTr w="12700" cap="flat" cmpd="sng" algn="ctr">
+                      <a:noFill/>
+                      <a:prstDash val="solid"/>
+                      <a:round/>
+                      <a:headEnd type="none" w="med" len="med"/>
+                      <a:tailEnd type="none" w="med" len="med"/>
+                    </a:lnBlToTr>
+                    <a:solidFill>
+                      <a:srgbClr val="92D050"/>
+                    </a:solidFill>
+                  </a:tcPr>
+                </a:tc>
+                <a:tc>
+                  <a:txBody>
+                    <a:bodyPr/>
+                    <a:lstStyle/>
+                    <a:p>
+                      <a:pPr algn="ctr" fontAlgn="b"/>
+                      <a:r>
+                        <a:rPr lang="en-DE" sz="800" u="none" strike="noStrike" dirty="0">
+                          <a:effectLst/>
+                        </a:rPr>
+                        <a:t>86</a:t>
+                      </a:r>
+                      <a:endParaRPr lang="en-DE" sz="800" b="1" i="0" u="none" strike="noStrike" dirty="0">
+                        <a:solidFill>
+                          <a:srgbClr val="000000"/>
+                        </a:solidFill>
+                        <a:effectLst/>
+                        <a:latin typeface="Courier"/>
+                      </a:endParaRPr>
+                    </a:p>
+                  </a:txBody>
+                  <a:tcPr marL="6350" marR="6350" marT="6350" marB="0" anchor="b">
+                    <a:lnBlToTr w="12700" cap="flat" cmpd="sng" algn="ctr">
+                      <a:noFill/>
+                      <a:prstDash val="solid"/>
+                      <a:round/>
+                      <a:headEnd type="none" w="med" len="med"/>
+                      <a:tailEnd type="none" w="med" len="med"/>
+                    </a:lnBlToTr>
+                    <a:solidFill>
+                      <a:srgbClr val="92D050"/>
+                    </a:solidFill>
+                  </a:tcPr>
+                </a:tc>
+                <a:tc>
+                  <a:txBody>
+                    <a:bodyPr/>
+                    <a:lstStyle/>
+                    <a:p>
+                      <a:pPr algn="l" fontAlgn="b"/>
+                      <a:endParaRPr lang="en-DE" sz="800" b="0" i="0" u="none" strike="noStrike">
+                        <a:solidFill>
+                          <a:srgbClr val="000000"/>
+                        </a:solidFill>
+                        <a:effectLst/>
+                        <a:latin typeface="Courier"/>
+                      </a:endParaRPr>
+                    </a:p>
+                  </a:txBody>
+                  <a:tcPr marL="6350" marR="6350" marT="6350" marB="0" anchor="b"/>
+                </a:tc>
+                <a:extLst>
+                  <a:ext uri="{0D108BD9-81ED-4DB2-BD59-A6C34878D82A}">
+                    <a16:rowId xmlns:a16="http://schemas.microsoft.com/office/drawing/2014/main" val="3659823931"/>
+                  </a:ext>
+                </a:extLst>
+              </a:tr>
+              <a:tr h="148431">
+                <a:tc>
+                  <a:txBody>
+                    <a:bodyPr/>
+                    <a:lstStyle/>
+                    <a:p>
+                      <a:pPr algn="l" fontAlgn="b"/>
+                      <a:endParaRPr lang="en-DE" sz="800" b="0" i="0" u="none" strike="noStrike">
+                        <a:solidFill>
+                          <a:srgbClr val="000000"/>
+                        </a:solidFill>
+                        <a:effectLst/>
+                        <a:latin typeface="Courier"/>
+                      </a:endParaRPr>
+                    </a:p>
+                  </a:txBody>
+                  <a:tcPr marL="6350" marR="6350" marT="6350" marB="0" anchor="b"/>
+                </a:tc>
+                <a:tc>
+                  <a:txBody>
+                    <a:bodyPr/>
+                    <a:lstStyle/>
+                    <a:p>
+                      <a:pPr algn="l" fontAlgn="b"/>
+                      <a:endParaRPr lang="en-DE" sz="800" b="0" i="0" u="none" strike="noStrike" dirty="0">
+                        <a:solidFill>
+                          <a:srgbClr val="000000"/>
+                        </a:solidFill>
+                        <a:effectLst/>
+                        <a:latin typeface="Courier"/>
+                      </a:endParaRPr>
+                    </a:p>
+                  </a:txBody>
+                  <a:tcPr marL="6350" marR="6350" marT="6350" marB="0" anchor="b"/>
+                </a:tc>
+                <a:tc>
+                  <a:txBody>
+                    <a:bodyPr/>
+                    <a:lstStyle/>
+                    <a:p>
+                      <a:pPr algn="l" fontAlgn="b"/>
+                      <a:endParaRPr lang="en-DE" sz="800" b="0" i="0" u="none" strike="noStrike" dirty="0">
+                        <a:solidFill>
+                          <a:srgbClr val="000000"/>
+                        </a:solidFill>
+                        <a:effectLst/>
+                        <a:latin typeface="Courier"/>
+                      </a:endParaRPr>
+                    </a:p>
+                  </a:txBody>
+                  <a:tcPr marL="6350" marR="6350" marT="6350" marB="0" anchor="b"/>
+                </a:tc>
+                <a:tc>
+                  <a:txBody>
+                    <a:bodyPr/>
+                    <a:lstStyle/>
+                    <a:p>
+                      <a:pPr algn="l" fontAlgn="b"/>
+                      <a:endParaRPr lang="en-DE" sz="800" b="0" i="0" u="none" strike="noStrike" dirty="0">
+                        <a:solidFill>
+                          <a:srgbClr val="000000"/>
+                        </a:solidFill>
+                        <a:effectLst/>
+                        <a:latin typeface="Courier"/>
+                      </a:endParaRPr>
+                    </a:p>
+                  </a:txBody>
+                  <a:tcPr marL="6350" marR="6350" marT="6350" marB="0" anchor="b"/>
+                </a:tc>
+                <a:tc>
+                  <a:txBody>
+                    <a:bodyPr/>
+                    <a:lstStyle/>
+                    <a:p>
+                      <a:pPr algn="l" fontAlgn="b"/>
+                      <a:endParaRPr lang="en-DE" sz="800" b="0" i="0" u="none" strike="noStrike" dirty="0">
+                        <a:solidFill>
+                          <a:srgbClr val="000000"/>
+                        </a:solidFill>
+                        <a:effectLst/>
+                        <a:latin typeface="Courier"/>
+                      </a:endParaRPr>
+                    </a:p>
+                  </a:txBody>
+                  <a:tcPr marL="6350" marR="6350" marT="6350" marB="0" anchor="b"/>
+                </a:tc>
+                <a:tc>
+                  <a:txBody>
+                    <a:bodyPr/>
+                    <a:lstStyle/>
+                    <a:p>
+                      <a:pPr algn="l" fontAlgn="b"/>
+                      <a:endParaRPr lang="en-DE" sz="800" b="0" i="0" u="none" strike="noStrike" dirty="0">
+                        <a:solidFill>
+                          <a:srgbClr val="000000"/>
+                        </a:solidFill>
+                        <a:effectLst/>
+                        <a:latin typeface="Courier"/>
+                      </a:endParaRPr>
+                    </a:p>
+                  </a:txBody>
+                  <a:tcPr marL="6350" marR="6350" marT="6350" marB="0" anchor="b"/>
+                </a:tc>
+                <a:tc>
+                  <a:txBody>
+                    <a:bodyPr/>
+                    <a:lstStyle/>
+                    <a:p>
+                      <a:pPr algn="l" fontAlgn="b"/>
+                      <a:endParaRPr lang="en-DE" sz="800" b="0" i="0" u="none" strike="noStrike">
+                        <a:solidFill>
+                          <a:srgbClr val="000000"/>
+                        </a:solidFill>
+                        <a:effectLst/>
+                        <a:latin typeface="Courier"/>
+                      </a:endParaRPr>
+                    </a:p>
+                  </a:txBody>
+                  <a:tcPr marL="6350" marR="6350" marT="6350" marB="0" anchor="b"/>
+                </a:tc>
+                <a:extLst>
+                  <a:ext uri="{0D108BD9-81ED-4DB2-BD59-A6C34878D82A}">
+                    <a16:rowId xmlns:a16="http://schemas.microsoft.com/office/drawing/2014/main" val="524604145"/>
+                  </a:ext>
+                </a:extLst>
+              </a:tr>
+              <a:tr h="148431">
+                <a:tc>
+                  <a:txBody>
+                    <a:bodyPr/>
+                    <a:lstStyle/>
+                    <a:p>
+                      <a:pPr algn="l" fontAlgn="b"/>
+                      <a:endParaRPr lang="en-DE" sz="800" b="0" i="0" u="none" strike="noStrike">
+                        <a:solidFill>
+                          <a:srgbClr val="000000"/>
+                        </a:solidFill>
+                        <a:effectLst/>
+                        <a:latin typeface="Courier"/>
+                      </a:endParaRPr>
+                    </a:p>
+                  </a:txBody>
+                  <a:tcPr marL="6350" marR="6350" marT="6350" marB="0" anchor="b"/>
+                </a:tc>
+                <a:tc>
+                  <a:txBody>
+                    <a:bodyPr/>
+                    <a:lstStyle/>
+                    <a:p>
+                      <a:pPr algn="l" fontAlgn="b"/>
+                      <a:endParaRPr lang="en-DE" sz="800" b="0" i="0" u="none" strike="noStrike" dirty="0">
+                        <a:solidFill>
+                          <a:srgbClr val="000000"/>
+                        </a:solidFill>
+                        <a:effectLst/>
+                        <a:latin typeface="Courier"/>
+                      </a:endParaRPr>
+                    </a:p>
+                  </a:txBody>
+                  <a:tcPr marL="6350" marR="6350" marT="6350" marB="0" anchor="b"/>
+                </a:tc>
+                <a:tc>
+                  <a:txBody>
+                    <a:bodyPr/>
+                    <a:lstStyle/>
+                    <a:p>
+                      <a:pPr algn="l" fontAlgn="b"/>
+                      <a:endParaRPr lang="en-DE" sz="800" b="0" i="0" u="none" strike="noStrike">
+                        <a:solidFill>
+                          <a:srgbClr val="000000"/>
+                        </a:solidFill>
+                        <a:effectLst/>
+                        <a:latin typeface="Courier"/>
+                      </a:endParaRPr>
+                    </a:p>
+                  </a:txBody>
+                  <a:tcPr marL="6350" marR="6350" marT="6350" marB="0" anchor="b"/>
+                </a:tc>
+                <a:tc>
+                  <a:txBody>
+                    <a:bodyPr/>
+                    <a:lstStyle/>
+                    <a:p>
+                      <a:pPr algn="l" fontAlgn="b"/>
+                      <a:endParaRPr lang="en-DE" sz="800" b="0" i="0" u="none" strike="noStrike">
+                        <a:solidFill>
+                          <a:srgbClr val="000000"/>
+                        </a:solidFill>
+                        <a:effectLst/>
+                        <a:latin typeface="Courier"/>
+                      </a:endParaRPr>
+                    </a:p>
+                  </a:txBody>
+                  <a:tcPr marL="6350" marR="6350" marT="6350" marB="0" anchor="b"/>
+                </a:tc>
+                <a:tc>
+                  <a:txBody>
+                    <a:bodyPr/>
+                    <a:lstStyle/>
+                    <a:p>
+                      <a:pPr algn="l" fontAlgn="b"/>
+                      <a:endParaRPr lang="en-DE" sz="800" b="0" i="0" u="none" strike="noStrike" dirty="0">
+                        <a:solidFill>
+                          <a:srgbClr val="000000"/>
+                        </a:solidFill>
+                        <a:effectLst/>
+                        <a:latin typeface="Courier"/>
+                      </a:endParaRPr>
+                    </a:p>
+                  </a:txBody>
+                  <a:tcPr marL="6350" marR="6350" marT="6350" marB="0" anchor="b"/>
+                </a:tc>
+                <a:tc>
+                  <a:txBody>
+                    <a:bodyPr/>
+                    <a:lstStyle/>
+                    <a:p>
+                      <a:pPr algn="l" fontAlgn="b"/>
+                      <a:endParaRPr lang="en-DE" sz="800" b="0" i="0" u="none" strike="noStrike">
+                        <a:solidFill>
+                          <a:srgbClr val="000000"/>
+                        </a:solidFill>
+                        <a:effectLst/>
+                        <a:latin typeface="Courier"/>
+                      </a:endParaRPr>
+                    </a:p>
+                  </a:txBody>
+                  <a:tcPr marL="6350" marR="6350" marT="6350" marB="0" anchor="b"/>
+                </a:tc>
+                <a:tc>
+                  <a:txBody>
+                    <a:bodyPr/>
+                    <a:lstStyle/>
+                    <a:p>
+                      <a:pPr algn="l" fontAlgn="b"/>
+                      <a:endParaRPr lang="en-DE" sz="800" b="0" i="0" u="none" strike="noStrike" dirty="0">
+                        <a:solidFill>
+                          <a:srgbClr val="000000"/>
+                        </a:solidFill>
+                        <a:effectLst/>
+                        <a:latin typeface="Courier"/>
+                      </a:endParaRPr>
+                    </a:p>
+                  </a:txBody>
+                  <a:tcPr marL="6350" marR="6350" marT="6350" marB="0" anchor="b"/>
+                </a:tc>
+                <a:extLst>
+                  <a:ext uri="{0D108BD9-81ED-4DB2-BD59-A6C34878D82A}">
+                    <a16:rowId xmlns:a16="http://schemas.microsoft.com/office/drawing/2014/main" val="3653312017"/>
+                  </a:ext>
+                </a:extLst>
+              </a:tr>
+            </a:tbl>
+          </a:graphicData>
+        </a:graphic>
+      </p:graphicFrame>
+      <p:graphicFrame>
+        <p:nvGraphicFramePr>
+          <p:cNvPr id="10" name="Table 9">
+            <a:extLst>
+              <a:ext uri="{FF2B5EF4-FFF2-40B4-BE49-F238E27FC236}">
+                <a16:creationId xmlns:a16="http://schemas.microsoft.com/office/drawing/2014/main" id="{89A5B807-E649-4B27-B348-5E09C7A05591}"/>
+              </a:ext>
+            </a:extLst>
+          </p:cNvPr>
+          <p:cNvGraphicFramePr>
+            <a:graphicFrameLocks noGrp="1"/>
+          </p:cNvGraphicFramePr>
+          <p:nvPr>
+            <p:extLst>
+              <p:ext uri="{D42A27DB-BD31-4B8C-83A1-F6EECF244321}">
+                <p14:modId xmlns:p14="http://schemas.microsoft.com/office/powerpoint/2010/main" val="3666692122"/>
+              </p:ext>
+            </p:extLst>
+          </p:nvPr>
+        </p:nvGraphicFramePr>
+        <p:xfrm>
+          <a:off x="4725542" y="1186389"/>
+          <a:ext cx="1092203" cy="1187448"/>
+        </p:xfrm>
+        <a:graphic>
+          <a:graphicData uri="http://schemas.openxmlformats.org/drawingml/2006/table">
+            <a:tbl>
+              <a:tblPr>
+                <a:tableStyleId>{5C22544A-7EE6-4342-B048-85BDC9FD1C3A}</a:tableStyleId>
+              </a:tblPr>
+              <a:tblGrid>
+                <a:gridCol w="156029">
+                  <a:extLst>
+                    <a:ext uri="{9D8B030D-6E8A-4147-A177-3AD203B41FA5}">
+                      <a16:colId xmlns:a16="http://schemas.microsoft.com/office/drawing/2014/main" val="28804164"/>
+                    </a:ext>
+                  </a:extLst>
+                </a:gridCol>
+                <a:gridCol w="156029">
+                  <a:extLst>
+                    <a:ext uri="{9D8B030D-6E8A-4147-A177-3AD203B41FA5}">
+                      <a16:colId xmlns:a16="http://schemas.microsoft.com/office/drawing/2014/main" val="3402452667"/>
+                    </a:ext>
+                  </a:extLst>
+                </a:gridCol>
+                <a:gridCol w="156029">
+                  <a:extLst>
+                    <a:ext uri="{9D8B030D-6E8A-4147-A177-3AD203B41FA5}">
+                      <a16:colId xmlns:a16="http://schemas.microsoft.com/office/drawing/2014/main" val="2822267976"/>
+                    </a:ext>
+                  </a:extLst>
+                </a:gridCol>
+                <a:gridCol w="156029">
+                  <a:extLst>
+                    <a:ext uri="{9D8B030D-6E8A-4147-A177-3AD203B41FA5}">
+                      <a16:colId xmlns:a16="http://schemas.microsoft.com/office/drawing/2014/main" val="758336612"/>
+                    </a:ext>
+                  </a:extLst>
+                </a:gridCol>
+                <a:gridCol w="157909">
+                  <a:extLst>
+                    <a:ext uri="{9D8B030D-6E8A-4147-A177-3AD203B41FA5}">
+                      <a16:colId xmlns:a16="http://schemas.microsoft.com/office/drawing/2014/main" val="1083904867"/>
+                    </a:ext>
+                  </a:extLst>
+                </a:gridCol>
+                <a:gridCol w="154149">
+                  <a:extLst>
+                    <a:ext uri="{9D8B030D-6E8A-4147-A177-3AD203B41FA5}">
+                      <a16:colId xmlns:a16="http://schemas.microsoft.com/office/drawing/2014/main" val="518805580"/>
+                    </a:ext>
+                  </a:extLst>
+                </a:gridCol>
+                <a:gridCol w="156029">
+                  <a:extLst>
+                    <a:ext uri="{9D8B030D-6E8A-4147-A177-3AD203B41FA5}">
+                      <a16:colId xmlns:a16="http://schemas.microsoft.com/office/drawing/2014/main" val="871853914"/>
+                    </a:ext>
+                  </a:extLst>
+                </a:gridCol>
+              </a:tblGrid>
+              <a:tr h="148431">
+                <a:tc>
+                  <a:txBody>
+                    <a:bodyPr/>
+                    <a:lstStyle/>
+                    <a:p>
+                      <a:pPr algn="l" fontAlgn="b"/>
+                      <a:endParaRPr lang="en-DE" sz="800" b="0" i="0" u="none" strike="noStrike">
+                        <a:solidFill>
+                          <a:srgbClr val="000000"/>
+                        </a:solidFill>
+                        <a:effectLst/>
+                        <a:latin typeface="Courier"/>
+                      </a:endParaRPr>
+                    </a:p>
+                  </a:txBody>
+                  <a:tcPr marL="6350" marR="6350" marT="6350" marB="0" anchor="b"/>
+                </a:tc>
+                <a:tc>
+                  <a:txBody>
+                    <a:bodyPr/>
+                    <a:lstStyle/>
+                    <a:p>
+                      <a:pPr algn="l" fontAlgn="b"/>
+                      <a:endParaRPr lang="en-DE" sz="800" b="0" i="0" u="none" strike="noStrike">
+                        <a:solidFill>
+                          <a:srgbClr val="000000"/>
+                        </a:solidFill>
+                        <a:effectLst/>
+                        <a:latin typeface="Courier"/>
+                      </a:endParaRPr>
+                    </a:p>
+                  </a:txBody>
+                  <a:tcPr marL="6350" marR="6350" marT="6350" marB="0" anchor="b"/>
+                </a:tc>
+                <a:tc>
+                  <a:txBody>
+                    <a:bodyPr/>
+                    <a:lstStyle/>
+                    <a:p>
+                      <a:pPr algn="l" fontAlgn="b"/>
+                      <a:endParaRPr lang="en-DE" sz="800" b="0" i="0" u="none" strike="noStrike" dirty="0">
+                        <a:solidFill>
+                          <a:srgbClr val="000000"/>
+                        </a:solidFill>
+                        <a:effectLst/>
+                        <a:latin typeface="Courier"/>
+                      </a:endParaRPr>
+                    </a:p>
+                  </a:txBody>
+                  <a:tcPr marL="6350" marR="6350" marT="6350" marB="0" anchor="b"/>
+                </a:tc>
+                <a:tc>
+                  <a:txBody>
+                    <a:bodyPr/>
+                    <a:lstStyle/>
+                    <a:p>
+                      <a:pPr algn="l" fontAlgn="b"/>
+                      <a:endParaRPr lang="en-DE" sz="800" b="0" i="0" u="none" strike="noStrike">
+                        <a:solidFill>
+                          <a:srgbClr val="000000"/>
+                        </a:solidFill>
+                        <a:effectLst/>
+                        <a:latin typeface="Courier"/>
+                      </a:endParaRPr>
+                    </a:p>
+                  </a:txBody>
+                  <a:tcPr marL="6350" marR="6350" marT="6350" marB="0" anchor="b"/>
+                </a:tc>
+                <a:tc>
+                  <a:txBody>
+                    <a:bodyPr/>
+                    <a:lstStyle/>
+                    <a:p>
+                      <a:pPr algn="l" fontAlgn="b"/>
+                      <a:endParaRPr lang="en-DE" sz="800" b="0" i="0" u="none" strike="noStrike">
+                        <a:solidFill>
+                          <a:srgbClr val="000000"/>
+                        </a:solidFill>
+                        <a:effectLst/>
+                        <a:latin typeface="Courier"/>
+                      </a:endParaRPr>
+                    </a:p>
+                  </a:txBody>
+                  <a:tcPr marL="6350" marR="6350" marT="6350" marB="0" anchor="b"/>
+                </a:tc>
+                <a:tc>
+                  <a:txBody>
+                    <a:bodyPr/>
+                    <a:lstStyle/>
+                    <a:p>
+                      <a:pPr algn="l" fontAlgn="b"/>
+                      <a:endParaRPr lang="en-DE" sz="800" b="0" i="0" u="none" strike="noStrike">
+                        <a:solidFill>
+                          <a:srgbClr val="000000"/>
+                        </a:solidFill>
+                        <a:effectLst/>
+                        <a:latin typeface="Courier"/>
+                      </a:endParaRPr>
+                    </a:p>
+                  </a:txBody>
+                  <a:tcPr marL="6350" marR="6350" marT="6350" marB="0" anchor="b"/>
+                </a:tc>
+                <a:tc>
+                  <a:txBody>
+                    <a:bodyPr/>
+                    <a:lstStyle/>
+                    <a:p>
+                      <a:pPr algn="l" fontAlgn="b"/>
+                      <a:endParaRPr lang="en-DE" sz="800" b="0" i="0" u="none" strike="noStrike">
+                        <a:solidFill>
+                          <a:srgbClr val="000000"/>
+                        </a:solidFill>
+                        <a:effectLst/>
+                        <a:latin typeface="Courier"/>
+                      </a:endParaRPr>
+                    </a:p>
+                  </a:txBody>
+                  <a:tcPr marL="6350" marR="6350" marT="6350" marB="0" anchor="b"/>
+                </a:tc>
+                <a:extLst>
+                  <a:ext uri="{0D108BD9-81ED-4DB2-BD59-A6C34878D82A}">
+                    <a16:rowId xmlns:a16="http://schemas.microsoft.com/office/drawing/2014/main" val="1078223716"/>
+                  </a:ext>
+                </a:extLst>
+              </a:tr>
+              <a:tr h="148431">
+                <a:tc>
+                  <a:txBody>
+                    <a:bodyPr/>
+                    <a:lstStyle/>
+                    <a:p>
+                      <a:pPr algn="l" fontAlgn="b"/>
+                      <a:endParaRPr lang="en-DE" sz="800" b="0" i="0" u="none" strike="noStrike">
+                        <a:solidFill>
+                          <a:srgbClr val="000000"/>
+                        </a:solidFill>
+                        <a:effectLst/>
+                        <a:latin typeface="Courier"/>
+                      </a:endParaRPr>
+                    </a:p>
+                  </a:txBody>
+                  <a:tcPr marL="6350" marR="6350" marT="6350" marB="0" anchor="b"/>
+                </a:tc>
+                <a:tc>
+                  <a:txBody>
+                    <a:bodyPr/>
+                    <a:lstStyle/>
+                    <a:p>
+                      <a:pPr algn="ctr" fontAlgn="b"/>
+                      <a:endParaRPr lang="en-DE" sz="800" b="1" i="0" u="none" strike="noStrike" dirty="0">
+                        <a:solidFill>
+                          <a:srgbClr val="000000"/>
+                        </a:solidFill>
+                        <a:effectLst/>
+                        <a:latin typeface="Courier"/>
+                      </a:endParaRPr>
+                    </a:p>
+                  </a:txBody>
+                  <a:tcPr marL="6350" marR="6350" marT="6350" marB="0" anchor="b"/>
+                </a:tc>
+                <a:tc>
+                  <a:txBody>
+                    <a:bodyPr/>
+                    <a:lstStyle/>
+                    <a:p>
+                      <a:pPr algn="ctr" fontAlgn="b"/>
+                      <a:endParaRPr lang="en-DE" sz="800" b="1" i="0" u="none" strike="noStrike" dirty="0">
+                        <a:solidFill>
+                          <a:srgbClr val="000000"/>
+                        </a:solidFill>
+                        <a:effectLst/>
+                        <a:latin typeface="Courier"/>
+                      </a:endParaRPr>
+                    </a:p>
+                  </a:txBody>
+                  <a:tcPr marL="6350" marR="6350" marT="6350" marB="0" anchor="b"/>
+                </a:tc>
+                <a:tc>
+                  <a:txBody>
+                    <a:bodyPr/>
+                    <a:lstStyle/>
+                    <a:p>
+                      <a:pPr algn="ctr" fontAlgn="b"/>
+                      <a:endParaRPr lang="en-DE" sz="800" b="1" i="0" u="none" strike="noStrike">
+                        <a:solidFill>
+                          <a:srgbClr val="000000"/>
+                        </a:solidFill>
+                        <a:effectLst/>
+                        <a:latin typeface="Courier"/>
+                      </a:endParaRPr>
+                    </a:p>
+                  </a:txBody>
+                  <a:tcPr marL="6350" marR="6350" marT="6350" marB="0" anchor="b"/>
+                </a:tc>
+                <a:tc>
+                  <a:txBody>
+                    <a:bodyPr/>
+                    <a:lstStyle/>
+                    <a:p>
+                      <a:pPr algn="ctr" fontAlgn="b"/>
+                      <a:endParaRPr lang="en-DE" sz="800" b="1" i="0" u="none" strike="noStrike">
+                        <a:solidFill>
+                          <a:srgbClr val="000000"/>
+                        </a:solidFill>
+                        <a:effectLst/>
+                        <a:latin typeface="Courier"/>
+                      </a:endParaRPr>
+                    </a:p>
+                  </a:txBody>
+                  <a:tcPr marL="6350" marR="6350" marT="6350" marB="0" anchor="b"/>
+                </a:tc>
+                <a:tc>
+                  <a:txBody>
+                    <a:bodyPr/>
+                    <a:lstStyle/>
+                    <a:p>
+                      <a:pPr algn="ctr" fontAlgn="b"/>
+                      <a:endParaRPr lang="en-DE" sz="800" b="1" i="0" u="none" strike="noStrike">
+                        <a:solidFill>
+                          <a:srgbClr val="000000"/>
+                        </a:solidFill>
+                        <a:effectLst/>
+                        <a:latin typeface="Courier"/>
+                      </a:endParaRPr>
+                    </a:p>
+                  </a:txBody>
+                  <a:tcPr marL="6350" marR="6350" marT="6350" marB="0" anchor="b"/>
+                </a:tc>
+                <a:tc>
+                  <a:txBody>
+                    <a:bodyPr/>
+                    <a:lstStyle/>
+                    <a:p>
+                      <a:pPr algn="l" fontAlgn="b"/>
+                      <a:endParaRPr lang="en-DE" sz="800" b="0" i="0" u="none" strike="noStrike">
+                        <a:solidFill>
+                          <a:srgbClr val="000000"/>
+                        </a:solidFill>
+                        <a:effectLst/>
+                        <a:latin typeface="Courier"/>
+                      </a:endParaRPr>
+                    </a:p>
+                  </a:txBody>
+                  <a:tcPr marL="6350" marR="6350" marT="6350" marB="0" anchor="b"/>
+                </a:tc>
+                <a:extLst>
+                  <a:ext uri="{0D108BD9-81ED-4DB2-BD59-A6C34878D82A}">
+                    <a16:rowId xmlns:a16="http://schemas.microsoft.com/office/drawing/2014/main" val="3342974667"/>
+                  </a:ext>
+                </a:extLst>
+              </a:tr>
+              <a:tr h="148431">
+                <a:tc>
+                  <a:txBody>
+                    <a:bodyPr/>
+                    <a:lstStyle/>
+                    <a:p>
+                      <a:pPr algn="l" fontAlgn="b"/>
+                      <a:endParaRPr lang="en-DE" sz="800" b="0" i="0" u="none" strike="noStrike">
+                        <a:solidFill>
+                          <a:srgbClr val="000000"/>
+                        </a:solidFill>
+                        <a:effectLst/>
+                        <a:latin typeface="Courier"/>
+                      </a:endParaRPr>
+                    </a:p>
+                  </a:txBody>
+                  <a:tcPr marL="6350" marR="6350" marT="6350" marB="0" anchor="b"/>
+                </a:tc>
+                <a:tc>
+                  <a:txBody>
+                    <a:bodyPr/>
+                    <a:lstStyle/>
+                    <a:p>
+                      <a:pPr algn="ctr" fontAlgn="b"/>
+                      <a:endParaRPr lang="en-DE" sz="800" b="1" i="0" u="none" strike="noStrike" dirty="0">
+                        <a:solidFill>
+                          <a:srgbClr val="000000"/>
+                        </a:solidFill>
+                        <a:effectLst/>
+                        <a:latin typeface="Courier"/>
+                      </a:endParaRPr>
+                    </a:p>
+                  </a:txBody>
+                  <a:tcPr marL="6350" marR="6350" marT="6350" marB="0" anchor="b"/>
+                </a:tc>
+                <a:tc>
+                  <a:txBody>
+                    <a:bodyPr/>
+                    <a:lstStyle/>
+                    <a:p>
+                      <a:pPr algn="ctr" fontAlgn="b"/>
+                      <a:endParaRPr lang="en-DE" sz="800" b="1" i="0" u="none" strike="noStrike" dirty="0">
+                        <a:solidFill>
+                          <a:srgbClr val="000000"/>
+                        </a:solidFill>
+                        <a:effectLst/>
+                        <a:latin typeface="Courier"/>
+                      </a:endParaRPr>
+                    </a:p>
+                  </a:txBody>
+                  <a:tcPr marL="6350" marR="6350" marT="6350" marB="0" anchor="b"/>
+                </a:tc>
+                <a:tc>
+                  <a:txBody>
+                    <a:bodyPr/>
+                    <a:lstStyle/>
+                    <a:p>
+                      <a:pPr algn="ctr" fontAlgn="b"/>
+                      <a:endParaRPr lang="en-DE" sz="800" b="1" i="0" u="none" strike="noStrike" dirty="0">
+                        <a:solidFill>
+                          <a:srgbClr val="000000"/>
+                        </a:solidFill>
+                        <a:effectLst/>
+                        <a:latin typeface="Courier"/>
+                      </a:endParaRPr>
+                    </a:p>
+                  </a:txBody>
+                  <a:tcPr marL="6350" marR="6350" marT="6350" marB="0" anchor="b"/>
+                </a:tc>
+                <a:tc>
+                  <a:txBody>
+                    <a:bodyPr/>
+                    <a:lstStyle/>
+                    <a:p>
+                      <a:pPr algn="ctr" fontAlgn="b"/>
+                      <a:endParaRPr lang="en-DE" sz="800" b="1" i="0" u="none" strike="noStrike">
+                        <a:solidFill>
+                          <a:srgbClr val="000000"/>
+                        </a:solidFill>
+                        <a:effectLst/>
+                        <a:latin typeface="Courier"/>
+                      </a:endParaRPr>
+                    </a:p>
+                  </a:txBody>
+                  <a:tcPr marL="6350" marR="6350" marT="6350" marB="0" anchor="b"/>
+                </a:tc>
+                <a:tc>
+                  <a:txBody>
+                    <a:bodyPr/>
+                    <a:lstStyle/>
+                    <a:p>
+                      <a:pPr algn="ctr" fontAlgn="b"/>
+                      <a:endParaRPr lang="en-DE" sz="800" b="1" i="0" u="none" strike="noStrike">
+                        <a:solidFill>
+                          <a:srgbClr val="000000"/>
+                        </a:solidFill>
+                        <a:effectLst/>
+                        <a:latin typeface="Courier"/>
+                      </a:endParaRPr>
+                    </a:p>
+                  </a:txBody>
+                  <a:tcPr marL="6350" marR="6350" marT="6350" marB="0" anchor="b"/>
+                </a:tc>
+                <a:tc>
+                  <a:txBody>
+                    <a:bodyPr/>
+                    <a:lstStyle/>
+                    <a:p>
+                      <a:pPr algn="l" fontAlgn="b"/>
+                      <a:endParaRPr lang="en-DE" sz="800" b="0" i="0" u="none" strike="noStrike">
+                        <a:solidFill>
+                          <a:srgbClr val="000000"/>
+                        </a:solidFill>
+                        <a:effectLst/>
+                        <a:latin typeface="Courier"/>
+                      </a:endParaRPr>
+                    </a:p>
+                  </a:txBody>
+                  <a:tcPr marL="6350" marR="6350" marT="6350" marB="0" anchor="b"/>
+                </a:tc>
+                <a:extLst>
+                  <a:ext uri="{0D108BD9-81ED-4DB2-BD59-A6C34878D82A}">
+                    <a16:rowId xmlns:a16="http://schemas.microsoft.com/office/drawing/2014/main" val="736121480"/>
+                  </a:ext>
+                </a:extLst>
+              </a:tr>
+              <a:tr h="148431">
+                <a:tc>
+                  <a:txBody>
+                    <a:bodyPr/>
+                    <a:lstStyle/>
+                    <a:p>
+                      <a:pPr algn="l" fontAlgn="b"/>
+                      <a:endParaRPr lang="en-DE" sz="800" b="0" i="0" u="none" strike="noStrike">
+                        <a:solidFill>
+                          <a:srgbClr val="000000"/>
+                        </a:solidFill>
+                        <a:effectLst/>
+                        <a:latin typeface="Courier"/>
+                      </a:endParaRPr>
+                    </a:p>
+                  </a:txBody>
+                  <a:tcPr marL="6350" marR="6350" marT="6350" marB="0" anchor="b"/>
+                </a:tc>
+                <a:tc>
+                  <a:txBody>
+                    <a:bodyPr/>
+                    <a:lstStyle/>
+                    <a:p>
+                      <a:pPr algn="ctr" fontAlgn="b"/>
+                      <a:endParaRPr lang="en-DE" sz="800" b="1" i="0" u="none" strike="noStrike">
+                        <a:solidFill>
+                          <a:srgbClr val="000000"/>
+                        </a:solidFill>
+                        <a:effectLst/>
+                        <a:latin typeface="Courier"/>
+                      </a:endParaRPr>
+                    </a:p>
+                  </a:txBody>
+                  <a:tcPr marL="6350" marR="6350" marT="6350" marB="0" anchor="b"/>
+                </a:tc>
+                <a:tc>
+                  <a:txBody>
+                    <a:bodyPr/>
+                    <a:lstStyle/>
+                    <a:p>
+                      <a:pPr algn="ctr" fontAlgn="b"/>
+                      <a:endParaRPr lang="en-DE" sz="800" b="1" i="0" u="none" strike="noStrike">
+                        <a:solidFill>
+                          <a:srgbClr val="000000"/>
+                        </a:solidFill>
+                        <a:effectLst/>
+                        <a:latin typeface="Courier"/>
+                      </a:endParaRPr>
+                    </a:p>
+                  </a:txBody>
+                  <a:tcPr marL="6350" marR="6350" marT="6350" marB="0" anchor="b"/>
+                </a:tc>
+                <a:tc>
+                  <a:txBody>
+                    <a:bodyPr/>
+                    <a:lstStyle/>
+                    <a:p>
+                      <a:pPr marL="0" marR="0" lvl="0" indent="0" algn="ctr" defTabSz="914400" rtl="0" eaLnBrk="1" fontAlgn="b" latinLnBrk="0" hangingPunct="1">
+                        <a:lnSpc>
+                          <a:spcPct val="100000"/>
+                        </a:lnSpc>
+                        <a:spcBef>
+                          <a:spcPts val="0"/>
+                        </a:spcBef>
+                        <a:spcAft>
+                          <a:spcPts val="0"/>
+                        </a:spcAft>
+                        <a:buClrTx/>
+                        <a:buSzTx/>
+                        <a:buFontTx/>
+                        <a:buNone/>
+                        <a:tabLst/>
+                        <a:defRPr/>
+                      </a:pPr>
+                      <a:r>
+                        <a:rPr lang="en-US" sz="800" b="1" i="0" u="none" strike="noStrike" dirty="0">
+                          <a:solidFill>
+                            <a:srgbClr val="FF0000"/>
+                          </a:solidFill>
+                          <a:effectLst/>
+                          <a:latin typeface="Courier"/>
+                        </a:rPr>
+                        <a:t>X</a:t>
+                      </a:r>
+                      <a:endParaRPr lang="en-DE" sz="800" b="1" i="0" u="none" strike="noStrike" dirty="0">
+                        <a:solidFill>
+                          <a:srgbClr val="FF0000"/>
+                        </a:solidFill>
+                        <a:effectLst/>
+                        <a:latin typeface="Courier"/>
+                      </a:endParaRPr>
+                    </a:p>
+                  </a:txBody>
+                  <a:tcPr marL="6350" marR="6350" marT="6350" marB="0" anchor="b">
+                    <a:solidFill>
+                      <a:schemeClr val="accent2">
+                        <a:lumMod val="40000"/>
+                        <a:lumOff val="60000"/>
+                      </a:schemeClr>
+                    </a:solidFill>
+                  </a:tcPr>
+                </a:tc>
+                <a:tc>
+                  <a:txBody>
+                    <a:bodyPr/>
+                    <a:lstStyle/>
+                    <a:p>
+                      <a:pPr algn="ctr" fontAlgn="b"/>
+                      <a:endParaRPr lang="en-DE" sz="800" b="1" i="0" u="none" strike="noStrike" dirty="0">
+                        <a:solidFill>
+                          <a:srgbClr val="000000"/>
+                        </a:solidFill>
+                        <a:effectLst/>
+                        <a:latin typeface="Courier"/>
+                      </a:endParaRPr>
+                    </a:p>
+                  </a:txBody>
+                  <a:tcPr marL="6350" marR="6350" marT="6350" marB="0" anchor="b"/>
+                </a:tc>
+                <a:tc>
+                  <a:txBody>
+                    <a:bodyPr/>
+                    <a:lstStyle/>
+                    <a:p>
+                      <a:pPr algn="ctr" fontAlgn="b"/>
+                      <a:endParaRPr lang="en-DE" sz="800" b="1" i="0" u="none" strike="noStrike" dirty="0">
+                        <a:solidFill>
+                          <a:srgbClr val="000000"/>
+                        </a:solidFill>
+                        <a:effectLst/>
+                        <a:latin typeface="Courier"/>
+                      </a:endParaRPr>
+                    </a:p>
+                  </a:txBody>
+                  <a:tcPr marL="6350" marR="6350" marT="6350" marB="0" anchor="b"/>
+                </a:tc>
+                <a:tc>
+                  <a:txBody>
+                    <a:bodyPr/>
+                    <a:lstStyle/>
+                    <a:p>
+                      <a:pPr algn="l" fontAlgn="b"/>
+                      <a:endParaRPr lang="en-DE" sz="800" b="0" i="0" u="none" strike="noStrike">
+                        <a:solidFill>
+                          <a:srgbClr val="000000"/>
+                        </a:solidFill>
+                        <a:effectLst/>
+                        <a:latin typeface="Courier"/>
+                      </a:endParaRPr>
+                    </a:p>
+                  </a:txBody>
+                  <a:tcPr marL="6350" marR="6350" marT="6350" marB="0" anchor="b"/>
+                </a:tc>
+                <a:extLst>
+                  <a:ext uri="{0D108BD9-81ED-4DB2-BD59-A6C34878D82A}">
+                    <a16:rowId xmlns:a16="http://schemas.microsoft.com/office/drawing/2014/main" val="2968588688"/>
+                  </a:ext>
+                </a:extLst>
+              </a:tr>
+              <a:tr h="148431">
+                <a:tc>
+                  <a:txBody>
+                    <a:bodyPr/>
+                    <a:lstStyle/>
+                    <a:p>
+                      <a:pPr algn="l" fontAlgn="b"/>
+                      <a:endParaRPr lang="en-DE" sz="800" b="0" i="0" u="none" strike="noStrike">
+                        <a:solidFill>
+                          <a:srgbClr val="000000"/>
+                        </a:solidFill>
+                        <a:effectLst/>
+                        <a:latin typeface="Courier"/>
+                      </a:endParaRPr>
+                    </a:p>
+                  </a:txBody>
+                  <a:tcPr marL="6350" marR="6350" marT="6350" marB="0" anchor="b"/>
+                </a:tc>
+                <a:tc>
+                  <a:txBody>
+                    <a:bodyPr/>
+                    <a:lstStyle/>
+                    <a:p>
+                      <a:pPr algn="ctr" fontAlgn="b"/>
+                      <a:endParaRPr lang="en-DE" sz="800" b="1" i="0" u="none" strike="noStrike">
+                        <a:solidFill>
+                          <a:srgbClr val="000000"/>
+                        </a:solidFill>
+                        <a:effectLst/>
+                        <a:latin typeface="Courier"/>
+                      </a:endParaRPr>
+                    </a:p>
+                  </a:txBody>
+                  <a:tcPr marL="6350" marR="6350" marT="6350" marB="0" anchor="b"/>
+                </a:tc>
+                <a:tc>
+                  <a:txBody>
+                    <a:bodyPr/>
+                    <a:lstStyle/>
+                    <a:p>
+                      <a:pPr algn="ctr" fontAlgn="b"/>
+                      <a:endParaRPr lang="en-DE" sz="800" b="1" i="0" u="none" strike="noStrike">
+                        <a:solidFill>
+                          <a:srgbClr val="000000"/>
+                        </a:solidFill>
+                        <a:effectLst/>
+                        <a:latin typeface="Courier"/>
+                      </a:endParaRPr>
+                    </a:p>
+                  </a:txBody>
+                  <a:tcPr marL="6350" marR="6350" marT="6350" marB="0" anchor="b"/>
+                </a:tc>
+                <a:tc>
+                  <a:txBody>
+                    <a:bodyPr/>
+                    <a:lstStyle/>
+                    <a:p>
+                      <a:pPr algn="ctr" fontAlgn="b"/>
+                      <a:endParaRPr lang="en-DE" sz="800" b="1" i="0" u="none" strike="noStrike">
+                        <a:solidFill>
+                          <a:srgbClr val="000000"/>
+                        </a:solidFill>
+                        <a:effectLst/>
+                        <a:latin typeface="Courier"/>
+                      </a:endParaRPr>
+                    </a:p>
+                  </a:txBody>
+                  <a:tcPr marL="6350" marR="6350" marT="6350" marB="0" anchor="b"/>
+                </a:tc>
+                <a:tc>
+                  <a:txBody>
+                    <a:bodyPr/>
+                    <a:lstStyle/>
+                    <a:p>
+                      <a:pPr algn="ctr" fontAlgn="b"/>
+                      <a:endParaRPr lang="en-DE" sz="800" b="1" i="0" u="none" strike="noStrike" dirty="0">
+                        <a:solidFill>
+                          <a:srgbClr val="000000"/>
+                        </a:solidFill>
+                        <a:effectLst/>
+                        <a:latin typeface="Courier"/>
+                      </a:endParaRPr>
+                    </a:p>
+                  </a:txBody>
+                  <a:tcPr marL="6350" marR="6350" marT="6350" marB="0" anchor="b"/>
+                </a:tc>
+                <a:tc>
+                  <a:txBody>
+                    <a:bodyPr/>
+                    <a:lstStyle/>
+                    <a:p>
+                      <a:pPr algn="ctr" fontAlgn="b"/>
+                      <a:endParaRPr lang="en-DE" sz="800" b="1" i="0" u="none" strike="noStrike" dirty="0">
+                        <a:solidFill>
+                          <a:srgbClr val="000000"/>
+                        </a:solidFill>
+                        <a:effectLst/>
+                        <a:latin typeface="Courier"/>
+                      </a:endParaRPr>
+                    </a:p>
+                  </a:txBody>
+                  <a:tcPr marL="6350" marR="6350" marT="6350" marB="0" anchor="b"/>
+                </a:tc>
+                <a:tc>
+                  <a:txBody>
+                    <a:bodyPr/>
+                    <a:lstStyle/>
+                    <a:p>
+                      <a:pPr algn="l" fontAlgn="b"/>
+                      <a:endParaRPr lang="en-DE" sz="800" b="0" i="0" u="none" strike="noStrike">
+                        <a:solidFill>
+                          <a:srgbClr val="000000"/>
+                        </a:solidFill>
+                        <a:effectLst/>
+                        <a:latin typeface="Courier"/>
+                      </a:endParaRPr>
+                    </a:p>
+                  </a:txBody>
+                  <a:tcPr marL="6350" marR="6350" marT="6350" marB="0" anchor="b"/>
+                </a:tc>
+                <a:extLst>
+                  <a:ext uri="{0D108BD9-81ED-4DB2-BD59-A6C34878D82A}">
+                    <a16:rowId xmlns:a16="http://schemas.microsoft.com/office/drawing/2014/main" val="1128576129"/>
+                  </a:ext>
+                </a:extLst>
+              </a:tr>
+              <a:tr h="148431">
+                <a:tc>
+                  <a:txBody>
+                    <a:bodyPr/>
+                    <a:lstStyle/>
+                    <a:p>
+                      <a:pPr algn="l" fontAlgn="b"/>
+                      <a:endParaRPr lang="en-DE" sz="800" b="0" i="0" u="none" strike="noStrike">
+                        <a:solidFill>
+                          <a:srgbClr val="000000"/>
+                        </a:solidFill>
+                        <a:effectLst/>
+                        <a:latin typeface="Courier"/>
+                      </a:endParaRPr>
+                    </a:p>
+                  </a:txBody>
+                  <a:tcPr marL="6350" marR="6350" marT="6350" marB="0" anchor="b"/>
+                </a:tc>
+                <a:tc>
+                  <a:txBody>
+                    <a:bodyPr/>
+                    <a:lstStyle/>
+                    <a:p>
+                      <a:pPr algn="ctr" fontAlgn="b"/>
+                      <a:endParaRPr lang="en-DE" sz="800" b="1" i="0" u="none" strike="noStrike">
+                        <a:solidFill>
+                          <a:srgbClr val="000000"/>
+                        </a:solidFill>
+                        <a:effectLst/>
+                        <a:latin typeface="Courier"/>
+                      </a:endParaRPr>
+                    </a:p>
+                  </a:txBody>
+                  <a:tcPr marL="6350" marR="6350" marT="6350" marB="0" anchor="b"/>
+                </a:tc>
+                <a:tc>
+                  <a:txBody>
+                    <a:bodyPr/>
+                    <a:lstStyle/>
+                    <a:p>
+                      <a:pPr algn="ctr" fontAlgn="b"/>
+                      <a:endParaRPr lang="en-DE" sz="800" b="1" i="0" u="none" strike="noStrike" dirty="0">
+                        <a:solidFill>
+                          <a:srgbClr val="000000"/>
+                        </a:solidFill>
+                        <a:effectLst/>
+                        <a:latin typeface="Courier"/>
+                      </a:endParaRPr>
+                    </a:p>
+                  </a:txBody>
+                  <a:tcPr marL="6350" marR="6350" marT="6350" marB="0" anchor="b"/>
+                </a:tc>
+                <a:tc>
+                  <a:txBody>
+                    <a:bodyPr/>
+                    <a:lstStyle/>
+                    <a:p>
+                      <a:pPr algn="ctr" fontAlgn="b"/>
+                      <a:endParaRPr lang="en-DE" sz="800" b="1" i="0" u="none" strike="noStrike">
+                        <a:solidFill>
+                          <a:srgbClr val="000000"/>
+                        </a:solidFill>
+                        <a:effectLst/>
+                        <a:latin typeface="Courier"/>
+                      </a:endParaRPr>
+                    </a:p>
+                  </a:txBody>
+                  <a:tcPr marL="6350" marR="6350" marT="6350" marB="0" anchor="b"/>
+                </a:tc>
+                <a:tc>
+                  <a:txBody>
+                    <a:bodyPr/>
+                    <a:lstStyle/>
+                    <a:p>
+                      <a:pPr algn="ctr" fontAlgn="b"/>
+                      <a:endParaRPr lang="en-DE" sz="800" b="1" i="0" u="none" strike="noStrike" dirty="0">
+                        <a:solidFill>
+                          <a:srgbClr val="000000"/>
+                        </a:solidFill>
+                        <a:effectLst/>
+                        <a:latin typeface="Courier"/>
+                      </a:endParaRPr>
+                    </a:p>
+                  </a:txBody>
+                  <a:tcPr marL="6350" marR="6350" marT="6350" marB="0" anchor="b"/>
+                </a:tc>
+                <a:tc>
+                  <a:txBody>
+                    <a:bodyPr/>
+                    <a:lstStyle/>
+                    <a:p>
+                      <a:pPr algn="ctr" fontAlgn="b"/>
+                      <a:endParaRPr lang="en-DE" sz="800" b="1" i="0" u="none" strike="noStrike" dirty="0">
+                        <a:solidFill>
+                          <a:srgbClr val="000000"/>
+                        </a:solidFill>
+                        <a:effectLst/>
+                        <a:latin typeface="Courier"/>
+                      </a:endParaRPr>
+                    </a:p>
+                  </a:txBody>
+                  <a:tcPr marL="6350" marR="6350" marT="6350" marB="0" anchor="b"/>
+                </a:tc>
+                <a:tc>
+                  <a:txBody>
+                    <a:bodyPr/>
+                    <a:lstStyle/>
+                    <a:p>
+                      <a:pPr algn="l" fontAlgn="b"/>
+                      <a:endParaRPr lang="en-DE" sz="800" b="0" i="0" u="none" strike="noStrike">
+                        <a:solidFill>
+                          <a:srgbClr val="000000"/>
+                        </a:solidFill>
+                        <a:effectLst/>
+                        <a:latin typeface="Courier"/>
+                      </a:endParaRPr>
+                    </a:p>
+                  </a:txBody>
+                  <a:tcPr marL="6350" marR="6350" marT="6350" marB="0" anchor="b"/>
+                </a:tc>
+                <a:extLst>
+                  <a:ext uri="{0D108BD9-81ED-4DB2-BD59-A6C34878D82A}">
+                    <a16:rowId xmlns:a16="http://schemas.microsoft.com/office/drawing/2014/main" val="3659823931"/>
+                  </a:ext>
+                </a:extLst>
+              </a:tr>
+              <a:tr h="148431">
+                <a:tc>
+                  <a:txBody>
+                    <a:bodyPr/>
+                    <a:lstStyle/>
+                    <a:p>
+                      <a:pPr algn="l" fontAlgn="b"/>
+                      <a:endParaRPr lang="en-DE" sz="800" b="0" i="0" u="none" strike="noStrike">
+                        <a:solidFill>
+                          <a:srgbClr val="000000"/>
+                        </a:solidFill>
+                        <a:effectLst/>
+                        <a:latin typeface="Courier"/>
+                      </a:endParaRPr>
+                    </a:p>
+                  </a:txBody>
+                  <a:tcPr marL="6350" marR="6350" marT="6350" marB="0" anchor="b"/>
+                </a:tc>
+                <a:tc>
+                  <a:txBody>
+                    <a:bodyPr/>
+                    <a:lstStyle/>
+                    <a:p>
+                      <a:pPr algn="l" fontAlgn="b"/>
+                      <a:endParaRPr lang="en-DE" sz="800" b="0" i="0" u="none" strike="noStrike">
+                        <a:solidFill>
+                          <a:srgbClr val="000000"/>
+                        </a:solidFill>
+                        <a:effectLst/>
+                        <a:latin typeface="Courier"/>
+                      </a:endParaRPr>
+                    </a:p>
+                  </a:txBody>
+                  <a:tcPr marL="6350" marR="6350" marT="6350" marB="0" anchor="b"/>
+                </a:tc>
+                <a:tc>
+                  <a:txBody>
+                    <a:bodyPr/>
+                    <a:lstStyle/>
+                    <a:p>
+                      <a:pPr algn="l" fontAlgn="b"/>
+                      <a:endParaRPr lang="en-DE" sz="800" b="0" i="0" u="none" strike="noStrike">
+                        <a:solidFill>
+                          <a:srgbClr val="000000"/>
+                        </a:solidFill>
+                        <a:effectLst/>
+                        <a:latin typeface="Courier"/>
+                      </a:endParaRPr>
+                    </a:p>
+                  </a:txBody>
+                  <a:tcPr marL="6350" marR="6350" marT="6350" marB="0" anchor="b"/>
+                </a:tc>
+                <a:tc>
+                  <a:txBody>
+                    <a:bodyPr/>
+                    <a:lstStyle/>
+                    <a:p>
+                      <a:pPr algn="l" fontAlgn="b"/>
+                      <a:endParaRPr lang="en-DE" sz="800" b="0" i="0" u="none" strike="noStrike">
+                        <a:solidFill>
+                          <a:srgbClr val="000000"/>
+                        </a:solidFill>
+                        <a:effectLst/>
+                        <a:latin typeface="Courier"/>
+                      </a:endParaRPr>
+                    </a:p>
+                  </a:txBody>
+                  <a:tcPr marL="6350" marR="6350" marT="6350" marB="0" anchor="b"/>
+                </a:tc>
+                <a:tc>
+                  <a:txBody>
+                    <a:bodyPr/>
+                    <a:lstStyle/>
+                    <a:p>
+                      <a:pPr algn="l" fontAlgn="b"/>
+                      <a:endParaRPr lang="en-DE" sz="800" b="0" i="0" u="none" strike="noStrike" dirty="0">
+                        <a:solidFill>
+                          <a:srgbClr val="000000"/>
+                        </a:solidFill>
+                        <a:effectLst/>
+                        <a:latin typeface="Courier"/>
+                      </a:endParaRPr>
+                    </a:p>
+                  </a:txBody>
+                  <a:tcPr marL="6350" marR="6350" marT="6350" marB="0" anchor="b"/>
+                </a:tc>
+                <a:tc>
+                  <a:txBody>
+                    <a:bodyPr/>
+                    <a:lstStyle/>
+                    <a:p>
+                      <a:pPr algn="l" fontAlgn="b"/>
+                      <a:endParaRPr lang="en-DE" sz="800" b="0" i="0" u="none" strike="noStrike" dirty="0">
+                        <a:solidFill>
+                          <a:srgbClr val="000000"/>
+                        </a:solidFill>
+                        <a:effectLst/>
+                        <a:latin typeface="Courier"/>
+                      </a:endParaRPr>
+                    </a:p>
+                  </a:txBody>
+                  <a:tcPr marL="6350" marR="6350" marT="6350" marB="0" anchor="b"/>
+                </a:tc>
+                <a:tc>
+                  <a:txBody>
+                    <a:bodyPr/>
+                    <a:lstStyle/>
+                    <a:p>
+                      <a:pPr algn="l" fontAlgn="b"/>
+                      <a:endParaRPr lang="en-DE" sz="800" b="0" i="0" u="none" strike="noStrike">
+                        <a:solidFill>
+                          <a:srgbClr val="000000"/>
+                        </a:solidFill>
+                        <a:effectLst/>
+                        <a:latin typeface="Courier"/>
+                      </a:endParaRPr>
+                    </a:p>
+                  </a:txBody>
+                  <a:tcPr marL="6350" marR="6350" marT="6350" marB="0" anchor="b"/>
+                </a:tc>
+                <a:extLst>
+                  <a:ext uri="{0D108BD9-81ED-4DB2-BD59-A6C34878D82A}">
+                    <a16:rowId xmlns:a16="http://schemas.microsoft.com/office/drawing/2014/main" val="524604145"/>
+                  </a:ext>
+                </a:extLst>
+              </a:tr>
+              <a:tr h="148431">
+                <a:tc>
+                  <a:txBody>
+                    <a:bodyPr/>
+                    <a:lstStyle/>
+                    <a:p>
+                      <a:pPr algn="l" fontAlgn="b"/>
+                      <a:endParaRPr lang="en-DE" sz="800" b="0" i="0" u="none" strike="noStrike">
+                        <a:solidFill>
+                          <a:srgbClr val="000000"/>
+                        </a:solidFill>
+                        <a:effectLst/>
+                        <a:latin typeface="Courier"/>
+                      </a:endParaRPr>
+                    </a:p>
+                  </a:txBody>
+                  <a:tcPr marL="6350" marR="6350" marT="6350" marB="0" anchor="b"/>
+                </a:tc>
+                <a:tc>
+                  <a:txBody>
+                    <a:bodyPr/>
+                    <a:lstStyle/>
+                    <a:p>
+                      <a:pPr algn="l" fontAlgn="b"/>
+                      <a:endParaRPr lang="en-DE" sz="800" b="0" i="0" u="none" strike="noStrike">
+                        <a:solidFill>
+                          <a:srgbClr val="000000"/>
+                        </a:solidFill>
+                        <a:effectLst/>
+                        <a:latin typeface="Courier"/>
+                      </a:endParaRPr>
+                    </a:p>
+                  </a:txBody>
+                  <a:tcPr marL="6350" marR="6350" marT="6350" marB="0" anchor="b"/>
+                </a:tc>
+                <a:tc>
+                  <a:txBody>
+                    <a:bodyPr/>
+                    <a:lstStyle/>
+                    <a:p>
+                      <a:pPr algn="l" fontAlgn="b"/>
+                      <a:endParaRPr lang="en-DE" sz="800" b="0" i="0" u="none" strike="noStrike">
+                        <a:solidFill>
+                          <a:srgbClr val="000000"/>
+                        </a:solidFill>
+                        <a:effectLst/>
+                        <a:latin typeface="Courier"/>
+                      </a:endParaRPr>
+                    </a:p>
+                  </a:txBody>
+                  <a:tcPr marL="6350" marR="6350" marT="6350" marB="0" anchor="b"/>
+                </a:tc>
+                <a:tc>
+                  <a:txBody>
+                    <a:bodyPr/>
+                    <a:lstStyle/>
+                    <a:p>
+                      <a:pPr algn="l" fontAlgn="b"/>
+                      <a:endParaRPr lang="en-DE" sz="800" b="0" i="0" u="none" strike="noStrike">
+                        <a:solidFill>
+                          <a:srgbClr val="000000"/>
+                        </a:solidFill>
+                        <a:effectLst/>
+                        <a:latin typeface="Courier"/>
+                      </a:endParaRPr>
+                    </a:p>
+                  </a:txBody>
+                  <a:tcPr marL="6350" marR="6350" marT="6350" marB="0" anchor="b"/>
+                </a:tc>
+                <a:tc>
+                  <a:txBody>
+                    <a:bodyPr/>
+                    <a:lstStyle/>
+                    <a:p>
+                      <a:pPr algn="l" fontAlgn="b"/>
+                      <a:endParaRPr lang="en-DE" sz="800" b="0" i="0" u="none" strike="noStrike">
+                        <a:solidFill>
+                          <a:srgbClr val="000000"/>
+                        </a:solidFill>
+                        <a:effectLst/>
+                        <a:latin typeface="Courier"/>
+                      </a:endParaRPr>
+                    </a:p>
+                  </a:txBody>
+                  <a:tcPr marL="6350" marR="6350" marT="6350" marB="0" anchor="b"/>
+                </a:tc>
+                <a:tc>
+                  <a:txBody>
+                    <a:bodyPr/>
+                    <a:lstStyle/>
+                    <a:p>
+                      <a:pPr algn="l" fontAlgn="b"/>
+                      <a:endParaRPr lang="en-DE" sz="800" b="0" i="0" u="none" strike="noStrike">
+                        <a:solidFill>
+                          <a:srgbClr val="000000"/>
+                        </a:solidFill>
+                        <a:effectLst/>
+                        <a:latin typeface="Courier"/>
+                      </a:endParaRPr>
+                    </a:p>
+                  </a:txBody>
+                  <a:tcPr marL="6350" marR="6350" marT="6350" marB="0" anchor="b"/>
+                </a:tc>
+                <a:tc>
+                  <a:txBody>
+                    <a:bodyPr/>
+                    <a:lstStyle/>
+                    <a:p>
+                      <a:pPr algn="l" fontAlgn="b"/>
+                      <a:endParaRPr lang="en-DE" sz="800" b="0" i="0" u="none" strike="noStrike" dirty="0">
+                        <a:solidFill>
+                          <a:srgbClr val="000000"/>
+                        </a:solidFill>
+                        <a:effectLst/>
+                        <a:latin typeface="Courier"/>
+                      </a:endParaRPr>
+                    </a:p>
+                  </a:txBody>
+                  <a:tcPr marL="6350" marR="6350" marT="6350" marB="0" anchor="b"/>
+                </a:tc>
+                <a:extLst>
+                  <a:ext uri="{0D108BD9-81ED-4DB2-BD59-A6C34878D82A}">
+                    <a16:rowId xmlns:a16="http://schemas.microsoft.com/office/drawing/2014/main" val="3653312017"/>
+                  </a:ext>
+                </a:extLst>
+              </a:tr>
+            </a:tbl>
+          </a:graphicData>
+        </a:graphic>
+      </p:graphicFrame>
+      <p:cxnSp>
+        <p:nvCxnSpPr>
+          <p:cNvPr id="14" name="Straight Arrow Connector 13">
+            <a:extLst>
+              <a:ext uri="{FF2B5EF4-FFF2-40B4-BE49-F238E27FC236}">
+                <a16:creationId xmlns:a16="http://schemas.microsoft.com/office/drawing/2014/main" id="{B2C3CC2B-0C08-45FC-B694-E564C60DF5F2}"/>
+              </a:ext>
+            </a:extLst>
+          </p:cNvPr>
+          <p:cNvCxnSpPr>
+            <a:cxnSpLocks/>
+          </p:cNvCxnSpPr>
           <p:nvPr/>
-        </p:nvPicPr>
-        <p:blipFill>
-          <a:blip r:embed="rId3"/>
-          <a:stretch>
-            <a:fillRect/>
-          </a:stretch>
-        </p:blipFill>
+        </p:nvCxnSpPr>
         <p:spPr>
           <a:xfrm>
-            <a:off x="3613349" y="845719"/>
-            <a:ext cx="2729330" cy="2106530"/>
+            <a:off x="4141258" y="1716617"/>
+            <a:ext cx="1044575" cy="0"/>
           </a:xfrm>
-          <a:prstGeom prst="rect">
+          <a:prstGeom prst="straightConnector1">
             <a:avLst/>
           </a:prstGeom>
+          <a:ln>
+            <a:tailEnd type="triangle"/>
+          </a:ln>
         </p:spPr>
-      </p:pic>
-      <p:pic>
-        <p:nvPicPr>
-          <p:cNvPr id="6" name="Picture 5">
-            <a:extLst>
-              <a:ext uri="{FF2B5EF4-FFF2-40B4-BE49-F238E27FC236}">
-                <a16:creationId xmlns:a16="http://schemas.microsoft.com/office/drawing/2014/main" id="{DA849E51-9833-294D-BE0C-AB785D34A3DA}"/>
-              </a:ext>
-            </a:extLst>
-          </p:cNvPr>
-          <p:cNvPicPr>
-            <a:picLocks noChangeAspect="1"/>
-          </p:cNvPicPr>
+        <p:style>
+          <a:lnRef idx="1">
+            <a:schemeClr val="accent1"/>
+          </a:lnRef>
+          <a:fillRef idx="0">
+            <a:schemeClr val="accent1"/>
+          </a:fillRef>
+          <a:effectRef idx="0">
+            <a:schemeClr val="accent1"/>
+          </a:effectRef>
+          <a:fontRef idx="minor">
+            <a:schemeClr val="tx1"/>
+          </a:fontRef>
+        </p:style>
+      </p:cxnSp>
+      <p:cxnSp>
+        <p:nvCxnSpPr>
+          <p:cNvPr id="16" name="Straight Arrow Connector 15">
+            <a:extLst>
+              <a:ext uri="{FF2B5EF4-FFF2-40B4-BE49-F238E27FC236}">
+                <a16:creationId xmlns:a16="http://schemas.microsoft.com/office/drawing/2014/main" id="{7A6B8B1D-8868-4CC8-8F02-C33B9A2A7792}"/>
+              </a:ext>
+            </a:extLst>
+          </p:cNvPr>
+          <p:cNvCxnSpPr>
+            <a:cxnSpLocks/>
+          </p:cNvCxnSpPr>
           <p:nvPr/>
-        </p:nvPicPr>
-        <p:blipFill>
-          <a:blip r:embed="rId4"/>
-          <a:stretch>
-            <a:fillRect/>
-          </a:stretch>
-        </p:blipFill>
+        </p:nvCxnSpPr>
         <p:spPr>
           <a:xfrm>
-            <a:off x="1895977" y="4922621"/>
-            <a:ext cx="7581900" cy="1587500"/>
+            <a:off x="2720362" y="1709209"/>
+            <a:ext cx="679005" cy="0"/>
           </a:xfrm>
-          <a:prstGeom prst="rect">
+          <a:prstGeom prst="straightConnector1">
             <a:avLst/>
           </a:prstGeom>
+          <a:ln>
+            <a:tailEnd type="triangle"/>
+          </a:ln>
         </p:spPr>
-      </p:pic>
-      <p:pic>
-        <p:nvPicPr>
-          <p:cNvPr id="7" name="Picture 6">
-            <a:extLst>
-              <a:ext uri="{FF2B5EF4-FFF2-40B4-BE49-F238E27FC236}">
-                <a16:creationId xmlns:a16="http://schemas.microsoft.com/office/drawing/2014/main" id="{D72F331E-3B43-E742-9B18-345B74287E7C}"/>
-              </a:ext>
-            </a:extLst>
-          </p:cNvPr>
-          <p:cNvPicPr>
-            <a:picLocks noChangeAspect="1"/>
-          </p:cNvPicPr>
+        <p:style>
+          <a:lnRef idx="1">
+            <a:schemeClr val="accent1"/>
+          </a:lnRef>
+          <a:fillRef idx="0">
+            <a:schemeClr val="accent1"/>
+          </a:fillRef>
+          <a:effectRef idx="0">
+            <a:schemeClr val="accent1"/>
+          </a:effectRef>
+          <a:fontRef idx="minor">
+            <a:schemeClr val="tx1"/>
+          </a:fontRef>
+        </p:style>
+      </p:cxnSp>
+      <p:sp>
+        <p:nvSpPr>
+          <p:cNvPr id="3" name="Rectangle 2">
+            <a:extLst>
+              <a:ext uri="{FF2B5EF4-FFF2-40B4-BE49-F238E27FC236}">
+                <a16:creationId xmlns:a16="http://schemas.microsoft.com/office/drawing/2014/main" id="{1875F2C4-2264-449C-8D81-711D9F5187FE}"/>
+              </a:ext>
+            </a:extLst>
+          </p:cNvPr>
+          <p:cNvSpPr/>
           <p:nvPr/>
-        </p:nvPicPr>
-        <p:blipFill>
-          <a:blip r:embed="rId5"/>
-          <a:stretch>
-            <a:fillRect/>
-          </a:stretch>
-        </p:blipFill>
+        </p:nvSpPr>
         <p:spPr>
           <a:xfrm>
-            <a:off x="1895977" y="3295650"/>
-            <a:ext cx="7581900" cy="1587500"/>
-          </a:xfrm>
-          <a:prstGeom prst="rect">
-            <a:avLst/>
-          </a:prstGeom>
-        </p:spPr>
-      </p:pic>
-      <p:pic>
-        <p:nvPicPr>
-          <p:cNvPr id="8" name="Picture 8" descr="https://lh6.googleusercontent.com/YMOKCP1y16XQZ9HRW5tlMFXI4CBNI25trjedysK16l4ZS_7NYx121uE4m5SLho-5EEP-zYjp6gU9mxhwvmW097OlJj22CQp2YNjL56TwN8E3uR3aTLrqZ2uG_5hr8vArglJUhwK-">
-            <a:extLst>
-              <a:ext uri="{FF2B5EF4-FFF2-40B4-BE49-F238E27FC236}">
-                <a16:creationId xmlns:a16="http://schemas.microsoft.com/office/drawing/2014/main" id="{204E6FF5-B72B-094D-9AAA-849F45960BAE}"/>
-              </a:ext>
-            </a:extLst>
-          </p:cNvPr>
-          <p:cNvPicPr>
-            <a:picLocks noChangeAspect="1" noChangeArrowheads="1"/>
-          </p:cNvPicPr>
-          <p:nvPr/>
-        </p:nvPicPr>
-        <p:blipFill>
-          <a:blip r:embed="rId6">
-            <a:extLst>
-              <a:ext uri="{28A0092B-C50C-407E-A947-70E740481C1C}">
-                <a14:useLocalDpi xmlns:a14="http://schemas.microsoft.com/office/drawing/2010/main" val="0"/>
-              </a:ext>
-            </a:extLst>
-          </a:blip>
-          <a:srcRect/>
-          <a:stretch>
-            <a:fillRect/>
-          </a:stretch>
-        </p:blipFill>
-        <p:spPr bwMode="auto">
-          <a:xfrm>
-            <a:off x="5989890" y="1012468"/>
-            <a:ext cx="3524083" cy="1596380"/>
+            <a:off x="2260599" y="1638303"/>
+            <a:ext cx="143933" cy="141810"/>
           </a:xfrm>
           <a:prstGeom prst="rect">
             <a:avLst/>
           </a:prstGeom>
           <a:noFill/>
-          <a:extLst>
-            <a:ext uri="{909E8E84-426E-40DD-AFC4-6F175D3DCCD1}">
-              <a14:hiddenFill xmlns:a14="http://schemas.microsoft.com/office/drawing/2010/main">
+          <a:ln>
+            <a:solidFill>
+              <a:schemeClr val="accent1">
+                <a:shade val="50000"/>
+              </a:schemeClr>
+            </a:solidFill>
+          </a:ln>
+        </p:spPr>
+        <p:style>
+          <a:lnRef idx="2">
+            <a:schemeClr val="accent1">
+              <a:shade val="50000"/>
+            </a:schemeClr>
+          </a:lnRef>
+          <a:fillRef idx="1">
+            <a:schemeClr val="accent1"/>
+          </a:fillRef>
+          <a:effectRef idx="0">
+            <a:schemeClr val="accent1"/>
+          </a:effectRef>
+          <a:fontRef idx="minor">
+            <a:schemeClr val="lt1"/>
+          </a:fontRef>
+        </p:style>
+        <p:txBody>
+          <a:bodyPr rtlCol="0" anchor="ctr"/>
+          <a:lstStyle/>
+          <a:p>
+            <a:pPr algn="ctr"/>
+            <a:endParaRPr lang="en-DE"/>
+          </a:p>
+        </p:txBody>
+      </p:sp>
+      <p:sp>
+        <p:nvSpPr>
+          <p:cNvPr id="15" name="TextBox 14">
+            <a:extLst>
+              <a:ext uri="{FF2B5EF4-FFF2-40B4-BE49-F238E27FC236}">
+                <a16:creationId xmlns:a16="http://schemas.microsoft.com/office/drawing/2014/main" id="{ADB52FE6-B690-40FB-915E-0CFF18134944}"/>
+              </a:ext>
+            </a:extLst>
+          </p:cNvPr>
+          <p:cNvSpPr txBox="1"/>
+          <p:nvPr/>
+        </p:nvSpPr>
+        <p:spPr>
+          <a:xfrm>
+            <a:off x="4362169" y="1432210"/>
+            <a:ext cx="316112" cy="276999"/>
+          </a:xfrm>
+          <a:prstGeom prst="rect">
+            <a:avLst/>
+          </a:prstGeom>
+          <a:noFill/>
+        </p:spPr>
+        <p:txBody>
+          <a:bodyPr wrap="none" rtlCol="0">
+            <a:spAutoFit/>
+          </a:bodyPr>
+          <a:lstStyle/>
+          <a:p>
+            <a:r>
+              <a:rPr lang="en-US" sz="1200" i="1" dirty="0">
+                <a:latin typeface="Bell MT" panose="02020503060305020303" pitchFamily="18" charset="0"/>
+                <a:ea typeface="Batang" panose="020B0503020000020004" pitchFamily="18" charset="-127"/>
+              </a:rPr>
+              <a:t>op</a:t>
+            </a:r>
+            <a:endParaRPr lang="en-DE" sz="1200" i="1" dirty="0">
+              <a:latin typeface="Bell MT" panose="02020503060305020303" pitchFamily="18" charset="0"/>
+              <a:ea typeface="Batang" panose="020B0503020000020004" pitchFamily="18" charset="-127"/>
+            </a:endParaRPr>
+          </a:p>
+        </p:txBody>
+      </p:sp>
+      <p:sp>
+        <p:nvSpPr>
+          <p:cNvPr id="26" name="TextBox 25">
+            <a:extLst>
+              <a:ext uri="{FF2B5EF4-FFF2-40B4-BE49-F238E27FC236}">
+                <a16:creationId xmlns:a16="http://schemas.microsoft.com/office/drawing/2014/main" id="{55CF0707-AB10-4446-8031-B9FEFF1FFCC7}"/>
+              </a:ext>
+            </a:extLst>
+          </p:cNvPr>
+          <p:cNvSpPr txBox="1"/>
+          <p:nvPr/>
+        </p:nvSpPr>
+        <p:spPr>
+          <a:xfrm>
+            <a:off x="4482125" y="1846341"/>
+            <a:ext cx="1217775" cy="461665"/>
+          </a:xfrm>
+          <a:prstGeom prst="rect">
+            <a:avLst/>
+          </a:prstGeom>
+          <a:solidFill>
+            <a:schemeClr val="bg1"/>
+          </a:solidFill>
+          <a:ln>
+            <a:solidFill>
+              <a:schemeClr val="tx1"/>
+            </a:solidFill>
+          </a:ln>
+        </p:spPr>
+        <p:txBody>
+          <a:bodyPr wrap="square" rtlCol="0">
+            <a:spAutoFit/>
+          </a:bodyPr>
+          <a:lstStyle/>
+          <a:p>
+            <a:r>
+              <a:rPr lang="en-US" sz="800" i="1" dirty="0">
+                <a:latin typeface="Bell MT" panose="02020503060305020303" pitchFamily="18" charset="0"/>
+                <a:ea typeface="Batang" panose="020B0503020000020004" pitchFamily="18" charset="-127"/>
+              </a:rPr>
+              <a:t>op</a:t>
+            </a:r>
+            <a:r>
+              <a:rPr lang="en-US" sz="800" dirty="0">
+                <a:ea typeface="Batang" panose="020B0503020000020004" pitchFamily="18" charset="-127"/>
+              </a:rPr>
+              <a:t> = max, </a:t>
+            </a:r>
+            <a:r>
+              <a:rPr lang="en-US" sz="800" b="1" i="0" u="none" strike="noStrike" dirty="0">
                 <a:solidFill>
-                  <a:srgbClr val="FFFFFF"/>
+                  <a:srgbClr val="FF0000"/>
                 </a:solidFill>
-              </a14:hiddenFill>
-            </a:ext>
-          </a:extLst>
+                <a:effectLst/>
+                <a:latin typeface="Courier"/>
+              </a:rPr>
+              <a:t>X</a:t>
+            </a:r>
+            <a:r>
+              <a:rPr lang="en-US" sz="800" dirty="0">
+                <a:ea typeface="Batang" panose="020B0503020000020004" pitchFamily="18" charset="-127"/>
+              </a:rPr>
+              <a:t> = 89</a:t>
+            </a:r>
+          </a:p>
+          <a:p>
+            <a:r>
+              <a:rPr lang="en-US" sz="800" i="1" dirty="0">
+                <a:latin typeface="Bell MT" panose="02020503060305020303" pitchFamily="18" charset="0"/>
+                <a:ea typeface="Batang" panose="020B0503020000020004" pitchFamily="18" charset="-127"/>
+              </a:rPr>
+              <a:t>op</a:t>
+            </a:r>
+            <a:r>
+              <a:rPr lang="en-US" sz="800" dirty="0">
+                <a:ea typeface="Batang" panose="020B0503020000020004" pitchFamily="18" charset="-127"/>
+              </a:rPr>
+              <a:t> = mean, </a:t>
+            </a:r>
+            <a:r>
+              <a:rPr lang="en-US" sz="800" b="1" i="0" u="none" strike="noStrike" dirty="0">
+                <a:solidFill>
+                  <a:srgbClr val="FF0000"/>
+                </a:solidFill>
+                <a:effectLst/>
+                <a:latin typeface="Courier"/>
+              </a:rPr>
+              <a:t>X</a:t>
+            </a:r>
+            <a:r>
+              <a:rPr lang="en-US" sz="800" dirty="0">
+                <a:ea typeface="Batang" panose="020B0503020000020004" pitchFamily="18" charset="-127"/>
+              </a:rPr>
+              <a:t> = 65.24</a:t>
+            </a:r>
+          </a:p>
+          <a:p>
+            <a:r>
+              <a:rPr lang="en-US" sz="800" i="1" dirty="0">
+                <a:latin typeface="Bell MT" panose="02020503060305020303" pitchFamily="18" charset="0"/>
+                <a:ea typeface="Batang" panose="020B0503020000020004" pitchFamily="18" charset="-127"/>
+              </a:rPr>
+              <a:t>op</a:t>
+            </a:r>
+            <a:r>
+              <a:rPr lang="en-US" sz="800" dirty="0">
+                <a:ea typeface="Batang" panose="020B0503020000020004" pitchFamily="18" charset="-127"/>
+              </a:rPr>
+              <a:t> = variance, </a:t>
+            </a:r>
+            <a:r>
+              <a:rPr lang="en-US" sz="800" b="1" i="0" u="none" strike="noStrike" dirty="0">
+                <a:solidFill>
+                  <a:srgbClr val="FF0000"/>
+                </a:solidFill>
+                <a:effectLst/>
+                <a:latin typeface="Courier"/>
+              </a:rPr>
+              <a:t>X</a:t>
+            </a:r>
+            <a:r>
+              <a:rPr lang="en-US" sz="800" dirty="0">
+                <a:ea typeface="Batang" panose="020B0503020000020004" pitchFamily="18" charset="-127"/>
+              </a:rPr>
+              <a:t> = 172.60</a:t>
+            </a:r>
+            <a:endParaRPr lang="en-DE" sz="800" dirty="0">
+              <a:ea typeface="Batang" panose="020B0503020000020004" pitchFamily="18" charset="-127"/>
+            </a:endParaRPr>
+          </a:p>
+        </p:txBody>
+      </p:sp>
+      <p:grpSp>
+        <p:nvGrpSpPr>
+          <p:cNvPr id="8" name="Group 7">
+            <a:extLst>
+              <a:ext uri="{FF2B5EF4-FFF2-40B4-BE49-F238E27FC236}">
+                <a16:creationId xmlns:a16="http://schemas.microsoft.com/office/drawing/2014/main" id="{28E2851A-CAA3-44E6-B917-D28329098FDF}"/>
+              </a:ext>
+            </a:extLst>
+          </p:cNvPr>
+          <p:cNvGrpSpPr/>
+          <p:nvPr/>
+        </p:nvGrpSpPr>
+        <p:grpSpPr>
+          <a:xfrm>
+            <a:off x="1773283" y="3032444"/>
+            <a:ext cx="4185668" cy="2032642"/>
+            <a:chOff x="1773283" y="3032444"/>
+            <a:chExt cx="4185668" cy="2032642"/>
+          </a:xfrm>
+        </p:grpSpPr>
+        <p:pic>
+          <p:nvPicPr>
+            <p:cNvPr id="19" name="Picture 4" descr="https://lh4.googleusercontent.com/9pWurBawAwNNlPMPQTegROoQUDLMfrHTqBPovSBiY2_xjTBkfPYA-riGF8Svi9AN3PkcC-BdPQfTScNEZg6D7cYmkuL0uXX_73Au56NjmDo0YUq_mG84YVt9TB01Hb0fNHkgRlit">
+              <a:extLst>
+                <a:ext uri="{FF2B5EF4-FFF2-40B4-BE49-F238E27FC236}">
+                  <a16:creationId xmlns:a16="http://schemas.microsoft.com/office/drawing/2014/main" id="{ECCF762F-6153-47C6-AAFF-D4C13D2D4DB7}"/>
+                </a:ext>
+              </a:extLst>
+            </p:cNvPr>
+            <p:cNvPicPr>
+              <a:picLocks noChangeAspect="1" noChangeArrowheads="1"/>
+            </p:cNvPicPr>
+            <p:nvPr/>
+          </p:nvPicPr>
+          <p:blipFill>
+            <a:blip r:embed="rId3">
+              <a:extLst>
+                <a:ext uri="{28A0092B-C50C-407E-A947-70E740481C1C}">
+                  <a14:useLocalDpi xmlns:a14="http://schemas.microsoft.com/office/drawing/2010/main" val="0"/>
+                </a:ext>
+              </a:extLst>
+            </a:blip>
+            <a:srcRect/>
+            <a:stretch>
+              <a:fillRect/>
+            </a:stretch>
+          </p:blipFill>
+          <p:spPr bwMode="auto">
+            <a:xfrm>
+              <a:off x="1773283" y="3032444"/>
+              <a:ext cx="1971749" cy="994294"/>
+            </a:xfrm>
+            <a:prstGeom prst="rect">
+              <a:avLst/>
+            </a:prstGeom>
+            <a:noFill/>
+            <a:extLst>
+              <a:ext uri="{909E8E84-426E-40DD-AFC4-6F175D3DCCD1}">
+                <a14:hiddenFill xmlns:a14="http://schemas.microsoft.com/office/drawing/2010/main">
+                  <a:solidFill>
+                    <a:srgbClr val="FFFFFF"/>
+                  </a:solidFill>
+                </a14:hiddenFill>
+              </a:ext>
+            </a:extLst>
+          </p:spPr>
+        </p:pic>
+        <p:pic>
+          <p:nvPicPr>
+            <p:cNvPr id="24" name="Picture 10" descr="https://lh4.googleusercontent.com/2zq8Mbs_-v6c4oIxhz3zZeH9bDS6IN9iFZ97polk2GwAsJ8cWtIQuY92cI33d82BuMIyzWmMI7n9KuvI2FvX81_D-ibhGSMAMm9i7soKSGCZDKBlITNK8wjFBmNhv7ZI-C7aUntg">
+              <a:extLst>
+                <a:ext uri="{FF2B5EF4-FFF2-40B4-BE49-F238E27FC236}">
+                  <a16:creationId xmlns:a16="http://schemas.microsoft.com/office/drawing/2014/main" id="{4B78DDE6-9DF6-4273-A482-7754E6B33795}"/>
+                </a:ext>
+              </a:extLst>
+            </p:cNvPr>
+            <p:cNvPicPr>
+              <a:picLocks noChangeAspect="1" noChangeArrowheads="1"/>
+            </p:cNvPicPr>
+            <p:nvPr/>
+          </p:nvPicPr>
+          <p:blipFill>
+            <a:blip r:embed="rId4">
+              <a:extLst>
+                <a:ext uri="{28A0092B-C50C-407E-A947-70E740481C1C}">
+                  <a14:useLocalDpi xmlns:a14="http://schemas.microsoft.com/office/drawing/2010/main" val="0"/>
+                </a:ext>
+              </a:extLst>
+            </a:blip>
+            <a:srcRect/>
+            <a:stretch>
+              <a:fillRect/>
+            </a:stretch>
+          </p:blipFill>
+          <p:spPr bwMode="auto">
+            <a:xfrm>
+              <a:off x="1773283" y="4067527"/>
+              <a:ext cx="1955785" cy="956049"/>
+            </a:xfrm>
+            <a:prstGeom prst="rect">
+              <a:avLst/>
+            </a:prstGeom>
+            <a:noFill/>
+            <a:extLst>
+              <a:ext uri="{909E8E84-426E-40DD-AFC4-6F175D3DCCD1}">
+                <a14:hiddenFill xmlns:a14="http://schemas.microsoft.com/office/drawing/2010/main">
+                  <a:solidFill>
+                    <a:srgbClr val="FFFFFF"/>
+                  </a:solidFill>
+                </a14:hiddenFill>
+              </a:ext>
+            </a:extLst>
+          </p:spPr>
+        </p:pic>
+        <p:pic>
+          <p:nvPicPr>
+            <p:cNvPr id="25" name="Picture 12" descr="https://lh6.googleusercontent.com/M1CGm8y4JM7WYvCku1zowPPhx5tpxaPemANcWJlBIxQBzFzC1M2L-OJ1R2AVTkMW1n30XbGfI6-xfZKLxLx41TG__MtouOjcnwlQm57CoWlQA-bC1zlhWbXVrZxt1yDSlNAqq51q">
+              <a:extLst>
+                <a:ext uri="{FF2B5EF4-FFF2-40B4-BE49-F238E27FC236}">
+                  <a16:creationId xmlns:a16="http://schemas.microsoft.com/office/drawing/2014/main" id="{5C56F040-BD7F-4A69-A6E8-D84F18500865}"/>
+                </a:ext>
+              </a:extLst>
+            </p:cNvPr>
+            <p:cNvPicPr>
+              <a:picLocks noChangeAspect="1" noChangeArrowheads="1"/>
+            </p:cNvPicPr>
+            <p:nvPr/>
+          </p:nvPicPr>
+          <p:blipFill rotWithShape="1">
+            <a:blip r:embed="rId5">
+              <a:extLst>
+                <a:ext uri="{28A0092B-C50C-407E-A947-70E740481C1C}">
+                  <a14:useLocalDpi xmlns:a14="http://schemas.microsoft.com/office/drawing/2010/main" val="0"/>
+                </a:ext>
+              </a:extLst>
+            </a:blip>
+            <a:srcRect/>
+            <a:stretch/>
+          </p:blipFill>
+          <p:spPr bwMode="auto">
+            <a:xfrm>
+              <a:off x="3923198" y="4026739"/>
+              <a:ext cx="2035753" cy="1038347"/>
+            </a:xfrm>
+            <a:prstGeom prst="rect">
+              <a:avLst/>
+            </a:prstGeom>
+            <a:noFill/>
+            <a:extLst>
+              <a:ext uri="{909E8E84-426E-40DD-AFC4-6F175D3DCCD1}">
+                <a14:hiddenFill xmlns:a14="http://schemas.microsoft.com/office/drawing/2010/main">
+                  <a:solidFill>
+                    <a:srgbClr val="FFFFFF"/>
+                  </a:solidFill>
+                </a14:hiddenFill>
+              </a:ext>
+            </a:extLst>
+          </p:spPr>
+        </p:pic>
+      </p:grpSp>
+      <p:grpSp>
+        <p:nvGrpSpPr>
+          <p:cNvPr id="11" name="Group 10">
+            <a:extLst>
+              <a:ext uri="{FF2B5EF4-FFF2-40B4-BE49-F238E27FC236}">
+                <a16:creationId xmlns:a16="http://schemas.microsoft.com/office/drawing/2014/main" id="{00AE1284-14F9-43D6-AA2F-ECADDF71EEE6}"/>
+              </a:ext>
+            </a:extLst>
+          </p:cNvPr>
+          <p:cNvGrpSpPr/>
+          <p:nvPr/>
+        </p:nvGrpSpPr>
+        <p:grpSpPr>
+          <a:xfrm>
+            <a:off x="3923198" y="2967958"/>
+            <a:ext cx="1996182" cy="1025743"/>
+            <a:chOff x="3923198" y="2967958"/>
+            <a:chExt cx="1996182" cy="1025743"/>
+          </a:xfrm>
+        </p:grpSpPr>
+        <p:pic>
+          <p:nvPicPr>
+            <p:cNvPr id="30" name="Picture 6" descr="https://lh5.googleusercontent.com/E6Kz826YFbCpYWle0WdY0ICP_3W5YlmSch2AAh4lsjKoXW1GTHxNZjKn3b-S-CofEny3-aMVMGTFDkHhEZokUM1E3D5GnsKD79EYNlsobh1tQfP97eUFxaOaTa7qNbD2Cf6N6EnK">
+              <a:extLst>
+                <a:ext uri="{FF2B5EF4-FFF2-40B4-BE49-F238E27FC236}">
+                  <a16:creationId xmlns:a16="http://schemas.microsoft.com/office/drawing/2014/main" id="{5960D57C-71B8-4B37-BEB5-88467D9655F6}"/>
+                </a:ext>
+              </a:extLst>
+            </p:cNvPr>
+            <p:cNvPicPr>
+              <a:picLocks noChangeAspect="1" noChangeArrowheads="1"/>
+            </p:cNvPicPr>
+            <p:nvPr/>
+          </p:nvPicPr>
+          <p:blipFill>
+            <a:blip r:embed="rId6">
+              <a:extLst>
+                <a:ext uri="{28A0092B-C50C-407E-A947-70E740481C1C}">
+                  <a14:useLocalDpi xmlns:a14="http://schemas.microsoft.com/office/drawing/2010/main" val="0"/>
+                </a:ext>
+              </a:extLst>
+            </a:blip>
+            <a:srcRect/>
+            <a:stretch>
+              <a:fillRect/>
+            </a:stretch>
+          </p:blipFill>
+          <p:spPr bwMode="auto">
+            <a:xfrm>
+              <a:off x="3965836" y="2999408"/>
+              <a:ext cx="1953544" cy="994293"/>
+            </a:xfrm>
+            <a:prstGeom prst="rect">
+              <a:avLst/>
+            </a:prstGeom>
+            <a:noFill/>
+            <a:extLst>
+              <a:ext uri="{909E8E84-426E-40DD-AFC4-6F175D3DCCD1}">
+                <a14:hiddenFill xmlns:a14="http://schemas.microsoft.com/office/drawing/2010/main">
+                  <a:solidFill>
+                    <a:srgbClr val="FFFFFF"/>
+                  </a:solidFill>
+                </a14:hiddenFill>
+              </a:ext>
+            </a:extLst>
+          </p:spPr>
+        </p:pic>
+        <p:sp>
+          <p:nvSpPr>
+            <p:cNvPr id="31" name="Rectangle 30">
+              <a:extLst>
+                <a:ext uri="{FF2B5EF4-FFF2-40B4-BE49-F238E27FC236}">
+                  <a16:creationId xmlns:a16="http://schemas.microsoft.com/office/drawing/2014/main" id="{FF7CA060-8877-4968-846E-D15AFC88D4CE}"/>
+                </a:ext>
+              </a:extLst>
+            </p:cNvPr>
+            <p:cNvSpPr/>
+            <p:nvPr/>
+          </p:nvSpPr>
+          <p:spPr>
+            <a:xfrm>
+              <a:off x="3923198" y="2967958"/>
+              <a:ext cx="292863" cy="314161"/>
+            </a:xfrm>
+            <a:prstGeom prst="rect">
+              <a:avLst/>
+            </a:prstGeom>
+            <a:noFill/>
+            <a:ln>
+              <a:prstDash val="sysDot"/>
+            </a:ln>
+          </p:spPr>
+          <p:style>
+            <a:lnRef idx="2">
+              <a:schemeClr val="accent1">
+                <a:shade val="50000"/>
+              </a:schemeClr>
+            </a:lnRef>
+            <a:fillRef idx="1">
+              <a:schemeClr val="accent1"/>
+            </a:fillRef>
+            <a:effectRef idx="0">
+              <a:schemeClr val="accent1"/>
+            </a:effectRef>
+            <a:fontRef idx="minor">
+              <a:schemeClr val="lt1"/>
+            </a:fontRef>
+          </p:style>
+          <p:txBody>
+            <a:bodyPr rtlCol="0" anchor="ctr"/>
+            <a:lstStyle/>
+            <a:p>
+              <a:pPr algn="ctr"/>
+              <a:endParaRPr lang="en-DE"/>
+            </a:p>
+          </p:txBody>
+        </p:sp>
+      </p:grpSp>
+      <p:sp>
+        <p:nvSpPr>
+          <p:cNvPr id="5" name="TextBox 4">
+            <a:extLst>
+              <a:ext uri="{FF2B5EF4-FFF2-40B4-BE49-F238E27FC236}">
+                <a16:creationId xmlns:a16="http://schemas.microsoft.com/office/drawing/2014/main" id="{6BDB6583-8D86-4BD2-8572-7E902FB49A1F}"/>
+              </a:ext>
+            </a:extLst>
+          </p:cNvPr>
+          <p:cNvSpPr txBox="1"/>
+          <p:nvPr/>
+        </p:nvSpPr>
+        <p:spPr>
+          <a:xfrm>
+            <a:off x="1526566" y="1121532"/>
+            <a:ext cx="271228" cy="307777"/>
+          </a:xfrm>
+          <a:prstGeom prst="rect">
+            <a:avLst/>
+          </a:prstGeom>
+          <a:noFill/>
         </p:spPr>
-      </p:pic>
+        <p:txBody>
+          <a:bodyPr wrap="none" rtlCol="0">
+            <a:spAutoFit/>
+          </a:bodyPr>
+          <a:lstStyle/>
+          <a:p>
+            <a:r>
+              <a:rPr lang="en-US" sz="1400" dirty="0"/>
+              <a:t>a</a:t>
+            </a:r>
+            <a:endParaRPr lang="en-DE" sz="1400" dirty="0"/>
+          </a:p>
+        </p:txBody>
+      </p:sp>
+      <p:sp>
+        <p:nvSpPr>
+          <p:cNvPr id="33" name="TextBox 32">
+            <a:extLst>
+              <a:ext uri="{FF2B5EF4-FFF2-40B4-BE49-F238E27FC236}">
+                <a16:creationId xmlns:a16="http://schemas.microsoft.com/office/drawing/2014/main" id="{71C11DDD-E4B4-43CC-A440-532A5ED5C263}"/>
+              </a:ext>
+            </a:extLst>
+          </p:cNvPr>
+          <p:cNvSpPr txBox="1"/>
+          <p:nvPr/>
+        </p:nvSpPr>
+        <p:spPr>
+          <a:xfrm>
+            <a:off x="2974341" y="1127648"/>
+            <a:ext cx="306494" cy="307777"/>
+          </a:xfrm>
+          <a:prstGeom prst="rect">
+            <a:avLst/>
+          </a:prstGeom>
+          <a:noFill/>
+        </p:spPr>
+        <p:txBody>
+          <a:bodyPr wrap="square" rtlCol="0">
+            <a:spAutoFit/>
+          </a:bodyPr>
+          <a:lstStyle/>
+          <a:p>
+            <a:r>
+              <a:rPr lang="en-US" sz="1400" dirty="0"/>
+              <a:t>b</a:t>
+            </a:r>
+            <a:endParaRPr lang="en-DE" sz="1400" dirty="0"/>
+          </a:p>
+        </p:txBody>
+      </p:sp>
+      <p:sp>
+        <p:nvSpPr>
+          <p:cNvPr id="35" name="TextBox 34">
+            <a:extLst>
+              <a:ext uri="{FF2B5EF4-FFF2-40B4-BE49-F238E27FC236}">
+                <a16:creationId xmlns:a16="http://schemas.microsoft.com/office/drawing/2014/main" id="{67164D7B-5F5C-4732-84E8-645189C263E6}"/>
+              </a:ext>
+            </a:extLst>
+          </p:cNvPr>
+          <p:cNvSpPr txBox="1"/>
+          <p:nvPr/>
+        </p:nvSpPr>
+        <p:spPr>
+          <a:xfrm>
+            <a:off x="4482125" y="1123230"/>
+            <a:ext cx="260008" cy="307777"/>
+          </a:xfrm>
+          <a:prstGeom prst="rect">
+            <a:avLst/>
+          </a:prstGeom>
+          <a:noFill/>
+        </p:spPr>
+        <p:txBody>
+          <a:bodyPr wrap="none" rtlCol="0">
+            <a:spAutoFit/>
+          </a:bodyPr>
+          <a:lstStyle/>
+          <a:p>
+            <a:r>
+              <a:rPr lang="en-US" sz="1400" dirty="0"/>
+              <a:t>c</a:t>
+            </a:r>
+            <a:endParaRPr lang="en-DE" sz="1400" dirty="0"/>
+          </a:p>
+        </p:txBody>
+      </p:sp>
+      <p:sp>
+        <p:nvSpPr>
+          <p:cNvPr id="36" name="TextBox 35">
+            <a:extLst>
+              <a:ext uri="{FF2B5EF4-FFF2-40B4-BE49-F238E27FC236}">
+                <a16:creationId xmlns:a16="http://schemas.microsoft.com/office/drawing/2014/main" id="{2075293B-7859-4306-9660-047AD768B1EE}"/>
+              </a:ext>
+            </a:extLst>
+          </p:cNvPr>
+          <p:cNvSpPr txBox="1"/>
+          <p:nvPr/>
+        </p:nvSpPr>
+        <p:spPr>
+          <a:xfrm>
+            <a:off x="1523259" y="3079924"/>
+            <a:ext cx="279244" cy="307777"/>
+          </a:xfrm>
+          <a:prstGeom prst="rect">
+            <a:avLst/>
+          </a:prstGeom>
+          <a:noFill/>
+        </p:spPr>
+        <p:txBody>
+          <a:bodyPr wrap="none" rtlCol="0">
+            <a:spAutoFit/>
+          </a:bodyPr>
+          <a:lstStyle/>
+          <a:p>
+            <a:r>
+              <a:rPr lang="en-US" sz="1400" dirty="0"/>
+              <a:t>d</a:t>
+            </a:r>
+            <a:endParaRPr lang="en-DE" sz="1400" dirty="0"/>
+          </a:p>
+        </p:txBody>
+      </p:sp>
     </p:spTree>
     <p:extLst>
       <p:ext uri="{BB962C8B-B14F-4D97-AF65-F5344CB8AC3E}">

</xml_diff>

<commit_message>
added modified figure and completed exercises answers
</commit_message>
<xml_diff>
--- a/figures/resources/filter_neighbourhood.pptx
+++ b/figures/resources/filter_neighbourhood.pptx
@@ -266,7 +266,7 @@
           <a:p>
             <a:fld id="{137E0969-D8B9-1B40-A5E3-40294251B92B}" type="datetimeFigureOut">
               <a:rPr lang="de-DE" smtClean="0"/>
-              <a:t>26.01.21</a:t>
+              <a:t>05.03.2022</a:t>
             </a:fld>
             <a:endParaRPr lang="de-DE"/>
           </a:p>
@@ -466,7 +466,7 @@
           <a:p>
             <a:fld id="{137E0969-D8B9-1B40-A5E3-40294251B92B}" type="datetimeFigureOut">
               <a:rPr lang="de-DE" smtClean="0"/>
-              <a:t>26.01.21</a:t>
+              <a:t>05.03.2022</a:t>
             </a:fld>
             <a:endParaRPr lang="de-DE"/>
           </a:p>
@@ -676,7 +676,7 @@
           <a:p>
             <a:fld id="{137E0969-D8B9-1B40-A5E3-40294251B92B}" type="datetimeFigureOut">
               <a:rPr lang="de-DE" smtClean="0"/>
-              <a:t>26.01.21</a:t>
+              <a:t>05.03.2022</a:t>
             </a:fld>
             <a:endParaRPr lang="de-DE"/>
           </a:p>
@@ -876,7 +876,7 @@
           <a:p>
             <a:fld id="{137E0969-D8B9-1B40-A5E3-40294251B92B}" type="datetimeFigureOut">
               <a:rPr lang="de-DE" smtClean="0"/>
-              <a:t>26.01.21</a:t>
+              <a:t>05.03.2022</a:t>
             </a:fld>
             <a:endParaRPr lang="de-DE"/>
           </a:p>
@@ -1152,7 +1152,7 @@
           <a:p>
             <a:fld id="{137E0969-D8B9-1B40-A5E3-40294251B92B}" type="datetimeFigureOut">
               <a:rPr lang="de-DE" smtClean="0"/>
-              <a:t>26.01.21</a:t>
+              <a:t>05.03.2022</a:t>
             </a:fld>
             <a:endParaRPr lang="de-DE"/>
           </a:p>
@@ -1420,7 +1420,7 @@
           <a:p>
             <a:fld id="{137E0969-D8B9-1B40-A5E3-40294251B92B}" type="datetimeFigureOut">
               <a:rPr lang="de-DE" smtClean="0"/>
-              <a:t>26.01.21</a:t>
+              <a:t>05.03.2022</a:t>
             </a:fld>
             <a:endParaRPr lang="de-DE"/>
           </a:p>
@@ -1835,7 +1835,7 @@
           <a:p>
             <a:fld id="{137E0969-D8B9-1B40-A5E3-40294251B92B}" type="datetimeFigureOut">
               <a:rPr lang="de-DE" smtClean="0"/>
-              <a:t>26.01.21</a:t>
+              <a:t>05.03.2022</a:t>
             </a:fld>
             <a:endParaRPr lang="de-DE"/>
           </a:p>
@@ -1977,7 +1977,7 @@
           <a:p>
             <a:fld id="{137E0969-D8B9-1B40-A5E3-40294251B92B}" type="datetimeFigureOut">
               <a:rPr lang="de-DE" smtClean="0"/>
-              <a:t>26.01.21</a:t>
+              <a:t>05.03.2022</a:t>
             </a:fld>
             <a:endParaRPr lang="de-DE"/>
           </a:p>
@@ -2090,7 +2090,7 @@
           <a:p>
             <a:fld id="{137E0969-D8B9-1B40-A5E3-40294251B92B}" type="datetimeFigureOut">
               <a:rPr lang="de-DE" smtClean="0"/>
-              <a:t>26.01.21</a:t>
+              <a:t>05.03.2022</a:t>
             </a:fld>
             <a:endParaRPr lang="de-DE"/>
           </a:p>
@@ -2403,7 +2403,7 @@
           <a:p>
             <a:fld id="{137E0969-D8B9-1B40-A5E3-40294251B92B}" type="datetimeFigureOut">
               <a:rPr lang="de-DE" smtClean="0"/>
-              <a:t>26.01.21</a:t>
+              <a:t>05.03.2022</a:t>
             </a:fld>
             <a:endParaRPr lang="de-DE"/>
           </a:p>
@@ -2692,7 +2692,7 @@
           <a:p>
             <a:fld id="{137E0969-D8B9-1B40-A5E3-40294251B92B}" type="datetimeFigureOut">
               <a:rPr lang="de-DE" smtClean="0"/>
-              <a:t>26.01.21</a:t>
+              <a:t>05.03.2022</a:t>
             </a:fld>
             <a:endParaRPr lang="de-DE"/>
           </a:p>
@@ -2935,7 +2935,7 @@
           <a:p>
             <a:fld id="{137E0969-D8B9-1B40-A5E3-40294251B92B}" type="datetimeFigureOut">
               <a:rPr lang="de-DE" smtClean="0"/>
-              <a:t>26.01.21</a:t>
+              <a:t>05.03.2022</a:t>
             </a:fld>
             <a:endParaRPr lang="de-DE"/>
           </a:p>
@@ -3563,7 +3563,7 @@
         <p:spPr bwMode="auto">
           <a:xfrm>
             <a:off x="600075" y="2524292"/>
-            <a:ext cx="4356100" cy="2019300"/>
+            <a:ext cx="1842558" cy="854130"/>
           </a:xfrm>
           <a:prstGeom prst="rect">
             <a:avLst/>
@@ -3765,159 +3765,3932 @@
           </p:cNvPicPr>
           <p:nvPr/>
         </p:nvPicPr>
-        <p:blipFill>
+        <p:blipFill rotWithShape="1">
           <a:blip r:embed="rId2"/>
-          <a:stretch>
-            <a:fillRect/>
-          </a:stretch>
+          <a:srcRect l="28525" t="30807" r="34254" b="28979"/>
+          <a:stretch/>
         </p:blipFill>
         <p:spPr>
           <a:xfrm>
-            <a:off x="1528011" y="342781"/>
-            <a:ext cx="2823411" cy="2952869"/>
+            <a:off x="1777999" y="1190625"/>
+            <a:ext cx="1092202" cy="1187448"/>
           </a:xfrm>
           <a:prstGeom prst="rect">
             <a:avLst/>
           </a:prstGeom>
+          <a:gradFill>
+            <a:gsLst>
+              <a:gs pos="0">
+                <a:schemeClr val="accent1">
+                  <a:lumMod val="5000"/>
+                  <a:lumOff val="95000"/>
+                </a:schemeClr>
+              </a:gs>
+              <a:gs pos="74000">
+                <a:schemeClr val="accent1">
+                  <a:lumMod val="45000"/>
+                  <a:lumOff val="55000"/>
+                </a:schemeClr>
+              </a:gs>
+              <a:gs pos="83000">
+                <a:schemeClr val="accent1">
+                  <a:lumMod val="45000"/>
+                  <a:lumOff val="55000"/>
+                </a:schemeClr>
+              </a:gs>
+              <a:gs pos="100000">
+                <a:schemeClr val="accent1">
+                  <a:lumMod val="30000"/>
+                  <a:lumOff val="70000"/>
+                </a:schemeClr>
+              </a:gs>
+            </a:gsLst>
+            <a:lin ang="5400000" scaled="1"/>
+          </a:gradFill>
         </p:spPr>
       </p:pic>
-      <p:pic>
-        <p:nvPicPr>
-          <p:cNvPr id="5" name="Picture 4">
-            <a:extLst>
-              <a:ext uri="{FF2B5EF4-FFF2-40B4-BE49-F238E27FC236}">
-                <a16:creationId xmlns:a16="http://schemas.microsoft.com/office/drawing/2014/main" id="{658CE385-04F7-4541-A4C6-9DF4D0C4DB04}"/>
-              </a:ext>
-            </a:extLst>
-          </p:cNvPr>
-          <p:cNvPicPr>
-            <a:picLocks noChangeAspect="1"/>
-          </p:cNvPicPr>
+      <p:graphicFrame>
+        <p:nvGraphicFramePr>
+          <p:cNvPr id="9" name="Table 8">
+            <a:extLst>
+              <a:ext uri="{FF2B5EF4-FFF2-40B4-BE49-F238E27FC236}">
+                <a16:creationId xmlns:a16="http://schemas.microsoft.com/office/drawing/2014/main" id="{A7C80C6B-20CC-485C-92A1-96B0991B85B9}"/>
+              </a:ext>
+            </a:extLst>
+          </p:cNvPr>
+          <p:cNvGraphicFramePr>
+            <a:graphicFrameLocks noGrp="1"/>
+          </p:cNvGraphicFramePr>
+          <p:nvPr>
+            <p:extLst>
+              <p:ext uri="{D42A27DB-BD31-4B8C-83A1-F6EECF244321}">
+                <p14:modId xmlns:p14="http://schemas.microsoft.com/office/powerpoint/2010/main" val="3629860742"/>
+              </p:ext>
+            </p:extLst>
+          </p:nvPr>
+        </p:nvGraphicFramePr>
+        <p:xfrm>
+          <a:off x="3222705" y="1186389"/>
+          <a:ext cx="1092203" cy="1187448"/>
+        </p:xfrm>
+        <a:graphic>
+          <a:graphicData uri="http://schemas.openxmlformats.org/drawingml/2006/table">
+            <a:tbl>
+              <a:tblPr>
+                <a:tableStyleId>{5C22544A-7EE6-4342-B048-85BDC9FD1C3A}</a:tableStyleId>
+              </a:tblPr>
+              <a:tblGrid>
+                <a:gridCol w="156029">
+                  <a:extLst>
+                    <a:ext uri="{9D8B030D-6E8A-4147-A177-3AD203B41FA5}">
+                      <a16:colId xmlns:a16="http://schemas.microsoft.com/office/drawing/2014/main" val="28804164"/>
+                    </a:ext>
+                  </a:extLst>
+                </a:gridCol>
+                <a:gridCol w="156029">
+                  <a:extLst>
+                    <a:ext uri="{9D8B030D-6E8A-4147-A177-3AD203B41FA5}">
+                      <a16:colId xmlns:a16="http://schemas.microsoft.com/office/drawing/2014/main" val="3402452667"/>
+                    </a:ext>
+                  </a:extLst>
+                </a:gridCol>
+                <a:gridCol w="156029">
+                  <a:extLst>
+                    <a:ext uri="{9D8B030D-6E8A-4147-A177-3AD203B41FA5}">
+                      <a16:colId xmlns:a16="http://schemas.microsoft.com/office/drawing/2014/main" val="2822267976"/>
+                    </a:ext>
+                  </a:extLst>
+                </a:gridCol>
+                <a:gridCol w="156029">
+                  <a:extLst>
+                    <a:ext uri="{9D8B030D-6E8A-4147-A177-3AD203B41FA5}">
+                      <a16:colId xmlns:a16="http://schemas.microsoft.com/office/drawing/2014/main" val="758336612"/>
+                    </a:ext>
+                  </a:extLst>
+                </a:gridCol>
+                <a:gridCol w="156029">
+                  <a:extLst>
+                    <a:ext uri="{9D8B030D-6E8A-4147-A177-3AD203B41FA5}">
+                      <a16:colId xmlns:a16="http://schemas.microsoft.com/office/drawing/2014/main" val="1083904867"/>
+                    </a:ext>
+                  </a:extLst>
+                </a:gridCol>
+                <a:gridCol w="156029">
+                  <a:extLst>
+                    <a:ext uri="{9D8B030D-6E8A-4147-A177-3AD203B41FA5}">
+                      <a16:colId xmlns:a16="http://schemas.microsoft.com/office/drawing/2014/main" val="518805580"/>
+                    </a:ext>
+                  </a:extLst>
+                </a:gridCol>
+                <a:gridCol w="156029">
+                  <a:extLst>
+                    <a:ext uri="{9D8B030D-6E8A-4147-A177-3AD203B41FA5}">
+                      <a16:colId xmlns:a16="http://schemas.microsoft.com/office/drawing/2014/main" val="871853914"/>
+                    </a:ext>
+                  </a:extLst>
+                </a:gridCol>
+              </a:tblGrid>
+              <a:tr h="148431">
+                <a:tc>
+                  <a:txBody>
+                    <a:bodyPr/>
+                    <a:lstStyle/>
+                    <a:p>
+                      <a:pPr algn="l" fontAlgn="b"/>
+                      <a:endParaRPr lang="en-DE" sz="800" b="0" i="0" u="none" strike="noStrike" dirty="0">
+                        <a:solidFill>
+                          <a:srgbClr val="000000"/>
+                        </a:solidFill>
+                        <a:effectLst/>
+                        <a:latin typeface="Courier"/>
+                      </a:endParaRPr>
+                    </a:p>
+                  </a:txBody>
+                  <a:tcPr marL="6350" marR="6350" marT="6350" marB="0" anchor="b">
+                    <a:solidFill>
+                      <a:schemeClr val="bg2"/>
+                    </a:solidFill>
+                  </a:tcPr>
+                </a:tc>
+                <a:tc>
+                  <a:txBody>
+                    <a:bodyPr/>
+                    <a:lstStyle/>
+                    <a:p>
+                      <a:pPr algn="l" fontAlgn="b"/>
+                      <a:endParaRPr lang="en-DE" sz="800" b="0" i="0" u="none" strike="noStrike" dirty="0">
+                        <a:solidFill>
+                          <a:srgbClr val="000000"/>
+                        </a:solidFill>
+                        <a:effectLst/>
+                        <a:latin typeface="Courier"/>
+                      </a:endParaRPr>
+                    </a:p>
+                  </a:txBody>
+                  <a:tcPr marL="6350" marR="6350" marT="6350" marB="0" anchor="b">
+                    <a:solidFill>
+                      <a:schemeClr val="bg2"/>
+                    </a:solidFill>
+                  </a:tcPr>
+                </a:tc>
+                <a:tc>
+                  <a:txBody>
+                    <a:bodyPr/>
+                    <a:lstStyle/>
+                    <a:p>
+                      <a:pPr algn="l" fontAlgn="b"/>
+                      <a:endParaRPr lang="en-DE" sz="800" b="0" i="0" u="none" strike="noStrike" dirty="0">
+                        <a:solidFill>
+                          <a:srgbClr val="000000"/>
+                        </a:solidFill>
+                        <a:effectLst/>
+                        <a:latin typeface="Courier"/>
+                      </a:endParaRPr>
+                    </a:p>
+                  </a:txBody>
+                  <a:tcPr marL="6350" marR="6350" marT="6350" marB="0" anchor="b">
+                    <a:solidFill>
+                      <a:schemeClr val="bg2"/>
+                    </a:solidFill>
+                  </a:tcPr>
+                </a:tc>
+                <a:tc>
+                  <a:txBody>
+                    <a:bodyPr/>
+                    <a:lstStyle/>
+                    <a:p>
+                      <a:pPr algn="l" fontAlgn="b"/>
+                      <a:endParaRPr lang="en-DE" sz="800" b="0" i="0" u="none" strike="noStrike" dirty="0">
+                        <a:solidFill>
+                          <a:srgbClr val="000000"/>
+                        </a:solidFill>
+                        <a:effectLst/>
+                        <a:latin typeface="Courier"/>
+                      </a:endParaRPr>
+                    </a:p>
+                  </a:txBody>
+                  <a:tcPr marL="6350" marR="6350" marT="6350" marB="0" anchor="b">
+                    <a:solidFill>
+                      <a:schemeClr val="bg2"/>
+                    </a:solidFill>
+                  </a:tcPr>
+                </a:tc>
+                <a:tc>
+                  <a:txBody>
+                    <a:bodyPr/>
+                    <a:lstStyle/>
+                    <a:p>
+                      <a:pPr algn="l" fontAlgn="b"/>
+                      <a:endParaRPr lang="en-DE" sz="800" b="0" i="0" u="none" strike="noStrike" dirty="0">
+                        <a:solidFill>
+                          <a:srgbClr val="000000"/>
+                        </a:solidFill>
+                        <a:effectLst/>
+                        <a:latin typeface="Courier"/>
+                      </a:endParaRPr>
+                    </a:p>
+                  </a:txBody>
+                  <a:tcPr marL="6350" marR="6350" marT="6350" marB="0" anchor="b">
+                    <a:solidFill>
+                      <a:schemeClr val="bg2"/>
+                    </a:solidFill>
+                  </a:tcPr>
+                </a:tc>
+                <a:tc>
+                  <a:txBody>
+                    <a:bodyPr/>
+                    <a:lstStyle/>
+                    <a:p>
+                      <a:pPr algn="l" fontAlgn="b"/>
+                      <a:endParaRPr lang="en-DE" sz="800" b="0" i="0" u="none" strike="noStrike" dirty="0">
+                        <a:solidFill>
+                          <a:srgbClr val="000000"/>
+                        </a:solidFill>
+                        <a:effectLst/>
+                        <a:latin typeface="Courier"/>
+                      </a:endParaRPr>
+                    </a:p>
+                  </a:txBody>
+                  <a:tcPr marL="6350" marR="6350" marT="6350" marB="0" anchor="b">
+                    <a:solidFill>
+                      <a:schemeClr val="bg2"/>
+                    </a:solidFill>
+                  </a:tcPr>
+                </a:tc>
+                <a:tc>
+                  <a:txBody>
+                    <a:bodyPr/>
+                    <a:lstStyle/>
+                    <a:p>
+                      <a:pPr algn="l" fontAlgn="b"/>
+                      <a:endParaRPr lang="en-DE" sz="800" b="0" i="0" u="none" strike="noStrike" dirty="0">
+                        <a:solidFill>
+                          <a:srgbClr val="000000"/>
+                        </a:solidFill>
+                        <a:effectLst/>
+                        <a:latin typeface="Courier"/>
+                      </a:endParaRPr>
+                    </a:p>
+                  </a:txBody>
+                  <a:tcPr marL="6350" marR="6350" marT="6350" marB="0" anchor="b">
+                    <a:solidFill>
+                      <a:schemeClr val="bg2"/>
+                    </a:solidFill>
+                  </a:tcPr>
+                </a:tc>
+                <a:extLst>
+                  <a:ext uri="{0D108BD9-81ED-4DB2-BD59-A6C34878D82A}">
+                    <a16:rowId xmlns:a16="http://schemas.microsoft.com/office/drawing/2014/main" val="1078223716"/>
+                  </a:ext>
+                </a:extLst>
+              </a:tr>
+              <a:tr h="148431">
+                <a:tc>
+                  <a:txBody>
+                    <a:bodyPr/>
+                    <a:lstStyle/>
+                    <a:p>
+                      <a:pPr algn="l" fontAlgn="b"/>
+                      <a:endParaRPr lang="en-DE" sz="800" b="0" i="0" u="none" strike="noStrike" dirty="0">
+                        <a:solidFill>
+                          <a:srgbClr val="000000"/>
+                        </a:solidFill>
+                        <a:effectLst/>
+                        <a:latin typeface="Courier"/>
+                      </a:endParaRPr>
+                    </a:p>
+                  </a:txBody>
+                  <a:tcPr marL="6350" marR="6350" marT="6350" marB="0" anchor="b">
+                    <a:solidFill>
+                      <a:schemeClr val="bg2"/>
+                    </a:solidFill>
+                  </a:tcPr>
+                </a:tc>
+                <a:tc>
+                  <a:txBody>
+                    <a:bodyPr/>
+                    <a:lstStyle/>
+                    <a:p>
+                      <a:pPr algn="ctr" fontAlgn="b"/>
+                      <a:r>
+                        <a:rPr lang="en-DE" sz="800" u="none" strike="noStrike" dirty="0">
+                          <a:effectLst/>
+                        </a:rPr>
+                        <a:t>48</a:t>
+                      </a:r>
+                      <a:endParaRPr lang="en-DE" sz="800" b="1" i="0" u="none" strike="noStrike" dirty="0">
+                        <a:solidFill>
+                          <a:srgbClr val="000000"/>
+                        </a:solidFill>
+                        <a:effectLst/>
+                        <a:latin typeface="Courier"/>
+                      </a:endParaRPr>
+                    </a:p>
+                  </a:txBody>
+                  <a:tcPr marL="6350" marR="6350" marT="6350" marB="0" anchor="b">
+                    <a:lnBlToTr w="12700" cap="flat" cmpd="sng" algn="ctr">
+                      <a:noFill/>
+                      <a:prstDash val="solid"/>
+                      <a:round/>
+                      <a:headEnd type="none" w="med" len="med"/>
+                      <a:tailEnd type="none" w="med" len="med"/>
+                    </a:lnBlToTr>
+                    <a:solidFill>
+                      <a:schemeClr val="accent6">
+                        <a:lumMod val="60000"/>
+                        <a:lumOff val="40000"/>
+                      </a:schemeClr>
+                    </a:solidFill>
+                  </a:tcPr>
+                </a:tc>
+                <a:tc>
+                  <a:txBody>
+                    <a:bodyPr/>
+                    <a:lstStyle/>
+                    <a:p>
+                      <a:pPr algn="ctr" fontAlgn="b"/>
+                      <a:r>
+                        <a:rPr lang="en-DE" sz="800" u="none" strike="noStrike" dirty="0">
+                          <a:effectLst/>
+                        </a:rPr>
+                        <a:t>65</a:t>
+                      </a:r>
+                      <a:endParaRPr lang="en-DE" sz="800" b="1" i="0" u="none" strike="noStrike" dirty="0">
+                        <a:solidFill>
+                          <a:srgbClr val="000000"/>
+                        </a:solidFill>
+                        <a:effectLst/>
+                        <a:latin typeface="Courier"/>
+                      </a:endParaRPr>
+                    </a:p>
+                  </a:txBody>
+                  <a:tcPr marL="6350" marR="6350" marT="6350" marB="0" anchor="b">
+                    <a:lnBlToTr w="12700" cap="flat" cmpd="sng" algn="ctr">
+                      <a:noFill/>
+                      <a:prstDash val="solid"/>
+                      <a:round/>
+                      <a:headEnd type="none" w="med" len="med"/>
+                      <a:tailEnd type="none" w="med" len="med"/>
+                    </a:lnBlToTr>
+                    <a:solidFill>
+                      <a:schemeClr val="accent6">
+                        <a:lumMod val="60000"/>
+                        <a:lumOff val="40000"/>
+                      </a:schemeClr>
+                    </a:solidFill>
+                  </a:tcPr>
+                </a:tc>
+                <a:tc>
+                  <a:txBody>
+                    <a:bodyPr/>
+                    <a:lstStyle/>
+                    <a:p>
+                      <a:pPr algn="ctr" fontAlgn="b"/>
+                      <a:r>
+                        <a:rPr lang="en-DE" sz="800" u="none" strike="noStrike" dirty="0">
+                          <a:effectLst/>
+                        </a:rPr>
+                        <a:t>57</a:t>
+                      </a:r>
+                      <a:endParaRPr lang="en-DE" sz="800" b="1" i="0" u="none" strike="noStrike" dirty="0">
+                        <a:solidFill>
+                          <a:srgbClr val="000000"/>
+                        </a:solidFill>
+                        <a:effectLst/>
+                        <a:latin typeface="Courier"/>
+                      </a:endParaRPr>
+                    </a:p>
+                  </a:txBody>
+                  <a:tcPr marL="6350" marR="6350" marT="6350" marB="0" anchor="b">
+                    <a:lnBlToTr w="12700" cap="flat" cmpd="sng" algn="ctr">
+                      <a:noFill/>
+                      <a:prstDash val="solid"/>
+                      <a:round/>
+                      <a:headEnd type="none" w="med" len="med"/>
+                      <a:tailEnd type="none" w="med" len="med"/>
+                    </a:lnBlToTr>
+                    <a:solidFill>
+                      <a:schemeClr val="accent6">
+                        <a:lumMod val="60000"/>
+                        <a:lumOff val="40000"/>
+                      </a:schemeClr>
+                    </a:solidFill>
+                  </a:tcPr>
+                </a:tc>
+                <a:tc>
+                  <a:txBody>
+                    <a:bodyPr/>
+                    <a:lstStyle/>
+                    <a:p>
+                      <a:pPr algn="ctr" fontAlgn="b"/>
+                      <a:r>
+                        <a:rPr lang="en-DE" sz="800" u="none" strike="noStrike" dirty="0">
+                          <a:effectLst/>
+                        </a:rPr>
+                        <a:t>63</a:t>
+                      </a:r>
+                      <a:endParaRPr lang="en-DE" sz="800" b="1" i="0" u="none" strike="noStrike" dirty="0">
+                        <a:solidFill>
+                          <a:srgbClr val="000000"/>
+                        </a:solidFill>
+                        <a:effectLst/>
+                        <a:latin typeface="Courier"/>
+                      </a:endParaRPr>
+                    </a:p>
+                  </a:txBody>
+                  <a:tcPr marL="6350" marR="6350" marT="6350" marB="0" anchor="b">
+                    <a:lnBlToTr w="12700" cap="flat" cmpd="sng" algn="ctr">
+                      <a:noFill/>
+                      <a:prstDash val="solid"/>
+                      <a:round/>
+                      <a:headEnd type="none" w="med" len="med"/>
+                      <a:tailEnd type="none" w="med" len="med"/>
+                    </a:lnBlToTr>
+                    <a:solidFill>
+                      <a:schemeClr val="accent6">
+                        <a:lumMod val="60000"/>
+                        <a:lumOff val="40000"/>
+                      </a:schemeClr>
+                    </a:solidFill>
+                  </a:tcPr>
+                </a:tc>
+                <a:tc>
+                  <a:txBody>
+                    <a:bodyPr/>
+                    <a:lstStyle/>
+                    <a:p>
+                      <a:pPr algn="ctr" fontAlgn="b"/>
+                      <a:r>
+                        <a:rPr lang="en-DE" sz="800" u="none" strike="noStrike" dirty="0">
+                          <a:effectLst/>
+                        </a:rPr>
+                        <a:t>90</a:t>
+                      </a:r>
+                      <a:endParaRPr lang="en-DE" sz="800" b="1" i="0" u="none" strike="noStrike" dirty="0">
+                        <a:solidFill>
+                          <a:srgbClr val="000000"/>
+                        </a:solidFill>
+                        <a:effectLst/>
+                        <a:latin typeface="Courier"/>
+                      </a:endParaRPr>
+                    </a:p>
+                  </a:txBody>
+                  <a:tcPr marL="6350" marR="6350" marT="6350" marB="0" anchor="b">
+                    <a:lnBlToTr w="12700" cap="flat" cmpd="sng" algn="ctr">
+                      <a:noFill/>
+                      <a:prstDash val="solid"/>
+                      <a:round/>
+                      <a:headEnd type="none" w="med" len="med"/>
+                      <a:tailEnd type="none" w="med" len="med"/>
+                    </a:lnBlToTr>
+                    <a:solidFill>
+                      <a:schemeClr val="accent6">
+                        <a:lumMod val="60000"/>
+                        <a:lumOff val="40000"/>
+                      </a:schemeClr>
+                    </a:solidFill>
+                  </a:tcPr>
+                </a:tc>
+                <a:tc>
+                  <a:txBody>
+                    <a:bodyPr/>
+                    <a:lstStyle/>
+                    <a:p>
+                      <a:pPr algn="l" fontAlgn="b"/>
+                      <a:endParaRPr lang="en-DE" sz="800" b="0" i="0" u="none" strike="noStrike" dirty="0">
+                        <a:solidFill>
+                          <a:srgbClr val="000000"/>
+                        </a:solidFill>
+                        <a:effectLst/>
+                        <a:latin typeface="Courier"/>
+                      </a:endParaRPr>
+                    </a:p>
+                  </a:txBody>
+                  <a:tcPr marL="6350" marR="6350" marT="6350" marB="0" anchor="b">
+                    <a:solidFill>
+                      <a:schemeClr val="bg2"/>
+                    </a:solidFill>
+                  </a:tcPr>
+                </a:tc>
+                <a:extLst>
+                  <a:ext uri="{0D108BD9-81ED-4DB2-BD59-A6C34878D82A}">
+                    <a16:rowId xmlns:a16="http://schemas.microsoft.com/office/drawing/2014/main" val="3342974667"/>
+                  </a:ext>
+                </a:extLst>
+              </a:tr>
+              <a:tr h="148431">
+                <a:tc>
+                  <a:txBody>
+                    <a:bodyPr/>
+                    <a:lstStyle/>
+                    <a:p>
+                      <a:pPr algn="l" fontAlgn="b"/>
+                      <a:endParaRPr lang="en-DE" sz="800" b="0" i="0" u="none" strike="noStrike" dirty="0">
+                        <a:solidFill>
+                          <a:srgbClr val="000000"/>
+                        </a:solidFill>
+                        <a:effectLst/>
+                        <a:latin typeface="Courier"/>
+                      </a:endParaRPr>
+                    </a:p>
+                  </a:txBody>
+                  <a:tcPr marL="6350" marR="6350" marT="6350" marB="0" anchor="b">
+                    <a:solidFill>
+                      <a:schemeClr val="bg2"/>
+                    </a:solidFill>
+                  </a:tcPr>
+                </a:tc>
+                <a:tc>
+                  <a:txBody>
+                    <a:bodyPr/>
+                    <a:lstStyle/>
+                    <a:p>
+                      <a:pPr algn="ctr" fontAlgn="b"/>
+                      <a:r>
+                        <a:rPr lang="en-DE" sz="800" u="none" strike="noStrike" dirty="0">
+                          <a:effectLst/>
+                        </a:rPr>
+                        <a:t>56</a:t>
+                      </a:r>
+                      <a:endParaRPr lang="en-DE" sz="800" b="1" i="0" u="none" strike="noStrike" dirty="0">
+                        <a:solidFill>
+                          <a:srgbClr val="000000"/>
+                        </a:solidFill>
+                        <a:effectLst/>
+                        <a:latin typeface="Courier"/>
+                      </a:endParaRPr>
+                    </a:p>
+                  </a:txBody>
+                  <a:tcPr marL="6350" marR="6350" marT="6350" marB="0" anchor="b">
+                    <a:lnBlToTr w="12700" cap="flat" cmpd="sng" algn="ctr">
+                      <a:noFill/>
+                      <a:prstDash val="solid"/>
+                      <a:round/>
+                      <a:headEnd type="none" w="med" len="med"/>
+                      <a:tailEnd type="none" w="med" len="med"/>
+                    </a:lnBlToTr>
+                    <a:solidFill>
+                      <a:schemeClr val="accent6">
+                        <a:lumMod val="60000"/>
+                        <a:lumOff val="40000"/>
+                      </a:schemeClr>
+                    </a:solidFill>
+                  </a:tcPr>
+                </a:tc>
+                <a:tc>
+                  <a:txBody>
+                    <a:bodyPr/>
+                    <a:lstStyle/>
+                    <a:p>
+                      <a:pPr algn="ctr" fontAlgn="b"/>
+                      <a:r>
+                        <a:rPr lang="en-DE" sz="800" u="none" strike="noStrike" dirty="0">
+                          <a:effectLst/>
+                        </a:rPr>
+                        <a:t>73</a:t>
+                      </a:r>
+                      <a:endParaRPr lang="en-DE" sz="800" b="1" i="0" u="none" strike="noStrike" dirty="0">
+                        <a:solidFill>
+                          <a:srgbClr val="000000"/>
+                        </a:solidFill>
+                        <a:effectLst/>
+                        <a:latin typeface="Courier"/>
+                      </a:endParaRPr>
+                    </a:p>
+                  </a:txBody>
+                  <a:tcPr marL="6350" marR="6350" marT="6350" marB="0" anchor="b">
+                    <a:lnBlToTr w="12700" cap="flat" cmpd="sng" algn="ctr">
+                      <a:noFill/>
+                      <a:prstDash val="solid"/>
+                      <a:round/>
+                      <a:headEnd type="none" w="med" len="med"/>
+                      <a:tailEnd type="none" w="med" len="med"/>
+                    </a:lnBlToTr>
+                    <a:solidFill>
+                      <a:schemeClr val="accent6">
+                        <a:lumMod val="60000"/>
+                        <a:lumOff val="40000"/>
+                      </a:schemeClr>
+                    </a:solidFill>
+                  </a:tcPr>
+                </a:tc>
+                <a:tc>
+                  <a:txBody>
+                    <a:bodyPr/>
+                    <a:lstStyle/>
+                    <a:p>
+                      <a:pPr algn="ctr" fontAlgn="b"/>
+                      <a:r>
+                        <a:rPr lang="en-DE" sz="800" u="none" strike="noStrike" dirty="0">
+                          <a:effectLst/>
+                        </a:rPr>
+                        <a:t>61</a:t>
+                      </a:r>
+                      <a:endParaRPr lang="en-DE" sz="800" b="1" i="0" u="none" strike="noStrike" dirty="0">
+                        <a:solidFill>
+                          <a:srgbClr val="000000"/>
+                        </a:solidFill>
+                        <a:effectLst/>
+                        <a:latin typeface="Courier"/>
+                      </a:endParaRPr>
+                    </a:p>
+                  </a:txBody>
+                  <a:tcPr marL="6350" marR="6350" marT="6350" marB="0" anchor="b">
+                    <a:lnBlToTr w="12700" cap="flat" cmpd="sng" algn="ctr">
+                      <a:noFill/>
+                      <a:prstDash val="solid"/>
+                      <a:round/>
+                      <a:headEnd type="none" w="med" len="med"/>
+                      <a:tailEnd type="none" w="med" len="med"/>
+                    </a:lnBlToTr>
+                    <a:solidFill>
+                      <a:schemeClr val="accent6">
+                        <a:lumMod val="60000"/>
+                        <a:lumOff val="40000"/>
+                      </a:schemeClr>
+                    </a:solidFill>
+                  </a:tcPr>
+                </a:tc>
+                <a:tc>
+                  <a:txBody>
+                    <a:bodyPr/>
+                    <a:lstStyle/>
+                    <a:p>
+                      <a:pPr algn="ctr" fontAlgn="b"/>
+                      <a:r>
+                        <a:rPr lang="en-DE" sz="800" u="none" strike="noStrike" dirty="0">
+                          <a:effectLst/>
+                        </a:rPr>
+                        <a:t>60</a:t>
+                      </a:r>
+                      <a:endParaRPr lang="en-DE" sz="800" b="1" i="0" u="none" strike="noStrike" dirty="0">
+                        <a:solidFill>
+                          <a:srgbClr val="000000"/>
+                        </a:solidFill>
+                        <a:effectLst/>
+                        <a:latin typeface="Courier"/>
+                      </a:endParaRPr>
+                    </a:p>
+                  </a:txBody>
+                  <a:tcPr marL="6350" marR="6350" marT="6350" marB="0" anchor="b">
+                    <a:lnBlToTr w="12700" cap="flat" cmpd="sng" algn="ctr">
+                      <a:noFill/>
+                      <a:prstDash val="solid"/>
+                      <a:round/>
+                      <a:headEnd type="none" w="med" len="med"/>
+                      <a:tailEnd type="none" w="med" len="med"/>
+                    </a:lnBlToTr>
+                    <a:solidFill>
+                      <a:schemeClr val="accent6">
+                        <a:lumMod val="60000"/>
+                        <a:lumOff val="40000"/>
+                      </a:schemeClr>
+                    </a:solidFill>
+                  </a:tcPr>
+                </a:tc>
+                <a:tc>
+                  <a:txBody>
+                    <a:bodyPr/>
+                    <a:lstStyle/>
+                    <a:p>
+                      <a:pPr algn="ctr" fontAlgn="b"/>
+                      <a:r>
+                        <a:rPr lang="en-DE" sz="800" u="none" strike="noStrike" dirty="0">
+                          <a:effectLst/>
+                        </a:rPr>
+                        <a:t>73</a:t>
+                      </a:r>
+                      <a:endParaRPr lang="en-DE" sz="800" b="1" i="0" u="none" strike="noStrike" dirty="0">
+                        <a:solidFill>
+                          <a:srgbClr val="000000"/>
+                        </a:solidFill>
+                        <a:effectLst/>
+                        <a:latin typeface="Courier"/>
+                      </a:endParaRPr>
+                    </a:p>
+                  </a:txBody>
+                  <a:tcPr marL="6350" marR="6350" marT="6350" marB="0" anchor="b">
+                    <a:lnBlToTr w="12700" cap="flat" cmpd="sng" algn="ctr">
+                      <a:noFill/>
+                      <a:prstDash val="solid"/>
+                      <a:round/>
+                      <a:headEnd type="none" w="med" len="med"/>
+                      <a:tailEnd type="none" w="med" len="med"/>
+                    </a:lnBlToTr>
+                    <a:solidFill>
+                      <a:schemeClr val="accent6">
+                        <a:lumMod val="60000"/>
+                        <a:lumOff val="40000"/>
+                      </a:schemeClr>
+                    </a:solidFill>
+                  </a:tcPr>
+                </a:tc>
+                <a:tc>
+                  <a:txBody>
+                    <a:bodyPr/>
+                    <a:lstStyle/>
+                    <a:p>
+                      <a:pPr algn="l" fontAlgn="b"/>
+                      <a:endParaRPr lang="en-DE" sz="800" b="0" i="0" u="none" strike="noStrike" dirty="0">
+                        <a:solidFill>
+                          <a:srgbClr val="000000"/>
+                        </a:solidFill>
+                        <a:effectLst/>
+                        <a:latin typeface="Courier"/>
+                      </a:endParaRPr>
+                    </a:p>
+                  </a:txBody>
+                  <a:tcPr marL="6350" marR="6350" marT="6350" marB="0" anchor="b">
+                    <a:solidFill>
+                      <a:schemeClr val="bg2"/>
+                    </a:solidFill>
+                  </a:tcPr>
+                </a:tc>
+                <a:extLst>
+                  <a:ext uri="{0D108BD9-81ED-4DB2-BD59-A6C34878D82A}">
+                    <a16:rowId xmlns:a16="http://schemas.microsoft.com/office/drawing/2014/main" val="736121480"/>
+                  </a:ext>
+                </a:extLst>
+              </a:tr>
+              <a:tr h="148431">
+                <a:tc>
+                  <a:txBody>
+                    <a:bodyPr/>
+                    <a:lstStyle/>
+                    <a:p>
+                      <a:pPr algn="l" fontAlgn="b"/>
+                      <a:endParaRPr lang="en-DE" sz="800" b="0" i="0" u="none" strike="noStrike" dirty="0">
+                        <a:solidFill>
+                          <a:srgbClr val="000000"/>
+                        </a:solidFill>
+                        <a:effectLst/>
+                        <a:latin typeface="Courier"/>
+                      </a:endParaRPr>
+                    </a:p>
+                  </a:txBody>
+                  <a:tcPr marL="6350" marR="6350" marT="6350" marB="0" anchor="b">
+                    <a:solidFill>
+                      <a:schemeClr val="bg2"/>
+                    </a:solidFill>
+                  </a:tcPr>
+                </a:tc>
+                <a:tc>
+                  <a:txBody>
+                    <a:bodyPr/>
+                    <a:lstStyle/>
+                    <a:p>
+                      <a:pPr algn="ctr" fontAlgn="b"/>
+                      <a:r>
+                        <a:rPr lang="en-DE" sz="800" u="none" strike="noStrike">
+                          <a:effectLst/>
+                        </a:rPr>
+                        <a:t>46</a:t>
+                      </a:r>
+                      <a:endParaRPr lang="en-DE" sz="800" b="1" i="0" u="none" strike="noStrike">
+                        <a:solidFill>
+                          <a:srgbClr val="000000"/>
+                        </a:solidFill>
+                        <a:effectLst/>
+                        <a:latin typeface="Courier"/>
+                      </a:endParaRPr>
+                    </a:p>
+                  </a:txBody>
+                  <a:tcPr marL="6350" marR="6350" marT="6350" marB="0" anchor="b">
+                    <a:lnBlToTr w="12700" cap="flat" cmpd="sng" algn="ctr">
+                      <a:noFill/>
+                      <a:prstDash val="solid"/>
+                      <a:round/>
+                      <a:headEnd type="none" w="med" len="med"/>
+                      <a:tailEnd type="none" w="med" len="med"/>
+                    </a:lnBlToTr>
+                    <a:solidFill>
+                      <a:schemeClr val="accent6">
+                        <a:lumMod val="60000"/>
+                        <a:lumOff val="40000"/>
+                      </a:schemeClr>
+                    </a:solidFill>
+                  </a:tcPr>
+                </a:tc>
+                <a:tc>
+                  <a:txBody>
+                    <a:bodyPr/>
+                    <a:lstStyle/>
+                    <a:p>
+                      <a:pPr algn="ctr" fontAlgn="b"/>
+                      <a:r>
+                        <a:rPr lang="en-DE" sz="800" u="none" strike="noStrike" dirty="0">
+                          <a:effectLst/>
+                        </a:rPr>
+                        <a:t>56</a:t>
+                      </a:r>
+                      <a:endParaRPr lang="en-DE" sz="800" b="1" i="0" u="none" strike="noStrike" dirty="0">
+                        <a:solidFill>
+                          <a:srgbClr val="000000"/>
+                        </a:solidFill>
+                        <a:effectLst/>
+                        <a:latin typeface="Courier"/>
+                      </a:endParaRPr>
+                    </a:p>
+                  </a:txBody>
+                  <a:tcPr marL="6350" marR="6350" marT="6350" marB="0" anchor="b">
+                    <a:lnBlToTr w="12700" cap="flat" cmpd="sng" algn="ctr">
+                      <a:noFill/>
+                      <a:prstDash val="solid"/>
+                      <a:round/>
+                      <a:headEnd type="none" w="med" len="med"/>
+                      <a:tailEnd type="none" w="med" len="med"/>
+                    </a:lnBlToTr>
+                    <a:solidFill>
+                      <a:schemeClr val="accent6">
+                        <a:lumMod val="60000"/>
+                        <a:lumOff val="40000"/>
+                      </a:schemeClr>
+                    </a:solidFill>
+                  </a:tcPr>
+                </a:tc>
+                <a:tc>
+                  <a:txBody>
+                    <a:bodyPr/>
+                    <a:lstStyle/>
+                    <a:p>
+                      <a:pPr algn="ctr" fontAlgn="b"/>
+                      <a:r>
+                        <a:rPr lang="en-DE" sz="800" u="none" strike="noStrike" dirty="0">
+                          <a:solidFill>
+                            <a:schemeClr val="tx1"/>
+                          </a:solidFill>
+                          <a:effectLst/>
+                        </a:rPr>
+                        <a:t>57</a:t>
+                      </a:r>
+                      <a:endParaRPr lang="en-DE" sz="800" b="1" i="0" u="none" strike="noStrike" dirty="0">
+                        <a:solidFill>
+                          <a:schemeClr val="tx1"/>
+                        </a:solidFill>
+                        <a:effectLst/>
+                        <a:latin typeface="Courier"/>
+                      </a:endParaRPr>
+                    </a:p>
+                  </a:txBody>
+                  <a:tcPr marL="6350" marR="6350" marT="6350" marB="0" anchor="b">
+                    <a:lnBlToTr w="12700" cap="flat" cmpd="sng" algn="ctr">
+                      <a:noFill/>
+                      <a:prstDash val="solid"/>
+                      <a:round/>
+                      <a:headEnd type="none" w="med" len="med"/>
+                      <a:tailEnd type="none" w="med" len="med"/>
+                    </a:lnBlToTr>
+                    <a:solidFill>
+                      <a:schemeClr val="accent6">
+                        <a:lumMod val="60000"/>
+                        <a:lumOff val="40000"/>
+                      </a:schemeClr>
+                    </a:solidFill>
+                  </a:tcPr>
+                </a:tc>
+                <a:tc>
+                  <a:txBody>
+                    <a:bodyPr/>
+                    <a:lstStyle/>
+                    <a:p>
+                      <a:pPr algn="ctr" fontAlgn="b"/>
+                      <a:r>
+                        <a:rPr lang="en-DE" sz="800" u="none" strike="noStrike" dirty="0">
+                          <a:effectLst/>
+                        </a:rPr>
+                        <a:t>61</a:t>
+                      </a:r>
+                      <a:endParaRPr lang="en-DE" sz="800" b="1" i="0" u="none" strike="noStrike" dirty="0">
+                        <a:solidFill>
+                          <a:srgbClr val="000000"/>
+                        </a:solidFill>
+                        <a:effectLst/>
+                        <a:latin typeface="Courier"/>
+                      </a:endParaRPr>
+                    </a:p>
+                  </a:txBody>
+                  <a:tcPr marL="6350" marR="6350" marT="6350" marB="0" anchor="b">
+                    <a:lnBlToTr w="12700" cap="flat" cmpd="sng" algn="ctr">
+                      <a:noFill/>
+                      <a:prstDash val="solid"/>
+                      <a:round/>
+                      <a:headEnd type="none" w="med" len="med"/>
+                      <a:tailEnd type="none" w="med" len="med"/>
+                    </a:lnBlToTr>
+                    <a:solidFill>
+                      <a:schemeClr val="accent6">
+                        <a:lumMod val="60000"/>
+                        <a:lumOff val="40000"/>
+                      </a:schemeClr>
+                    </a:solidFill>
+                  </a:tcPr>
+                </a:tc>
+                <a:tc>
+                  <a:txBody>
+                    <a:bodyPr/>
+                    <a:lstStyle/>
+                    <a:p>
+                      <a:pPr algn="ctr" fontAlgn="b"/>
+                      <a:r>
+                        <a:rPr lang="en-DE" sz="800" u="none" strike="noStrike">
+                          <a:effectLst/>
+                        </a:rPr>
+                        <a:t>83</a:t>
+                      </a:r>
+                      <a:endParaRPr lang="en-DE" sz="800" b="1" i="0" u="none" strike="noStrike">
+                        <a:solidFill>
+                          <a:srgbClr val="000000"/>
+                        </a:solidFill>
+                        <a:effectLst/>
+                        <a:latin typeface="Courier"/>
+                      </a:endParaRPr>
+                    </a:p>
+                  </a:txBody>
+                  <a:tcPr marL="6350" marR="6350" marT="6350" marB="0" anchor="b">
+                    <a:lnBlToTr w="12700" cap="flat" cmpd="sng" algn="ctr">
+                      <a:noFill/>
+                      <a:prstDash val="solid"/>
+                      <a:round/>
+                      <a:headEnd type="none" w="med" len="med"/>
+                      <a:tailEnd type="none" w="med" len="med"/>
+                    </a:lnBlToTr>
+                    <a:solidFill>
+                      <a:schemeClr val="accent6">
+                        <a:lumMod val="60000"/>
+                        <a:lumOff val="40000"/>
+                      </a:schemeClr>
+                    </a:solidFill>
+                  </a:tcPr>
+                </a:tc>
+                <a:tc>
+                  <a:txBody>
+                    <a:bodyPr/>
+                    <a:lstStyle/>
+                    <a:p>
+                      <a:pPr algn="l" fontAlgn="b"/>
+                      <a:endParaRPr lang="en-DE" sz="800" b="0" i="0" u="none" strike="noStrike" dirty="0">
+                        <a:solidFill>
+                          <a:srgbClr val="000000"/>
+                        </a:solidFill>
+                        <a:effectLst/>
+                        <a:latin typeface="Courier"/>
+                      </a:endParaRPr>
+                    </a:p>
+                  </a:txBody>
+                  <a:tcPr marL="6350" marR="6350" marT="6350" marB="0" anchor="b">
+                    <a:solidFill>
+                      <a:schemeClr val="bg2"/>
+                    </a:solidFill>
+                  </a:tcPr>
+                </a:tc>
+                <a:extLst>
+                  <a:ext uri="{0D108BD9-81ED-4DB2-BD59-A6C34878D82A}">
+                    <a16:rowId xmlns:a16="http://schemas.microsoft.com/office/drawing/2014/main" val="2968588688"/>
+                  </a:ext>
+                </a:extLst>
+              </a:tr>
+              <a:tr h="148431">
+                <a:tc>
+                  <a:txBody>
+                    <a:bodyPr/>
+                    <a:lstStyle/>
+                    <a:p>
+                      <a:pPr algn="l" fontAlgn="b"/>
+                      <a:endParaRPr lang="en-DE" sz="800" b="0" i="0" u="none" strike="noStrike" dirty="0">
+                        <a:solidFill>
+                          <a:srgbClr val="000000"/>
+                        </a:solidFill>
+                        <a:effectLst/>
+                        <a:latin typeface="Courier"/>
+                      </a:endParaRPr>
+                    </a:p>
+                  </a:txBody>
+                  <a:tcPr marL="6350" marR="6350" marT="6350" marB="0" anchor="b">
+                    <a:solidFill>
+                      <a:schemeClr val="bg2"/>
+                    </a:solidFill>
+                  </a:tcPr>
+                </a:tc>
+                <a:tc>
+                  <a:txBody>
+                    <a:bodyPr/>
+                    <a:lstStyle/>
+                    <a:p>
+                      <a:pPr algn="ctr" fontAlgn="b"/>
+                      <a:r>
+                        <a:rPr lang="en-DE" sz="800" u="none" strike="noStrike">
+                          <a:effectLst/>
+                        </a:rPr>
+                        <a:t>54</a:t>
+                      </a:r>
+                      <a:endParaRPr lang="en-DE" sz="800" b="1" i="0" u="none" strike="noStrike">
+                        <a:solidFill>
+                          <a:srgbClr val="000000"/>
+                        </a:solidFill>
+                        <a:effectLst/>
+                        <a:latin typeface="Courier"/>
+                      </a:endParaRPr>
+                    </a:p>
+                  </a:txBody>
+                  <a:tcPr marL="6350" marR="6350" marT="6350" marB="0" anchor="b">
+                    <a:lnBlToTr w="12700" cap="flat" cmpd="sng" algn="ctr">
+                      <a:noFill/>
+                      <a:prstDash val="solid"/>
+                      <a:round/>
+                      <a:headEnd type="none" w="med" len="med"/>
+                      <a:tailEnd type="none" w="med" len="med"/>
+                    </a:lnBlToTr>
+                    <a:solidFill>
+                      <a:schemeClr val="accent6">
+                        <a:lumMod val="60000"/>
+                        <a:lumOff val="40000"/>
+                      </a:schemeClr>
+                    </a:solidFill>
+                  </a:tcPr>
+                </a:tc>
+                <a:tc>
+                  <a:txBody>
+                    <a:bodyPr/>
+                    <a:lstStyle/>
+                    <a:p>
+                      <a:pPr algn="ctr" fontAlgn="b"/>
+                      <a:r>
+                        <a:rPr lang="en-DE" sz="800" u="none" strike="noStrike">
+                          <a:effectLst/>
+                        </a:rPr>
+                        <a:t>55</a:t>
+                      </a:r>
+                      <a:endParaRPr lang="en-DE" sz="800" b="1" i="0" u="none" strike="noStrike">
+                        <a:solidFill>
+                          <a:srgbClr val="000000"/>
+                        </a:solidFill>
+                        <a:effectLst/>
+                        <a:latin typeface="Courier"/>
+                      </a:endParaRPr>
+                    </a:p>
+                  </a:txBody>
+                  <a:tcPr marL="6350" marR="6350" marT="6350" marB="0" anchor="b">
+                    <a:lnBlToTr w="12700" cap="flat" cmpd="sng" algn="ctr">
+                      <a:noFill/>
+                      <a:prstDash val="solid"/>
+                      <a:round/>
+                      <a:headEnd type="none" w="med" len="med"/>
+                      <a:tailEnd type="none" w="med" len="med"/>
+                    </a:lnBlToTr>
+                    <a:solidFill>
+                      <a:schemeClr val="accent6">
+                        <a:lumMod val="60000"/>
+                        <a:lumOff val="40000"/>
+                      </a:schemeClr>
+                    </a:solidFill>
+                  </a:tcPr>
+                </a:tc>
+                <a:tc>
+                  <a:txBody>
+                    <a:bodyPr/>
+                    <a:lstStyle/>
+                    <a:p>
+                      <a:pPr algn="ctr" fontAlgn="b"/>
+                      <a:r>
+                        <a:rPr lang="en-DE" sz="800" u="none" strike="noStrike">
+                          <a:effectLst/>
+                        </a:rPr>
+                        <a:t>58</a:t>
+                      </a:r>
+                      <a:endParaRPr lang="en-DE" sz="800" b="1" i="0" u="none" strike="noStrike">
+                        <a:solidFill>
+                          <a:srgbClr val="000000"/>
+                        </a:solidFill>
+                        <a:effectLst/>
+                        <a:latin typeface="Courier"/>
+                      </a:endParaRPr>
+                    </a:p>
+                  </a:txBody>
+                  <a:tcPr marL="6350" marR="6350" marT="6350" marB="0" anchor="b">
+                    <a:lnBlToTr w="12700" cap="flat" cmpd="sng" algn="ctr">
+                      <a:noFill/>
+                      <a:prstDash val="solid"/>
+                      <a:round/>
+                      <a:headEnd type="none" w="med" len="med"/>
+                      <a:tailEnd type="none" w="med" len="med"/>
+                    </a:lnBlToTr>
+                    <a:solidFill>
+                      <a:schemeClr val="accent6">
+                        <a:lumMod val="60000"/>
+                        <a:lumOff val="40000"/>
+                      </a:schemeClr>
+                    </a:solidFill>
+                  </a:tcPr>
+                </a:tc>
+                <a:tc>
+                  <a:txBody>
+                    <a:bodyPr/>
+                    <a:lstStyle/>
+                    <a:p>
+                      <a:pPr algn="ctr" fontAlgn="b"/>
+                      <a:r>
+                        <a:rPr lang="en-DE" sz="800" u="none" strike="noStrike" dirty="0">
+                          <a:effectLst/>
+                        </a:rPr>
+                        <a:t>80</a:t>
+                      </a:r>
+                      <a:endParaRPr lang="en-DE" sz="800" b="1" i="0" u="none" strike="noStrike" dirty="0">
+                        <a:solidFill>
+                          <a:srgbClr val="000000"/>
+                        </a:solidFill>
+                        <a:effectLst/>
+                        <a:latin typeface="Courier"/>
+                      </a:endParaRPr>
+                    </a:p>
+                  </a:txBody>
+                  <a:tcPr marL="6350" marR="6350" marT="6350" marB="0" anchor="b">
+                    <a:lnBlToTr w="12700" cap="flat" cmpd="sng" algn="ctr">
+                      <a:noFill/>
+                      <a:prstDash val="solid"/>
+                      <a:round/>
+                      <a:headEnd type="none" w="med" len="med"/>
+                      <a:tailEnd type="none" w="med" len="med"/>
+                    </a:lnBlToTr>
+                    <a:solidFill>
+                      <a:schemeClr val="accent6">
+                        <a:lumMod val="60000"/>
+                        <a:lumOff val="40000"/>
+                      </a:schemeClr>
+                    </a:solidFill>
+                  </a:tcPr>
+                </a:tc>
+                <a:tc>
+                  <a:txBody>
+                    <a:bodyPr/>
+                    <a:lstStyle/>
+                    <a:p>
+                      <a:pPr algn="ctr" fontAlgn="b"/>
+                      <a:r>
+                        <a:rPr lang="en-DE" sz="800" u="none" strike="noStrike" dirty="0">
+                          <a:effectLst/>
+                        </a:rPr>
+                        <a:t>89</a:t>
+                      </a:r>
+                      <a:endParaRPr lang="en-DE" sz="800" b="1" i="0" u="none" strike="noStrike" dirty="0">
+                        <a:solidFill>
+                          <a:srgbClr val="000000"/>
+                        </a:solidFill>
+                        <a:effectLst/>
+                        <a:latin typeface="Courier"/>
+                      </a:endParaRPr>
+                    </a:p>
+                  </a:txBody>
+                  <a:tcPr marL="6350" marR="6350" marT="6350" marB="0" anchor="b">
+                    <a:lnBlToTr w="12700" cap="flat" cmpd="sng" algn="ctr">
+                      <a:noFill/>
+                      <a:prstDash val="solid"/>
+                      <a:round/>
+                      <a:headEnd type="none" w="med" len="med"/>
+                      <a:tailEnd type="none" w="med" len="med"/>
+                    </a:lnBlToTr>
+                    <a:solidFill>
+                      <a:schemeClr val="accent6">
+                        <a:lumMod val="60000"/>
+                        <a:lumOff val="40000"/>
+                      </a:schemeClr>
+                    </a:solidFill>
+                  </a:tcPr>
+                </a:tc>
+                <a:tc>
+                  <a:txBody>
+                    <a:bodyPr/>
+                    <a:lstStyle/>
+                    <a:p>
+                      <a:pPr algn="l" fontAlgn="b"/>
+                      <a:endParaRPr lang="en-DE" sz="800" b="0" i="0" u="none" strike="noStrike" dirty="0">
+                        <a:solidFill>
+                          <a:srgbClr val="000000"/>
+                        </a:solidFill>
+                        <a:effectLst/>
+                        <a:latin typeface="Courier"/>
+                      </a:endParaRPr>
+                    </a:p>
+                  </a:txBody>
+                  <a:tcPr marL="6350" marR="6350" marT="6350" marB="0" anchor="b">
+                    <a:solidFill>
+                      <a:schemeClr val="bg2"/>
+                    </a:solidFill>
+                  </a:tcPr>
+                </a:tc>
+                <a:extLst>
+                  <a:ext uri="{0D108BD9-81ED-4DB2-BD59-A6C34878D82A}">
+                    <a16:rowId xmlns:a16="http://schemas.microsoft.com/office/drawing/2014/main" val="1128576129"/>
+                  </a:ext>
+                </a:extLst>
+              </a:tr>
+              <a:tr h="148431">
+                <a:tc>
+                  <a:txBody>
+                    <a:bodyPr/>
+                    <a:lstStyle/>
+                    <a:p>
+                      <a:pPr algn="l" fontAlgn="b"/>
+                      <a:endParaRPr lang="en-DE" sz="800" b="0" i="0" u="none" strike="noStrike" dirty="0">
+                        <a:solidFill>
+                          <a:srgbClr val="000000"/>
+                        </a:solidFill>
+                        <a:effectLst/>
+                        <a:latin typeface="Courier"/>
+                      </a:endParaRPr>
+                    </a:p>
+                  </a:txBody>
+                  <a:tcPr marL="6350" marR="6350" marT="6350" marB="0" anchor="b">
+                    <a:solidFill>
+                      <a:schemeClr val="bg2"/>
+                    </a:solidFill>
+                  </a:tcPr>
+                </a:tc>
+                <a:tc>
+                  <a:txBody>
+                    <a:bodyPr/>
+                    <a:lstStyle/>
+                    <a:p>
+                      <a:pPr algn="ctr" fontAlgn="b"/>
+                      <a:r>
+                        <a:rPr lang="en-DE" sz="800" u="none" strike="noStrike">
+                          <a:effectLst/>
+                        </a:rPr>
+                        <a:t>45</a:t>
+                      </a:r>
+                      <a:endParaRPr lang="en-DE" sz="800" b="1" i="0" u="none" strike="noStrike">
+                        <a:solidFill>
+                          <a:srgbClr val="000000"/>
+                        </a:solidFill>
+                        <a:effectLst/>
+                        <a:latin typeface="Courier"/>
+                      </a:endParaRPr>
+                    </a:p>
+                  </a:txBody>
+                  <a:tcPr marL="6350" marR="6350" marT="6350" marB="0" anchor="b">
+                    <a:lnBlToTr w="12700" cap="flat" cmpd="sng" algn="ctr">
+                      <a:noFill/>
+                      <a:prstDash val="solid"/>
+                      <a:round/>
+                      <a:headEnd type="none" w="med" len="med"/>
+                      <a:tailEnd type="none" w="med" len="med"/>
+                    </a:lnBlToTr>
+                    <a:solidFill>
+                      <a:schemeClr val="accent6">
+                        <a:lumMod val="60000"/>
+                        <a:lumOff val="40000"/>
+                      </a:schemeClr>
+                    </a:solidFill>
+                  </a:tcPr>
+                </a:tc>
+                <a:tc>
+                  <a:txBody>
+                    <a:bodyPr/>
+                    <a:lstStyle/>
+                    <a:p>
+                      <a:pPr algn="ctr" fontAlgn="b"/>
+                      <a:r>
+                        <a:rPr lang="en-DE" sz="800" u="none" strike="noStrike">
+                          <a:effectLst/>
+                        </a:rPr>
+                        <a:t>68</a:t>
+                      </a:r>
+                      <a:endParaRPr lang="en-DE" sz="800" b="1" i="0" u="none" strike="noStrike">
+                        <a:solidFill>
+                          <a:srgbClr val="000000"/>
+                        </a:solidFill>
+                        <a:effectLst/>
+                        <a:latin typeface="Courier"/>
+                      </a:endParaRPr>
+                    </a:p>
+                  </a:txBody>
+                  <a:tcPr marL="6350" marR="6350" marT="6350" marB="0" anchor="b">
+                    <a:lnBlToTr w="12700" cap="flat" cmpd="sng" algn="ctr">
+                      <a:noFill/>
+                      <a:prstDash val="solid"/>
+                      <a:round/>
+                      <a:headEnd type="none" w="med" len="med"/>
+                      <a:tailEnd type="none" w="med" len="med"/>
+                    </a:lnBlToTr>
+                    <a:solidFill>
+                      <a:schemeClr val="accent6">
+                        <a:lumMod val="60000"/>
+                        <a:lumOff val="40000"/>
+                      </a:schemeClr>
+                    </a:solidFill>
+                  </a:tcPr>
+                </a:tc>
+                <a:tc>
+                  <a:txBody>
+                    <a:bodyPr/>
+                    <a:lstStyle/>
+                    <a:p>
+                      <a:pPr algn="ctr" fontAlgn="b"/>
+                      <a:r>
+                        <a:rPr lang="en-DE" sz="800" u="none" strike="noStrike">
+                          <a:effectLst/>
+                        </a:rPr>
+                        <a:t>73</a:t>
+                      </a:r>
+                      <a:endParaRPr lang="en-DE" sz="800" b="1" i="0" u="none" strike="noStrike">
+                        <a:solidFill>
+                          <a:srgbClr val="000000"/>
+                        </a:solidFill>
+                        <a:effectLst/>
+                        <a:latin typeface="Courier"/>
+                      </a:endParaRPr>
+                    </a:p>
+                  </a:txBody>
+                  <a:tcPr marL="6350" marR="6350" marT="6350" marB="0" anchor="b">
+                    <a:lnBlToTr w="12700" cap="flat" cmpd="sng" algn="ctr">
+                      <a:noFill/>
+                      <a:prstDash val="solid"/>
+                      <a:round/>
+                      <a:headEnd type="none" w="med" len="med"/>
+                      <a:tailEnd type="none" w="med" len="med"/>
+                    </a:lnBlToTr>
+                    <a:solidFill>
+                      <a:schemeClr val="accent6">
+                        <a:lumMod val="60000"/>
+                        <a:lumOff val="40000"/>
+                      </a:schemeClr>
+                    </a:solidFill>
+                  </a:tcPr>
+                </a:tc>
+                <a:tc>
+                  <a:txBody>
+                    <a:bodyPr/>
+                    <a:lstStyle/>
+                    <a:p>
+                      <a:pPr algn="ctr" fontAlgn="b"/>
+                      <a:r>
+                        <a:rPr lang="en-DE" sz="800" u="none" strike="noStrike" dirty="0">
+                          <a:effectLst/>
+                        </a:rPr>
+                        <a:t>74</a:t>
+                      </a:r>
+                      <a:endParaRPr lang="en-DE" sz="800" b="1" i="0" u="none" strike="noStrike" dirty="0">
+                        <a:solidFill>
+                          <a:srgbClr val="000000"/>
+                        </a:solidFill>
+                        <a:effectLst/>
+                        <a:latin typeface="Courier"/>
+                      </a:endParaRPr>
+                    </a:p>
+                  </a:txBody>
+                  <a:tcPr marL="6350" marR="6350" marT="6350" marB="0" anchor="b">
+                    <a:lnBlToTr w="12700" cap="flat" cmpd="sng" algn="ctr">
+                      <a:noFill/>
+                      <a:prstDash val="solid"/>
+                      <a:round/>
+                      <a:headEnd type="none" w="med" len="med"/>
+                      <a:tailEnd type="none" w="med" len="med"/>
+                    </a:lnBlToTr>
+                    <a:solidFill>
+                      <a:schemeClr val="accent6">
+                        <a:lumMod val="60000"/>
+                        <a:lumOff val="40000"/>
+                      </a:schemeClr>
+                    </a:solidFill>
+                  </a:tcPr>
+                </a:tc>
+                <a:tc>
+                  <a:txBody>
+                    <a:bodyPr/>
+                    <a:lstStyle/>
+                    <a:p>
+                      <a:pPr algn="ctr" fontAlgn="b"/>
+                      <a:r>
+                        <a:rPr lang="en-DE" sz="800" u="none" strike="noStrike" dirty="0">
+                          <a:effectLst/>
+                        </a:rPr>
+                        <a:t>86</a:t>
+                      </a:r>
+                      <a:endParaRPr lang="en-DE" sz="800" b="1" i="0" u="none" strike="noStrike" dirty="0">
+                        <a:solidFill>
+                          <a:srgbClr val="000000"/>
+                        </a:solidFill>
+                        <a:effectLst/>
+                        <a:latin typeface="Courier"/>
+                      </a:endParaRPr>
+                    </a:p>
+                  </a:txBody>
+                  <a:tcPr marL="6350" marR="6350" marT="6350" marB="0" anchor="b">
+                    <a:lnBlToTr w="12700" cap="flat" cmpd="sng" algn="ctr">
+                      <a:noFill/>
+                      <a:prstDash val="solid"/>
+                      <a:round/>
+                      <a:headEnd type="none" w="med" len="med"/>
+                      <a:tailEnd type="none" w="med" len="med"/>
+                    </a:lnBlToTr>
+                    <a:solidFill>
+                      <a:schemeClr val="accent6">
+                        <a:lumMod val="60000"/>
+                        <a:lumOff val="40000"/>
+                      </a:schemeClr>
+                    </a:solidFill>
+                  </a:tcPr>
+                </a:tc>
+                <a:tc>
+                  <a:txBody>
+                    <a:bodyPr/>
+                    <a:lstStyle/>
+                    <a:p>
+                      <a:pPr algn="l" fontAlgn="b"/>
+                      <a:endParaRPr lang="en-DE" sz="800" b="0" i="0" u="none" strike="noStrike" dirty="0">
+                        <a:solidFill>
+                          <a:srgbClr val="000000"/>
+                        </a:solidFill>
+                        <a:effectLst/>
+                        <a:latin typeface="Courier"/>
+                      </a:endParaRPr>
+                    </a:p>
+                  </a:txBody>
+                  <a:tcPr marL="6350" marR="6350" marT="6350" marB="0" anchor="b">
+                    <a:solidFill>
+                      <a:schemeClr val="bg2"/>
+                    </a:solidFill>
+                  </a:tcPr>
+                </a:tc>
+                <a:extLst>
+                  <a:ext uri="{0D108BD9-81ED-4DB2-BD59-A6C34878D82A}">
+                    <a16:rowId xmlns:a16="http://schemas.microsoft.com/office/drawing/2014/main" val="3659823931"/>
+                  </a:ext>
+                </a:extLst>
+              </a:tr>
+              <a:tr h="148431">
+                <a:tc>
+                  <a:txBody>
+                    <a:bodyPr/>
+                    <a:lstStyle/>
+                    <a:p>
+                      <a:pPr algn="l" fontAlgn="b"/>
+                      <a:endParaRPr lang="en-DE" sz="800" b="0" i="0" u="none" strike="noStrike" dirty="0">
+                        <a:solidFill>
+                          <a:srgbClr val="000000"/>
+                        </a:solidFill>
+                        <a:effectLst/>
+                        <a:latin typeface="Courier"/>
+                      </a:endParaRPr>
+                    </a:p>
+                  </a:txBody>
+                  <a:tcPr marL="6350" marR="6350" marT="6350" marB="0" anchor="b">
+                    <a:solidFill>
+                      <a:schemeClr val="bg2"/>
+                    </a:solidFill>
+                  </a:tcPr>
+                </a:tc>
+                <a:tc>
+                  <a:txBody>
+                    <a:bodyPr/>
+                    <a:lstStyle/>
+                    <a:p>
+                      <a:pPr algn="l" fontAlgn="b"/>
+                      <a:endParaRPr lang="en-DE" sz="800" b="0" i="0" u="none" strike="noStrike" dirty="0">
+                        <a:solidFill>
+                          <a:srgbClr val="000000"/>
+                        </a:solidFill>
+                        <a:effectLst/>
+                        <a:latin typeface="Courier"/>
+                      </a:endParaRPr>
+                    </a:p>
+                  </a:txBody>
+                  <a:tcPr marL="6350" marR="6350" marT="6350" marB="0" anchor="b">
+                    <a:solidFill>
+                      <a:schemeClr val="bg2"/>
+                    </a:solidFill>
+                  </a:tcPr>
+                </a:tc>
+                <a:tc>
+                  <a:txBody>
+                    <a:bodyPr/>
+                    <a:lstStyle/>
+                    <a:p>
+                      <a:pPr algn="l" fontAlgn="b"/>
+                      <a:endParaRPr lang="en-DE" sz="800" b="0" i="0" u="none" strike="noStrike" dirty="0">
+                        <a:solidFill>
+                          <a:srgbClr val="000000"/>
+                        </a:solidFill>
+                        <a:effectLst/>
+                        <a:latin typeface="Courier"/>
+                      </a:endParaRPr>
+                    </a:p>
+                  </a:txBody>
+                  <a:tcPr marL="6350" marR="6350" marT="6350" marB="0" anchor="b">
+                    <a:solidFill>
+                      <a:schemeClr val="bg2"/>
+                    </a:solidFill>
+                  </a:tcPr>
+                </a:tc>
+                <a:tc>
+                  <a:txBody>
+                    <a:bodyPr/>
+                    <a:lstStyle/>
+                    <a:p>
+                      <a:pPr algn="l" fontAlgn="b"/>
+                      <a:endParaRPr lang="en-DE" sz="800" b="0" i="0" u="none" strike="noStrike" dirty="0">
+                        <a:solidFill>
+                          <a:srgbClr val="000000"/>
+                        </a:solidFill>
+                        <a:effectLst/>
+                        <a:latin typeface="Courier"/>
+                      </a:endParaRPr>
+                    </a:p>
+                  </a:txBody>
+                  <a:tcPr marL="6350" marR="6350" marT="6350" marB="0" anchor="b">
+                    <a:solidFill>
+                      <a:schemeClr val="bg2"/>
+                    </a:solidFill>
+                  </a:tcPr>
+                </a:tc>
+                <a:tc>
+                  <a:txBody>
+                    <a:bodyPr/>
+                    <a:lstStyle/>
+                    <a:p>
+                      <a:pPr algn="l" fontAlgn="b"/>
+                      <a:endParaRPr lang="en-DE" sz="800" b="0" i="0" u="none" strike="noStrike" dirty="0">
+                        <a:solidFill>
+                          <a:srgbClr val="000000"/>
+                        </a:solidFill>
+                        <a:effectLst/>
+                        <a:latin typeface="Courier"/>
+                      </a:endParaRPr>
+                    </a:p>
+                  </a:txBody>
+                  <a:tcPr marL="6350" marR="6350" marT="6350" marB="0" anchor="b">
+                    <a:solidFill>
+                      <a:schemeClr val="bg2"/>
+                    </a:solidFill>
+                  </a:tcPr>
+                </a:tc>
+                <a:tc>
+                  <a:txBody>
+                    <a:bodyPr/>
+                    <a:lstStyle/>
+                    <a:p>
+                      <a:pPr algn="l" fontAlgn="b"/>
+                      <a:endParaRPr lang="en-DE" sz="800" b="0" i="0" u="none" strike="noStrike" dirty="0">
+                        <a:solidFill>
+                          <a:srgbClr val="000000"/>
+                        </a:solidFill>
+                        <a:effectLst/>
+                        <a:latin typeface="Courier"/>
+                      </a:endParaRPr>
+                    </a:p>
+                  </a:txBody>
+                  <a:tcPr marL="6350" marR="6350" marT="6350" marB="0" anchor="b">
+                    <a:solidFill>
+                      <a:schemeClr val="bg2"/>
+                    </a:solidFill>
+                  </a:tcPr>
+                </a:tc>
+                <a:tc>
+                  <a:txBody>
+                    <a:bodyPr/>
+                    <a:lstStyle/>
+                    <a:p>
+                      <a:pPr algn="l" fontAlgn="b"/>
+                      <a:endParaRPr lang="en-DE" sz="800" b="0" i="0" u="none" strike="noStrike" dirty="0">
+                        <a:solidFill>
+                          <a:srgbClr val="000000"/>
+                        </a:solidFill>
+                        <a:effectLst/>
+                        <a:latin typeface="Courier"/>
+                      </a:endParaRPr>
+                    </a:p>
+                  </a:txBody>
+                  <a:tcPr marL="6350" marR="6350" marT="6350" marB="0" anchor="b">
+                    <a:solidFill>
+                      <a:schemeClr val="bg2"/>
+                    </a:solidFill>
+                  </a:tcPr>
+                </a:tc>
+                <a:extLst>
+                  <a:ext uri="{0D108BD9-81ED-4DB2-BD59-A6C34878D82A}">
+                    <a16:rowId xmlns:a16="http://schemas.microsoft.com/office/drawing/2014/main" val="524604145"/>
+                  </a:ext>
+                </a:extLst>
+              </a:tr>
+              <a:tr h="148431">
+                <a:tc>
+                  <a:txBody>
+                    <a:bodyPr/>
+                    <a:lstStyle/>
+                    <a:p>
+                      <a:pPr algn="l" fontAlgn="b"/>
+                      <a:endParaRPr lang="en-DE" sz="800" b="0" i="0" u="none" strike="noStrike" dirty="0">
+                        <a:solidFill>
+                          <a:srgbClr val="000000"/>
+                        </a:solidFill>
+                        <a:effectLst/>
+                        <a:latin typeface="Courier"/>
+                      </a:endParaRPr>
+                    </a:p>
+                  </a:txBody>
+                  <a:tcPr marL="6350" marR="6350" marT="6350" marB="0" anchor="b">
+                    <a:solidFill>
+                      <a:schemeClr val="bg2"/>
+                    </a:solidFill>
+                  </a:tcPr>
+                </a:tc>
+                <a:tc>
+                  <a:txBody>
+                    <a:bodyPr/>
+                    <a:lstStyle/>
+                    <a:p>
+                      <a:pPr algn="l" fontAlgn="b"/>
+                      <a:endParaRPr lang="en-DE" sz="800" b="0" i="0" u="none" strike="noStrike" dirty="0">
+                        <a:solidFill>
+                          <a:srgbClr val="000000"/>
+                        </a:solidFill>
+                        <a:effectLst/>
+                        <a:latin typeface="Courier"/>
+                      </a:endParaRPr>
+                    </a:p>
+                  </a:txBody>
+                  <a:tcPr marL="6350" marR="6350" marT="6350" marB="0" anchor="b">
+                    <a:solidFill>
+                      <a:schemeClr val="bg2"/>
+                    </a:solidFill>
+                  </a:tcPr>
+                </a:tc>
+                <a:tc>
+                  <a:txBody>
+                    <a:bodyPr/>
+                    <a:lstStyle/>
+                    <a:p>
+                      <a:pPr algn="l" fontAlgn="b"/>
+                      <a:endParaRPr lang="en-DE" sz="800" b="0" i="0" u="none" strike="noStrike" dirty="0">
+                        <a:solidFill>
+                          <a:srgbClr val="000000"/>
+                        </a:solidFill>
+                        <a:effectLst/>
+                        <a:latin typeface="Courier"/>
+                      </a:endParaRPr>
+                    </a:p>
+                  </a:txBody>
+                  <a:tcPr marL="6350" marR="6350" marT="6350" marB="0" anchor="b">
+                    <a:solidFill>
+                      <a:schemeClr val="bg2"/>
+                    </a:solidFill>
+                  </a:tcPr>
+                </a:tc>
+                <a:tc>
+                  <a:txBody>
+                    <a:bodyPr/>
+                    <a:lstStyle/>
+                    <a:p>
+                      <a:pPr algn="l" fontAlgn="b"/>
+                      <a:endParaRPr lang="en-DE" sz="800" b="0" i="0" u="none" strike="noStrike" dirty="0">
+                        <a:solidFill>
+                          <a:srgbClr val="000000"/>
+                        </a:solidFill>
+                        <a:effectLst/>
+                        <a:latin typeface="Courier"/>
+                      </a:endParaRPr>
+                    </a:p>
+                  </a:txBody>
+                  <a:tcPr marL="6350" marR="6350" marT="6350" marB="0" anchor="b">
+                    <a:solidFill>
+                      <a:schemeClr val="bg2"/>
+                    </a:solidFill>
+                  </a:tcPr>
+                </a:tc>
+                <a:tc>
+                  <a:txBody>
+                    <a:bodyPr/>
+                    <a:lstStyle/>
+                    <a:p>
+                      <a:pPr algn="l" fontAlgn="b"/>
+                      <a:endParaRPr lang="en-DE" sz="800" b="0" i="0" u="none" strike="noStrike" dirty="0">
+                        <a:solidFill>
+                          <a:srgbClr val="000000"/>
+                        </a:solidFill>
+                        <a:effectLst/>
+                        <a:latin typeface="Courier"/>
+                      </a:endParaRPr>
+                    </a:p>
+                  </a:txBody>
+                  <a:tcPr marL="6350" marR="6350" marT="6350" marB="0" anchor="b">
+                    <a:solidFill>
+                      <a:schemeClr val="bg2"/>
+                    </a:solidFill>
+                  </a:tcPr>
+                </a:tc>
+                <a:tc>
+                  <a:txBody>
+                    <a:bodyPr/>
+                    <a:lstStyle/>
+                    <a:p>
+                      <a:pPr algn="l" fontAlgn="b"/>
+                      <a:endParaRPr lang="en-DE" sz="800" b="0" i="0" u="none" strike="noStrike" dirty="0">
+                        <a:solidFill>
+                          <a:srgbClr val="000000"/>
+                        </a:solidFill>
+                        <a:effectLst/>
+                        <a:latin typeface="Courier"/>
+                      </a:endParaRPr>
+                    </a:p>
+                  </a:txBody>
+                  <a:tcPr marL="6350" marR="6350" marT="6350" marB="0" anchor="b">
+                    <a:solidFill>
+                      <a:schemeClr val="bg2"/>
+                    </a:solidFill>
+                  </a:tcPr>
+                </a:tc>
+                <a:tc>
+                  <a:txBody>
+                    <a:bodyPr/>
+                    <a:lstStyle/>
+                    <a:p>
+                      <a:pPr algn="l" fontAlgn="b"/>
+                      <a:endParaRPr lang="en-DE" sz="800" b="0" i="0" u="none" strike="noStrike" dirty="0">
+                        <a:solidFill>
+                          <a:srgbClr val="000000"/>
+                        </a:solidFill>
+                        <a:effectLst/>
+                        <a:latin typeface="Courier"/>
+                      </a:endParaRPr>
+                    </a:p>
+                  </a:txBody>
+                  <a:tcPr marL="6350" marR="6350" marT="6350" marB="0" anchor="b">
+                    <a:solidFill>
+                      <a:schemeClr val="bg2"/>
+                    </a:solidFill>
+                  </a:tcPr>
+                </a:tc>
+                <a:extLst>
+                  <a:ext uri="{0D108BD9-81ED-4DB2-BD59-A6C34878D82A}">
+                    <a16:rowId xmlns:a16="http://schemas.microsoft.com/office/drawing/2014/main" val="3653312017"/>
+                  </a:ext>
+                </a:extLst>
+              </a:tr>
+            </a:tbl>
+          </a:graphicData>
+        </a:graphic>
+      </p:graphicFrame>
+      <p:graphicFrame>
+        <p:nvGraphicFramePr>
+          <p:cNvPr id="10" name="Table 9">
+            <a:extLst>
+              <a:ext uri="{FF2B5EF4-FFF2-40B4-BE49-F238E27FC236}">
+                <a16:creationId xmlns:a16="http://schemas.microsoft.com/office/drawing/2014/main" id="{89A5B807-E649-4B27-B348-5E09C7A05591}"/>
+              </a:ext>
+            </a:extLst>
+          </p:cNvPr>
+          <p:cNvGraphicFramePr>
+            <a:graphicFrameLocks noGrp="1"/>
+          </p:cNvGraphicFramePr>
+          <p:nvPr>
+            <p:extLst>
+              <p:ext uri="{D42A27DB-BD31-4B8C-83A1-F6EECF244321}">
+                <p14:modId xmlns:p14="http://schemas.microsoft.com/office/powerpoint/2010/main" val="1910671534"/>
+              </p:ext>
+            </p:extLst>
+          </p:nvPr>
+        </p:nvGraphicFramePr>
+        <p:xfrm>
+          <a:off x="4725542" y="1186389"/>
+          <a:ext cx="1072008" cy="1187448"/>
+        </p:xfrm>
+        <a:graphic>
+          <a:graphicData uri="http://schemas.openxmlformats.org/drawingml/2006/table">
+            <a:tbl>
+              <a:tblPr>
+                <a:tableStyleId>{5C22544A-7EE6-4342-B048-85BDC9FD1C3A}</a:tableStyleId>
+              </a:tblPr>
+              <a:tblGrid>
+                <a:gridCol w="156029">
+                  <a:extLst>
+                    <a:ext uri="{9D8B030D-6E8A-4147-A177-3AD203B41FA5}">
+                      <a16:colId xmlns:a16="http://schemas.microsoft.com/office/drawing/2014/main" val="28804164"/>
+                    </a:ext>
+                  </a:extLst>
+                </a:gridCol>
+                <a:gridCol w="156029">
+                  <a:extLst>
+                    <a:ext uri="{9D8B030D-6E8A-4147-A177-3AD203B41FA5}">
+                      <a16:colId xmlns:a16="http://schemas.microsoft.com/office/drawing/2014/main" val="3402452667"/>
+                    </a:ext>
+                  </a:extLst>
+                </a:gridCol>
+                <a:gridCol w="156029">
+                  <a:extLst>
+                    <a:ext uri="{9D8B030D-6E8A-4147-A177-3AD203B41FA5}">
+                      <a16:colId xmlns:a16="http://schemas.microsoft.com/office/drawing/2014/main" val="2822267976"/>
+                    </a:ext>
+                  </a:extLst>
+                </a:gridCol>
+                <a:gridCol w="156029">
+                  <a:extLst>
+                    <a:ext uri="{9D8B030D-6E8A-4147-A177-3AD203B41FA5}">
+                      <a16:colId xmlns:a16="http://schemas.microsoft.com/office/drawing/2014/main" val="758336612"/>
+                    </a:ext>
+                  </a:extLst>
+                </a:gridCol>
+                <a:gridCol w="157909">
+                  <a:extLst>
+                    <a:ext uri="{9D8B030D-6E8A-4147-A177-3AD203B41FA5}">
+                      <a16:colId xmlns:a16="http://schemas.microsoft.com/office/drawing/2014/main" val="1083904867"/>
+                    </a:ext>
+                  </a:extLst>
+                </a:gridCol>
+                <a:gridCol w="154149">
+                  <a:extLst>
+                    <a:ext uri="{9D8B030D-6E8A-4147-A177-3AD203B41FA5}">
+                      <a16:colId xmlns:a16="http://schemas.microsoft.com/office/drawing/2014/main" val="518805580"/>
+                    </a:ext>
+                  </a:extLst>
+                </a:gridCol>
+                <a:gridCol w="135834">
+                  <a:extLst>
+                    <a:ext uri="{9D8B030D-6E8A-4147-A177-3AD203B41FA5}">
+                      <a16:colId xmlns:a16="http://schemas.microsoft.com/office/drawing/2014/main" val="871853914"/>
+                    </a:ext>
+                  </a:extLst>
+                </a:gridCol>
+              </a:tblGrid>
+              <a:tr h="148431">
+                <a:tc>
+                  <a:txBody>
+                    <a:bodyPr/>
+                    <a:lstStyle/>
+                    <a:p>
+                      <a:pPr algn="l" fontAlgn="b"/>
+                      <a:endParaRPr lang="en-DE" sz="800" b="0" i="0" u="none" strike="noStrike" dirty="0">
+                        <a:solidFill>
+                          <a:srgbClr val="000000"/>
+                        </a:solidFill>
+                        <a:effectLst/>
+                        <a:latin typeface="Courier"/>
+                      </a:endParaRPr>
+                    </a:p>
+                  </a:txBody>
+                  <a:tcPr marL="6350" marR="6350" marT="6350" marB="0" anchor="b">
+                    <a:solidFill>
+                      <a:schemeClr val="bg2"/>
+                    </a:solidFill>
+                  </a:tcPr>
+                </a:tc>
+                <a:tc>
+                  <a:txBody>
+                    <a:bodyPr/>
+                    <a:lstStyle/>
+                    <a:p>
+                      <a:pPr algn="l" fontAlgn="b"/>
+                      <a:endParaRPr lang="en-DE" sz="800" b="0" i="0" u="none" strike="noStrike" dirty="0">
+                        <a:solidFill>
+                          <a:srgbClr val="000000"/>
+                        </a:solidFill>
+                        <a:effectLst/>
+                        <a:latin typeface="Courier"/>
+                      </a:endParaRPr>
+                    </a:p>
+                  </a:txBody>
+                  <a:tcPr marL="6350" marR="6350" marT="6350" marB="0" anchor="b">
+                    <a:solidFill>
+                      <a:schemeClr val="bg2"/>
+                    </a:solidFill>
+                  </a:tcPr>
+                </a:tc>
+                <a:tc>
+                  <a:txBody>
+                    <a:bodyPr/>
+                    <a:lstStyle/>
+                    <a:p>
+                      <a:pPr algn="l" fontAlgn="b"/>
+                      <a:endParaRPr lang="en-DE" sz="800" b="0" i="0" u="none" strike="noStrike" dirty="0">
+                        <a:solidFill>
+                          <a:srgbClr val="000000"/>
+                        </a:solidFill>
+                        <a:effectLst/>
+                        <a:latin typeface="Courier"/>
+                      </a:endParaRPr>
+                    </a:p>
+                  </a:txBody>
+                  <a:tcPr marL="6350" marR="6350" marT="6350" marB="0" anchor="b">
+                    <a:solidFill>
+                      <a:schemeClr val="bg2"/>
+                    </a:solidFill>
+                  </a:tcPr>
+                </a:tc>
+                <a:tc>
+                  <a:txBody>
+                    <a:bodyPr/>
+                    <a:lstStyle/>
+                    <a:p>
+                      <a:pPr algn="l" fontAlgn="b"/>
+                      <a:endParaRPr lang="en-DE" sz="800" b="0" i="0" u="none" strike="noStrike">
+                        <a:solidFill>
+                          <a:srgbClr val="000000"/>
+                        </a:solidFill>
+                        <a:effectLst/>
+                        <a:latin typeface="Courier"/>
+                      </a:endParaRPr>
+                    </a:p>
+                  </a:txBody>
+                  <a:tcPr marL="6350" marR="6350" marT="6350" marB="0" anchor="b">
+                    <a:solidFill>
+                      <a:schemeClr val="bg2"/>
+                    </a:solidFill>
+                  </a:tcPr>
+                </a:tc>
+                <a:tc>
+                  <a:txBody>
+                    <a:bodyPr/>
+                    <a:lstStyle/>
+                    <a:p>
+                      <a:pPr algn="l" fontAlgn="b"/>
+                      <a:endParaRPr lang="en-DE" sz="800" b="0" i="0" u="none" strike="noStrike">
+                        <a:solidFill>
+                          <a:srgbClr val="000000"/>
+                        </a:solidFill>
+                        <a:effectLst/>
+                        <a:latin typeface="Courier"/>
+                      </a:endParaRPr>
+                    </a:p>
+                  </a:txBody>
+                  <a:tcPr marL="6350" marR="6350" marT="6350" marB="0" anchor="b">
+                    <a:solidFill>
+                      <a:schemeClr val="bg2"/>
+                    </a:solidFill>
+                  </a:tcPr>
+                </a:tc>
+                <a:tc>
+                  <a:txBody>
+                    <a:bodyPr/>
+                    <a:lstStyle/>
+                    <a:p>
+                      <a:pPr algn="l" fontAlgn="b"/>
+                      <a:endParaRPr lang="en-DE" sz="800" b="0" i="0" u="none" strike="noStrike">
+                        <a:solidFill>
+                          <a:srgbClr val="000000"/>
+                        </a:solidFill>
+                        <a:effectLst/>
+                        <a:latin typeface="Courier"/>
+                      </a:endParaRPr>
+                    </a:p>
+                  </a:txBody>
+                  <a:tcPr marL="6350" marR="6350" marT="6350" marB="0" anchor="b">
+                    <a:solidFill>
+                      <a:schemeClr val="bg2"/>
+                    </a:solidFill>
+                  </a:tcPr>
+                </a:tc>
+                <a:tc>
+                  <a:txBody>
+                    <a:bodyPr/>
+                    <a:lstStyle/>
+                    <a:p>
+                      <a:pPr algn="l" fontAlgn="b"/>
+                      <a:endParaRPr lang="en-DE" sz="800" b="0" i="0" u="none" strike="noStrike">
+                        <a:solidFill>
+                          <a:srgbClr val="000000"/>
+                        </a:solidFill>
+                        <a:effectLst/>
+                        <a:latin typeface="Courier"/>
+                      </a:endParaRPr>
+                    </a:p>
+                  </a:txBody>
+                  <a:tcPr marL="6350" marR="6350" marT="6350" marB="0" anchor="b">
+                    <a:solidFill>
+                      <a:schemeClr val="bg2"/>
+                    </a:solidFill>
+                  </a:tcPr>
+                </a:tc>
+                <a:extLst>
+                  <a:ext uri="{0D108BD9-81ED-4DB2-BD59-A6C34878D82A}">
+                    <a16:rowId xmlns:a16="http://schemas.microsoft.com/office/drawing/2014/main" val="1078223716"/>
+                  </a:ext>
+                </a:extLst>
+              </a:tr>
+              <a:tr h="148431">
+                <a:tc>
+                  <a:txBody>
+                    <a:bodyPr/>
+                    <a:lstStyle/>
+                    <a:p>
+                      <a:pPr algn="l" fontAlgn="b"/>
+                      <a:endParaRPr lang="en-DE" sz="800" b="0" i="0" u="none" strike="noStrike">
+                        <a:solidFill>
+                          <a:srgbClr val="000000"/>
+                        </a:solidFill>
+                        <a:effectLst/>
+                        <a:latin typeface="Courier"/>
+                      </a:endParaRPr>
+                    </a:p>
+                  </a:txBody>
+                  <a:tcPr marL="6350" marR="6350" marT="6350" marB="0" anchor="b">
+                    <a:solidFill>
+                      <a:schemeClr val="bg2"/>
+                    </a:solidFill>
+                  </a:tcPr>
+                </a:tc>
+                <a:tc>
+                  <a:txBody>
+                    <a:bodyPr/>
+                    <a:lstStyle/>
+                    <a:p>
+                      <a:pPr algn="ctr" fontAlgn="b"/>
+                      <a:endParaRPr lang="en-DE" sz="800" b="1" i="0" u="none" strike="noStrike" dirty="0">
+                        <a:solidFill>
+                          <a:srgbClr val="000000"/>
+                        </a:solidFill>
+                        <a:effectLst/>
+                        <a:latin typeface="Courier"/>
+                      </a:endParaRPr>
+                    </a:p>
+                  </a:txBody>
+                  <a:tcPr marL="6350" marR="6350" marT="6350" marB="0" anchor="b">
+                    <a:solidFill>
+                      <a:schemeClr val="bg2"/>
+                    </a:solidFill>
+                  </a:tcPr>
+                </a:tc>
+                <a:tc>
+                  <a:txBody>
+                    <a:bodyPr/>
+                    <a:lstStyle/>
+                    <a:p>
+                      <a:pPr algn="ctr" fontAlgn="b"/>
+                      <a:endParaRPr lang="en-DE" sz="800" b="1" i="0" u="none" strike="noStrike" dirty="0">
+                        <a:solidFill>
+                          <a:srgbClr val="000000"/>
+                        </a:solidFill>
+                        <a:effectLst/>
+                        <a:latin typeface="Courier"/>
+                      </a:endParaRPr>
+                    </a:p>
+                  </a:txBody>
+                  <a:tcPr marL="6350" marR="6350" marT="6350" marB="0" anchor="b">
+                    <a:solidFill>
+                      <a:schemeClr val="bg2"/>
+                    </a:solidFill>
+                  </a:tcPr>
+                </a:tc>
+                <a:tc>
+                  <a:txBody>
+                    <a:bodyPr/>
+                    <a:lstStyle/>
+                    <a:p>
+                      <a:pPr algn="ctr" fontAlgn="b"/>
+                      <a:endParaRPr lang="en-DE" sz="800" b="1" i="0" u="none" strike="noStrike">
+                        <a:solidFill>
+                          <a:srgbClr val="000000"/>
+                        </a:solidFill>
+                        <a:effectLst/>
+                        <a:latin typeface="Courier"/>
+                      </a:endParaRPr>
+                    </a:p>
+                  </a:txBody>
+                  <a:tcPr marL="6350" marR="6350" marT="6350" marB="0" anchor="b">
+                    <a:solidFill>
+                      <a:schemeClr val="bg2"/>
+                    </a:solidFill>
+                  </a:tcPr>
+                </a:tc>
+                <a:tc>
+                  <a:txBody>
+                    <a:bodyPr/>
+                    <a:lstStyle/>
+                    <a:p>
+                      <a:pPr algn="ctr" fontAlgn="b"/>
+                      <a:endParaRPr lang="en-DE" sz="800" b="1" i="0" u="none" strike="noStrike" dirty="0">
+                        <a:solidFill>
+                          <a:srgbClr val="000000"/>
+                        </a:solidFill>
+                        <a:effectLst/>
+                        <a:latin typeface="Courier"/>
+                      </a:endParaRPr>
+                    </a:p>
+                  </a:txBody>
+                  <a:tcPr marL="6350" marR="6350" marT="6350" marB="0" anchor="b">
+                    <a:solidFill>
+                      <a:schemeClr val="bg2"/>
+                    </a:solidFill>
+                  </a:tcPr>
+                </a:tc>
+                <a:tc>
+                  <a:txBody>
+                    <a:bodyPr/>
+                    <a:lstStyle/>
+                    <a:p>
+                      <a:pPr algn="ctr" fontAlgn="b"/>
+                      <a:endParaRPr lang="en-DE" sz="800" b="1" i="0" u="none" strike="noStrike" dirty="0">
+                        <a:solidFill>
+                          <a:srgbClr val="000000"/>
+                        </a:solidFill>
+                        <a:effectLst/>
+                        <a:latin typeface="Courier"/>
+                      </a:endParaRPr>
+                    </a:p>
+                  </a:txBody>
+                  <a:tcPr marL="6350" marR="6350" marT="6350" marB="0" anchor="b">
+                    <a:solidFill>
+                      <a:schemeClr val="bg2"/>
+                    </a:solidFill>
+                  </a:tcPr>
+                </a:tc>
+                <a:tc>
+                  <a:txBody>
+                    <a:bodyPr/>
+                    <a:lstStyle/>
+                    <a:p>
+                      <a:pPr algn="l" fontAlgn="b"/>
+                      <a:endParaRPr lang="en-DE" sz="800" b="0" i="0" u="none" strike="noStrike">
+                        <a:solidFill>
+                          <a:srgbClr val="000000"/>
+                        </a:solidFill>
+                        <a:effectLst/>
+                        <a:latin typeface="Courier"/>
+                      </a:endParaRPr>
+                    </a:p>
+                  </a:txBody>
+                  <a:tcPr marL="6350" marR="6350" marT="6350" marB="0" anchor="b">
+                    <a:solidFill>
+                      <a:schemeClr val="bg2"/>
+                    </a:solidFill>
+                  </a:tcPr>
+                </a:tc>
+                <a:extLst>
+                  <a:ext uri="{0D108BD9-81ED-4DB2-BD59-A6C34878D82A}">
+                    <a16:rowId xmlns:a16="http://schemas.microsoft.com/office/drawing/2014/main" val="3342974667"/>
+                  </a:ext>
+                </a:extLst>
+              </a:tr>
+              <a:tr h="148431">
+                <a:tc>
+                  <a:txBody>
+                    <a:bodyPr/>
+                    <a:lstStyle/>
+                    <a:p>
+                      <a:pPr algn="l" fontAlgn="b"/>
+                      <a:endParaRPr lang="en-DE" sz="800" b="0" i="0" u="none" strike="noStrike">
+                        <a:solidFill>
+                          <a:srgbClr val="000000"/>
+                        </a:solidFill>
+                        <a:effectLst/>
+                        <a:latin typeface="Courier"/>
+                      </a:endParaRPr>
+                    </a:p>
+                  </a:txBody>
+                  <a:tcPr marL="6350" marR="6350" marT="6350" marB="0" anchor="b">
+                    <a:solidFill>
+                      <a:schemeClr val="bg2"/>
+                    </a:solidFill>
+                  </a:tcPr>
+                </a:tc>
+                <a:tc>
+                  <a:txBody>
+                    <a:bodyPr/>
+                    <a:lstStyle/>
+                    <a:p>
+                      <a:pPr algn="ctr" fontAlgn="b"/>
+                      <a:endParaRPr lang="en-DE" sz="800" b="1" i="0" u="none" strike="noStrike" dirty="0">
+                        <a:solidFill>
+                          <a:srgbClr val="000000"/>
+                        </a:solidFill>
+                        <a:effectLst/>
+                        <a:latin typeface="Courier"/>
+                      </a:endParaRPr>
+                    </a:p>
+                  </a:txBody>
+                  <a:tcPr marL="6350" marR="6350" marT="6350" marB="0" anchor="b">
+                    <a:solidFill>
+                      <a:schemeClr val="bg2"/>
+                    </a:solidFill>
+                  </a:tcPr>
+                </a:tc>
+                <a:tc>
+                  <a:txBody>
+                    <a:bodyPr/>
+                    <a:lstStyle/>
+                    <a:p>
+                      <a:pPr algn="ctr" fontAlgn="b"/>
+                      <a:endParaRPr lang="en-DE" sz="800" b="1" i="0" u="none" strike="noStrike" dirty="0">
+                        <a:solidFill>
+                          <a:srgbClr val="000000"/>
+                        </a:solidFill>
+                        <a:effectLst/>
+                        <a:latin typeface="Courier"/>
+                      </a:endParaRPr>
+                    </a:p>
+                  </a:txBody>
+                  <a:tcPr marL="6350" marR="6350" marT="6350" marB="0" anchor="b">
+                    <a:solidFill>
+                      <a:schemeClr val="bg2"/>
+                    </a:solidFill>
+                  </a:tcPr>
+                </a:tc>
+                <a:tc>
+                  <a:txBody>
+                    <a:bodyPr/>
+                    <a:lstStyle/>
+                    <a:p>
+                      <a:pPr algn="ctr" fontAlgn="b"/>
+                      <a:endParaRPr lang="en-DE" sz="800" b="1" i="0" u="none" strike="noStrike" dirty="0">
+                        <a:solidFill>
+                          <a:srgbClr val="000000"/>
+                        </a:solidFill>
+                        <a:effectLst/>
+                        <a:latin typeface="Courier"/>
+                      </a:endParaRPr>
+                    </a:p>
+                  </a:txBody>
+                  <a:tcPr marL="6350" marR="6350" marT="6350" marB="0" anchor="b">
+                    <a:solidFill>
+                      <a:schemeClr val="bg2"/>
+                    </a:solidFill>
+                  </a:tcPr>
+                </a:tc>
+                <a:tc>
+                  <a:txBody>
+                    <a:bodyPr/>
+                    <a:lstStyle/>
+                    <a:p>
+                      <a:pPr algn="ctr" fontAlgn="b"/>
+                      <a:endParaRPr lang="en-DE" sz="800" b="1" i="0" u="none" strike="noStrike" dirty="0">
+                        <a:solidFill>
+                          <a:srgbClr val="000000"/>
+                        </a:solidFill>
+                        <a:effectLst/>
+                        <a:latin typeface="Courier"/>
+                      </a:endParaRPr>
+                    </a:p>
+                  </a:txBody>
+                  <a:tcPr marL="6350" marR="6350" marT="6350" marB="0" anchor="b">
+                    <a:solidFill>
+                      <a:schemeClr val="bg2"/>
+                    </a:solidFill>
+                  </a:tcPr>
+                </a:tc>
+                <a:tc>
+                  <a:txBody>
+                    <a:bodyPr/>
+                    <a:lstStyle/>
+                    <a:p>
+                      <a:pPr algn="ctr" fontAlgn="b"/>
+                      <a:endParaRPr lang="en-DE" sz="800" b="1" i="0" u="none" strike="noStrike" dirty="0">
+                        <a:solidFill>
+                          <a:srgbClr val="000000"/>
+                        </a:solidFill>
+                        <a:effectLst/>
+                        <a:latin typeface="Courier"/>
+                      </a:endParaRPr>
+                    </a:p>
+                  </a:txBody>
+                  <a:tcPr marL="6350" marR="6350" marT="6350" marB="0" anchor="b">
+                    <a:solidFill>
+                      <a:schemeClr val="bg2"/>
+                    </a:solidFill>
+                  </a:tcPr>
+                </a:tc>
+                <a:tc>
+                  <a:txBody>
+                    <a:bodyPr/>
+                    <a:lstStyle/>
+                    <a:p>
+                      <a:pPr algn="l" fontAlgn="b"/>
+                      <a:endParaRPr lang="en-DE" sz="800" b="0" i="0" u="none" strike="noStrike" dirty="0">
+                        <a:solidFill>
+                          <a:srgbClr val="000000"/>
+                        </a:solidFill>
+                        <a:effectLst/>
+                        <a:latin typeface="Courier"/>
+                      </a:endParaRPr>
+                    </a:p>
+                  </a:txBody>
+                  <a:tcPr marL="6350" marR="6350" marT="6350" marB="0" anchor="b">
+                    <a:solidFill>
+                      <a:schemeClr val="bg2"/>
+                    </a:solidFill>
+                  </a:tcPr>
+                </a:tc>
+                <a:extLst>
+                  <a:ext uri="{0D108BD9-81ED-4DB2-BD59-A6C34878D82A}">
+                    <a16:rowId xmlns:a16="http://schemas.microsoft.com/office/drawing/2014/main" val="736121480"/>
+                  </a:ext>
+                </a:extLst>
+              </a:tr>
+              <a:tr h="148431">
+                <a:tc>
+                  <a:txBody>
+                    <a:bodyPr/>
+                    <a:lstStyle/>
+                    <a:p>
+                      <a:pPr algn="l" fontAlgn="b"/>
+                      <a:endParaRPr lang="en-DE" sz="800" b="0" i="0" u="none" strike="noStrike">
+                        <a:solidFill>
+                          <a:srgbClr val="000000"/>
+                        </a:solidFill>
+                        <a:effectLst/>
+                        <a:latin typeface="Courier"/>
+                      </a:endParaRPr>
+                    </a:p>
+                  </a:txBody>
+                  <a:tcPr marL="6350" marR="6350" marT="6350" marB="0" anchor="b">
+                    <a:solidFill>
+                      <a:schemeClr val="bg2"/>
+                    </a:solidFill>
+                  </a:tcPr>
+                </a:tc>
+                <a:tc>
+                  <a:txBody>
+                    <a:bodyPr/>
+                    <a:lstStyle/>
+                    <a:p>
+                      <a:pPr algn="ctr" fontAlgn="b"/>
+                      <a:endParaRPr lang="en-DE" sz="800" b="1" i="0" u="none" strike="noStrike">
+                        <a:solidFill>
+                          <a:srgbClr val="000000"/>
+                        </a:solidFill>
+                        <a:effectLst/>
+                        <a:latin typeface="Courier"/>
+                      </a:endParaRPr>
+                    </a:p>
+                  </a:txBody>
+                  <a:tcPr marL="6350" marR="6350" marT="6350" marB="0" anchor="b">
+                    <a:solidFill>
+                      <a:schemeClr val="bg2"/>
+                    </a:solidFill>
+                  </a:tcPr>
+                </a:tc>
+                <a:tc>
+                  <a:txBody>
+                    <a:bodyPr/>
+                    <a:lstStyle/>
+                    <a:p>
+                      <a:pPr algn="ctr" fontAlgn="b"/>
+                      <a:endParaRPr lang="en-DE" sz="800" b="1" i="0" u="none" strike="noStrike" dirty="0">
+                        <a:solidFill>
+                          <a:srgbClr val="000000"/>
+                        </a:solidFill>
+                        <a:effectLst/>
+                        <a:latin typeface="Courier"/>
+                      </a:endParaRPr>
+                    </a:p>
+                  </a:txBody>
+                  <a:tcPr marL="6350" marR="6350" marT="6350" marB="0" anchor="b">
+                    <a:solidFill>
+                      <a:schemeClr val="bg2"/>
+                    </a:solidFill>
+                  </a:tcPr>
+                </a:tc>
+                <a:tc>
+                  <a:txBody>
+                    <a:bodyPr/>
+                    <a:lstStyle/>
+                    <a:p>
+                      <a:pPr marL="0" marR="0" lvl="0" indent="0" algn="ctr" defTabSz="914400" rtl="0" eaLnBrk="1" fontAlgn="b" latinLnBrk="0" hangingPunct="1">
+                        <a:lnSpc>
+                          <a:spcPct val="100000"/>
+                        </a:lnSpc>
+                        <a:spcBef>
+                          <a:spcPts val="0"/>
+                        </a:spcBef>
+                        <a:spcAft>
+                          <a:spcPts val="0"/>
+                        </a:spcAft>
+                        <a:buClrTx/>
+                        <a:buSzTx/>
+                        <a:buFontTx/>
+                        <a:buNone/>
+                        <a:tabLst/>
+                        <a:defRPr/>
+                      </a:pPr>
+                      <a:r>
+                        <a:rPr lang="en-US" sz="800" b="1" i="0" u="none" strike="noStrike" dirty="0">
+                          <a:solidFill>
+                            <a:schemeClr val="accent6">
+                              <a:lumMod val="75000"/>
+                            </a:schemeClr>
+                          </a:solidFill>
+                          <a:effectLst/>
+                          <a:latin typeface="Courier"/>
+                        </a:rPr>
+                        <a:t>X</a:t>
+                      </a:r>
+                      <a:endParaRPr lang="en-DE" sz="800" b="1" i="0" u="none" strike="noStrike" dirty="0">
+                        <a:solidFill>
+                          <a:schemeClr val="accent6">
+                            <a:lumMod val="75000"/>
+                          </a:schemeClr>
+                        </a:solidFill>
+                        <a:effectLst/>
+                        <a:latin typeface="Courier"/>
+                      </a:endParaRPr>
+                    </a:p>
+                  </a:txBody>
+                  <a:tcPr marL="6350" marR="6350" marT="6350" marB="0" anchor="b">
+                    <a:solidFill>
+                      <a:schemeClr val="accent2"/>
+                    </a:solidFill>
+                  </a:tcPr>
+                </a:tc>
+                <a:tc>
+                  <a:txBody>
+                    <a:bodyPr/>
+                    <a:lstStyle/>
+                    <a:p>
+                      <a:pPr algn="ctr" fontAlgn="b"/>
+                      <a:endParaRPr lang="en-DE" sz="800" b="1" i="0" u="none" strike="noStrike" dirty="0">
+                        <a:solidFill>
+                          <a:srgbClr val="000000"/>
+                        </a:solidFill>
+                        <a:effectLst/>
+                        <a:latin typeface="Courier"/>
+                      </a:endParaRPr>
+                    </a:p>
+                  </a:txBody>
+                  <a:tcPr marL="6350" marR="6350" marT="6350" marB="0" anchor="b">
+                    <a:solidFill>
+                      <a:schemeClr val="bg2"/>
+                    </a:solidFill>
+                  </a:tcPr>
+                </a:tc>
+                <a:tc>
+                  <a:txBody>
+                    <a:bodyPr/>
+                    <a:lstStyle/>
+                    <a:p>
+                      <a:pPr algn="ctr" fontAlgn="b"/>
+                      <a:endParaRPr lang="en-DE" sz="800" b="1" i="0" u="none" strike="noStrike" dirty="0">
+                        <a:solidFill>
+                          <a:srgbClr val="000000"/>
+                        </a:solidFill>
+                        <a:effectLst/>
+                        <a:latin typeface="Courier"/>
+                      </a:endParaRPr>
+                    </a:p>
+                  </a:txBody>
+                  <a:tcPr marL="6350" marR="6350" marT="6350" marB="0" anchor="b">
+                    <a:solidFill>
+                      <a:schemeClr val="bg2"/>
+                    </a:solidFill>
+                  </a:tcPr>
+                </a:tc>
+                <a:tc>
+                  <a:txBody>
+                    <a:bodyPr/>
+                    <a:lstStyle/>
+                    <a:p>
+                      <a:pPr algn="l" fontAlgn="b"/>
+                      <a:endParaRPr lang="en-DE" sz="800" b="0" i="0" u="none" strike="noStrike" dirty="0">
+                        <a:solidFill>
+                          <a:srgbClr val="000000"/>
+                        </a:solidFill>
+                        <a:effectLst/>
+                        <a:latin typeface="Courier"/>
+                      </a:endParaRPr>
+                    </a:p>
+                  </a:txBody>
+                  <a:tcPr marL="6350" marR="6350" marT="6350" marB="0" anchor="b">
+                    <a:solidFill>
+                      <a:schemeClr val="bg2"/>
+                    </a:solidFill>
+                  </a:tcPr>
+                </a:tc>
+                <a:extLst>
+                  <a:ext uri="{0D108BD9-81ED-4DB2-BD59-A6C34878D82A}">
+                    <a16:rowId xmlns:a16="http://schemas.microsoft.com/office/drawing/2014/main" val="2968588688"/>
+                  </a:ext>
+                </a:extLst>
+              </a:tr>
+              <a:tr h="148431">
+                <a:tc>
+                  <a:txBody>
+                    <a:bodyPr/>
+                    <a:lstStyle/>
+                    <a:p>
+                      <a:pPr algn="l" fontAlgn="b"/>
+                      <a:endParaRPr lang="en-DE" sz="800" b="0" i="0" u="none" strike="noStrike">
+                        <a:solidFill>
+                          <a:srgbClr val="000000"/>
+                        </a:solidFill>
+                        <a:effectLst/>
+                        <a:latin typeface="Courier"/>
+                      </a:endParaRPr>
+                    </a:p>
+                  </a:txBody>
+                  <a:tcPr marL="6350" marR="6350" marT="6350" marB="0" anchor="b">
+                    <a:solidFill>
+                      <a:schemeClr val="bg2"/>
+                    </a:solidFill>
+                  </a:tcPr>
+                </a:tc>
+                <a:tc>
+                  <a:txBody>
+                    <a:bodyPr/>
+                    <a:lstStyle/>
+                    <a:p>
+                      <a:pPr algn="ctr" fontAlgn="b"/>
+                      <a:endParaRPr lang="en-DE" sz="800" b="1" i="0" u="none" strike="noStrike">
+                        <a:solidFill>
+                          <a:srgbClr val="000000"/>
+                        </a:solidFill>
+                        <a:effectLst/>
+                        <a:latin typeface="Courier"/>
+                      </a:endParaRPr>
+                    </a:p>
+                  </a:txBody>
+                  <a:tcPr marL="6350" marR="6350" marT="6350" marB="0" anchor="b">
+                    <a:solidFill>
+                      <a:schemeClr val="bg2"/>
+                    </a:solidFill>
+                  </a:tcPr>
+                </a:tc>
+                <a:tc>
+                  <a:txBody>
+                    <a:bodyPr/>
+                    <a:lstStyle/>
+                    <a:p>
+                      <a:pPr algn="ctr" fontAlgn="b"/>
+                      <a:endParaRPr lang="en-DE" sz="800" b="1" i="0" u="none" strike="noStrike">
+                        <a:solidFill>
+                          <a:srgbClr val="000000"/>
+                        </a:solidFill>
+                        <a:effectLst/>
+                        <a:latin typeface="Courier"/>
+                      </a:endParaRPr>
+                    </a:p>
+                  </a:txBody>
+                  <a:tcPr marL="6350" marR="6350" marT="6350" marB="0" anchor="b">
+                    <a:solidFill>
+                      <a:schemeClr val="bg2"/>
+                    </a:solidFill>
+                  </a:tcPr>
+                </a:tc>
+                <a:tc>
+                  <a:txBody>
+                    <a:bodyPr/>
+                    <a:lstStyle/>
+                    <a:p>
+                      <a:pPr algn="ctr" fontAlgn="b"/>
+                      <a:endParaRPr lang="en-DE" sz="800" b="1" i="0" u="none" strike="noStrike">
+                        <a:solidFill>
+                          <a:srgbClr val="000000"/>
+                        </a:solidFill>
+                        <a:effectLst/>
+                        <a:latin typeface="Courier"/>
+                      </a:endParaRPr>
+                    </a:p>
+                  </a:txBody>
+                  <a:tcPr marL="6350" marR="6350" marT="6350" marB="0" anchor="b">
+                    <a:solidFill>
+                      <a:schemeClr val="bg2"/>
+                    </a:solidFill>
+                  </a:tcPr>
+                </a:tc>
+                <a:tc>
+                  <a:txBody>
+                    <a:bodyPr/>
+                    <a:lstStyle/>
+                    <a:p>
+                      <a:pPr algn="ctr" fontAlgn="b"/>
+                      <a:endParaRPr lang="en-DE" sz="800" b="1" i="0" u="none" strike="noStrike" dirty="0">
+                        <a:solidFill>
+                          <a:srgbClr val="000000"/>
+                        </a:solidFill>
+                        <a:effectLst/>
+                        <a:latin typeface="Courier"/>
+                      </a:endParaRPr>
+                    </a:p>
+                  </a:txBody>
+                  <a:tcPr marL="6350" marR="6350" marT="6350" marB="0" anchor="b">
+                    <a:solidFill>
+                      <a:schemeClr val="bg2"/>
+                    </a:solidFill>
+                  </a:tcPr>
+                </a:tc>
+                <a:tc>
+                  <a:txBody>
+                    <a:bodyPr/>
+                    <a:lstStyle/>
+                    <a:p>
+                      <a:pPr algn="ctr" fontAlgn="b"/>
+                      <a:endParaRPr lang="en-DE" sz="800" b="1" i="0" u="none" strike="noStrike" dirty="0">
+                        <a:solidFill>
+                          <a:srgbClr val="000000"/>
+                        </a:solidFill>
+                        <a:effectLst/>
+                        <a:latin typeface="Courier"/>
+                      </a:endParaRPr>
+                    </a:p>
+                  </a:txBody>
+                  <a:tcPr marL="6350" marR="6350" marT="6350" marB="0" anchor="b">
+                    <a:solidFill>
+                      <a:schemeClr val="bg2"/>
+                    </a:solidFill>
+                  </a:tcPr>
+                </a:tc>
+                <a:tc>
+                  <a:txBody>
+                    <a:bodyPr/>
+                    <a:lstStyle/>
+                    <a:p>
+                      <a:pPr algn="l" fontAlgn="b"/>
+                      <a:endParaRPr lang="en-DE" sz="800" b="0" i="0" u="none" strike="noStrike" dirty="0">
+                        <a:solidFill>
+                          <a:srgbClr val="000000"/>
+                        </a:solidFill>
+                        <a:effectLst/>
+                        <a:latin typeface="Courier"/>
+                      </a:endParaRPr>
+                    </a:p>
+                  </a:txBody>
+                  <a:tcPr marL="6350" marR="6350" marT="6350" marB="0" anchor="b">
+                    <a:solidFill>
+                      <a:schemeClr val="bg2"/>
+                    </a:solidFill>
+                  </a:tcPr>
+                </a:tc>
+                <a:extLst>
+                  <a:ext uri="{0D108BD9-81ED-4DB2-BD59-A6C34878D82A}">
+                    <a16:rowId xmlns:a16="http://schemas.microsoft.com/office/drawing/2014/main" val="1128576129"/>
+                  </a:ext>
+                </a:extLst>
+              </a:tr>
+              <a:tr h="148431">
+                <a:tc>
+                  <a:txBody>
+                    <a:bodyPr/>
+                    <a:lstStyle/>
+                    <a:p>
+                      <a:pPr algn="l" fontAlgn="b"/>
+                      <a:endParaRPr lang="en-DE" sz="800" b="0" i="0" u="none" strike="noStrike">
+                        <a:solidFill>
+                          <a:srgbClr val="000000"/>
+                        </a:solidFill>
+                        <a:effectLst/>
+                        <a:latin typeface="Courier"/>
+                      </a:endParaRPr>
+                    </a:p>
+                  </a:txBody>
+                  <a:tcPr marL="6350" marR="6350" marT="6350" marB="0" anchor="b">
+                    <a:solidFill>
+                      <a:schemeClr val="bg2"/>
+                    </a:solidFill>
+                  </a:tcPr>
+                </a:tc>
+                <a:tc>
+                  <a:txBody>
+                    <a:bodyPr/>
+                    <a:lstStyle/>
+                    <a:p>
+                      <a:pPr algn="ctr" fontAlgn="b"/>
+                      <a:endParaRPr lang="en-DE" sz="800" b="1" i="0" u="none" strike="noStrike">
+                        <a:solidFill>
+                          <a:srgbClr val="000000"/>
+                        </a:solidFill>
+                        <a:effectLst/>
+                        <a:latin typeface="Courier"/>
+                      </a:endParaRPr>
+                    </a:p>
+                  </a:txBody>
+                  <a:tcPr marL="6350" marR="6350" marT="6350" marB="0" anchor="b">
+                    <a:solidFill>
+                      <a:schemeClr val="bg2"/>
+                    </a:solidFill>
+                  </a:tcPr>
+                </a:tc>
+                <a:tc>
+                  <a:txBody>
+                    <a:bodyPr/>
+                    <a:lstStyle/>
+                    <a:p>
+                      <a:pPr algn="ctr" fontAlgn="b"/>
+                      <a:endParaRPr lang="en-DE" sz="800" b="1" i="0" u="none" strike="noStrike" dirty="0">
+                        <a:solidFill>
+                          <a:srgbClr val="000000"/>
+                        </a:solidFill>
+                        <a:effectLst/>
+                        <a:latin typeface="Courier"/>
+                      </a:endParaRPr>
+                    </a:p>
+                  </a:txBody>
+                  <a:tcPr marL="6350" marR="6350" marT="6350" marB="0" anchor="b">
+                    <a:solidFill>
+                      <a:schemeClr val="bg2"/>
+                    </a:solidFill>
+                  </a:tcPr>
+                </a:tc>
+                <a:tc>
+                  <a:txBody>
+                    <a:bodyPr/>
+                    <a:lstStyle/>
+                    <a:p>
+                      <a:pPr algn="ctr" fontAlgn="b"/>
+                      <a:endParaRPr lang="en-DE" sz="800" b="1" i="0" u="none" strike="noStrike">
+                        <a:solidFill>
+                          <a:srgbClr val="000000"/>
+                        </a:solidFill>
+                        <a:effectLst/>
+                        <a:latin typeface="Courier"/>
+                      </a:endParaRPr>
+                    </a:p>
+                  </a:txBody>
+                  <a:tcPr marL="6350" marR="6350" marT="6350" marB="0" anchor="b">
+                    <a:solidFill>
+                      <a:schemeClr val="bg2"/>
+                    </a:solidFill>
+                  </a:tcPr>
+                </a:tc>
+                <a:tc>
+                  <a:txBody>
+                    <a:bodyPr/>
+                    <a:lstStyle/>
+                    <a:p>
+                      <a:pPr algn="ctr" fontAlgn="b"/>
+                      <a:endParaRPr lang="en-DE" sz="800" b="1" i="0" u="none" strike="noStrike" dirty="0">
+                        <a:solidFill>
+                          <a:srgbClr val="000000"/>
+                        </a:solidFill>
+                        <a:effectLst/>
+                        <a:latin typeface="Courier"/>
+                      </a:endParaRPr>
+                    </a:p>
+                  </a:txBody>
+                  <a:tcPr marL="6350" marR="6350" marT="6350" marB="0" anchor="b">
+                    <a:solidFill>
+                      <a:schemeClr val="bg2"/>
+                    </a:solidFill>
+                  </a:tcPr>
+                </a:tc>
+                <a:tc>
+                  <a:txBody>
+                    <a:bodyPr/>
+                    <a:lstStyle/>
+                    <a:p>
+                      <a:pPr algn="ctr" fontAlgn="b"/>
+                      <a:endParaRPr lang="en-DE" sz="800" b="1" i="0" u="none" strike="noStrike" dirty="0">
+                        <a:solidFill>
+                          <a:srgbClr val="000000"/>
+                        </a:solidFill>
+                        <a:effectLst/>
+                        <a:latin typeface="Courier"/>
+                      </a:endParaRPr>
+                    </a:p>
+                  </a:txBody>
+                  <a:tcPr marL="6350" marR="6350" marT="6350" marB="0" anchor="b">
+                    <a:solidFill>
+                      <a:schemeClr val="bg2"/>
+                    </a:solidFill>
+                  </a:tcPr>
+                </a:tc>
+                <a:tc>
+                  <a:txBody>
+                    <a:bodyPr/>
+                    <a:lstStyle/>
+                    <a:p>
+                      <a:pPr algn="l" fontAlgn="b"/>
+                      <a:endParaRPr lang="en-DE" sz="800" b="0" i="0" u="none" strike="noStrike" dirty="0">
+                        <a:solidFill>
+                          <a:srgbClr val="000000"/>
+                        </a:solidFill>
+                        <a:effectLst/>
+                        <a:latin typeface="Courier"/>
+                      </a:endParaRPr>
+                    </a:p>
+                  </a:txBody>
+                  <a:tcPr marL="6350" marR="6350" marT="6350" marB="0" anchor="b">
+                    <a:solidFill>
+                      <a:schemeClr val="bg2"/>
+                    </a:solidFill>
+                  </a:tcPr>
+                </a:tc>
+                <a:extLst>
+                  <a:ext uri="{0D108BD9-81ED-4DB2-BD59-A6C34878D82A}">
+                    <a16:rowId xmlns:a16="http://schemas.microsoft.com/office/drawing/2014/main" val="3659823931"/>
+                  </a:ext>
+                </a:extLst>
+              </a:tr>
+              <a:tr h="148431">
+                <a:tc>
+                  <a:txBody>
+                    <a:bodyPr/>
+                    <a:lstStyle/>
+                    <a:p>
+                      <a:pPr algn="l" fontAlgn="b"/>
+                      <a:endParaRPr lang="en-DE" sz="800" b="0" i="0" u="none" strike="noStrike">
+                        <a:solidFill>
+                          <a:srgbClr val="000000"/>
+                        </a:solidFill>
+                        <a:effectLst/>
+                        <a:latin typeface="Courier"/>
+                      </a:endParaRPr>
+                    </a:p>
+                  </a:txBody>
+                  <a:tcPr marL="6350" marR="6350" marT="6350" marB="0" anchor="b">
+                    <a:solidFill>
+                      <a:schemeClr val="bg2"/>
+                    </a:solidFill>
+                  </a:tcPr>
+                </a:tc>
+                <a:tc>
+                  <a:txBody>
+                    <a:bodyPr/>
+                    <a:lstStyle/>
+                    <a:p>
+                      <a:pPr algn="l" fontAlgn="b"/>
+                      <a:endParaRPr lang="en-DE" sz="800" b="0" i="0" u="none" strike="noStrike">
+                        <a:solidFill>
+                          <a:srgbClr val="000000"/>
+                        </a:solidFill>
+                        <a:effectLst/>
+                        <a:latin typeface="Courier"/>
+                      </a:endParaRPr>
+                    </a:p>
+                  </a:txBody>
+                  <a:tcPr marL="6350" marR="6350" marT="6350" marB="0" anchor="b">
+                    <a:solidFill>
+                      <a:schemeClr val="bg2"/>
+                    </a:solidFill>
+                  </a:tcPr>
+                </a:tc>
+                <a:tc>
+                  <a:txBody>
+                    <a:bodyPr/>
+                    <a:lstStyle/>
+                    <a:p>
+                      <a:pPr algn="l" fontAlgn="b"/>
+                      <a:endParaRPr lang="en-DE" sz="800" b="0" i="0" u="none" strike="noStrike">
+                        <a:solidFill>
+                          <a:srgbClr val="000000"/>
+                        </a:solidFill>
+                        <a:effectLst/>
+                        <a:latin typeface="Courier"/>
+                      </a:endParaRPr>
+                    </a:p>
+                  </a:txBody>
+                  <a:tcPr marL="6350" marR="6350" marT="6350" marB="0" anchor="b">
+                    <a:solidFill>
+                      <a:schemeClr val="bg2"/>
+                    </a:solidFill>
+                  </a:tcPr>
+                </a:tc>
+                <a:tc>
+                  <a:txBody>
+                    <a:bodyPr/>
+                    <a:lstStyle/>
+                    <a:p>
+                      <a:pPr algn="l" fontAlgn="b"/>
+                      <a:endParaRPr lang="en-DE" sz="800" b="0" i="0" u="none" strike="noStrike">
+                        <a:solidFill>
+                          <a:srgbClr val="000000"/>
+                        </a:solidFill>
+                        <a:effectLst/>
+                        <a:latin typeface="Courier"/>
+                      </a:endParaRPr>
+                    </a:p>
+                  </a:txBody>
+                  <a:tcPr marL="6350" marR="6350" marT="6350" marB="0" anchor="b">
+                    <a:solidFill>
+                      <a:schemeClr val="bg2"/>
+                    </a:solidFill>
+                  </a:tcPr>
+                </a:tc>
+                <a:tc>
+                  <a:txBody>
+                    <a:bodyPr/>
+                    <a:lstStyle/>
+                    <a:p>
+                      <a:pPr algn="l" fontAlgn="b"/>
+                      <a:endParaRPr lang="en-DE" sz="800" b="0" i="0" u="none" strike="noStrike" dirty="0">
+                        <a:solidFill>
+                          <a:srgbClr val="000000"/>
+                        </a:solidFill>
+                        <a:effectLst/>
+                        <a:latin typeface="Courier"/>
+                      </a:endParaRPr>
+                    </a:p>
+                  </a:txBody>
+                  <a:tcPr marL="6350" marR="6350" marT="6350" marB="0" anchor="b">
+                    <a:solidFill>
+                      <a:schemeClr val="bg2"/>
+                    </a:solidFill>
+                  </a:tcPr>
+                </a:tc>
+                <a:tc>
+                  <a:txBody>
+                    <a:bodyPr/>
+                    <a:lstStyle/>
+                    <a:p>
+                      <a:pPr algn="l" fontAlgn="b"/>
+                      <a:endParaRPr lang="en-DE" sz="800" b="0" i="0" u="none" strike="noStrike" dirty="0">
+                        <a:solidFill>
+                          <a:srgbClr val="000000"/>
+                        </a:solidFill>
+                        <a:effectLst/>
+                        <a:latin typeface="Courier"/>
+                      </a:endParaRPr>
+                    </a:p>
+                  </a:txBody>
+                  <a:tcPr marL="6350" marR="6350" marT="6350" marB="0" anchor="b">
+                    <a:solidFill>
+                      <a:schemeClr val="bg2"/>
+                    </a:solidFill>
+                  </a:tcPr>
+                </a:tc>
+                <a:tc>
+                  <a:txBody>
+                    <a:bodyPr/>
+                    <a:lstStyle/>
+                    <a:p>
+                      <a:pPr algn="l" fontAlgn="b"/>
+                      <a:endParaRPr lang="en-DE" sz="800" b="0" i="0" u="none" strike="noStrike" dirty="0">
+                        <a:solidFill>
+                          <a:srgbClr val="000000"/>
+                        </a:solidFill>
+                        <a:effectLst/>
+                        <a:latin typeface="Courier"/>
+                      </a:endParaRPr>
+                    </a:p>
+                  </a:txBody>
+                  <a:tcPr marL="6350" marR="6350" marT="6350" marB="0" anchor="b">
+                    <a:solidFill>
+                      <a:schemeClr val="bg2"/>
+                    </a:solidFill>
+                  </a:tcPr>
+                </a:tc>
+                <a:extLst>
+                  <a:ext uri="{0D108BD9-81ED-4DB2-BD59-A6C34878D82A}">
+                    <a16:rowId xmlns:a16="http://schemas.microsoft.com/office/drawing/2014/main" val="524604145"/>
+                  </a:ext>
+                </a:extLst>
+              </a:tr>
+              <a:tr h="148431">
+                <a:tc>
+                  <a:txBody>
+                    <a:bodyPr/>
+                    <a:lstStyle/>
+                    <a:p>
+                      <a:pPr algn="l" fontAlgn="b"/>
+                      <a:endParaRPr lang="en-DE" sz="800" b="0" i="0" u="none" strike="noStrike">
+                        <a:solidFill>
+                          <a:srgbClr val="000000"/>
+                        </a:solidFill>
+                        <a:effectLst/>
+                        <a:latin typeface="Courier"/>
+                      </a:endParaRPr>
+                    </a:p>
+                  </a:txBody>
+                  <a:tcPr marL="6350" marR="6350" marT="6350" marB="0" anchor="b">
+                    <a:solidFill>
+                      <a:schemeClr val="bg2"/>
+                    </a:solidFill>
+                  </a:tcPr>
+                </a:tc>
+                <a:tc>
+                  <a:txBody>
+                    <a:bodyPr/>
+                    <a:lstStyle/>
+                    <a:p>
+                      <a:pPr algn="l" fontAlgn="b"/>
+                      <a:endParaRPr lang="en-DE" sz="800" b="0" i="0" u="none" strike="noStrike">
+                        <a:solidFill>
+                          <a:srgbClr val="000000"/>
+                        </a:solidFill>
+                        <a:effectLst/>
+                        <a:latin typeface="Courier"/>
+                      </a:endParaRPr>
+                    </a:p>
+                  </a:txBody>
+                  <a:tcPr marL="6350" marR="6350" marT="6350" marB="0" anchor="b">
+                    <a:solidFill>
+                      <a:schemeClr val="bg2"/>
+                    </a:solidFill>
+                  </a:tcPr>
+                </a:tc>
+                <a:tc>
+                  <a:txBody>
+                    <a:bodyPr/>
+                    <a:lstStyle/>
+                    <a:p>
+                      <a:pPr algn="l" fontAlgn="b"/>
+                      <a:endParaRPr lang="en-DE" sz="800" b="0" i="0" u="none" strike="noStrike">
+                        <a:solidFill>
+                          <a:srgbClr val="000000"/>
+                        </a:solidFill>
+                        <a:effectLst/>
+                        <a:latin typeface="Courier"/>
+                      </a:endParaRPr>
+                    </a:p>
+                  </a:txBody>
+                  <a:tcPr marL="6350" marR="6350" marT="6350" marB="0" anchor="b">
+                    <a:solidFill>
+                      <a:schemeClr val="bg2"/>
+                    </a:solidFill>
+                  </a:tcPr>
+                </a:tc>
+                <a:tc>
+                  <a:txBody>
+                    <a:bodyPr/>
+                    <a:lstStyle/>
+                    <a:p>
+                      <a:pPr algn="l" fontAlgn="b"/>
+                      <a:endParaRPr lang="en-DE" sz="800" b="0" i="0" u="none" strike="noStrike">
+                        <a:solidFill>
+                          <a:srgbClr val="000000"/>
+                        </a:solidFill>
+                        <a:effectLst/>
+                        <a:latin typeface="Courier"/>
+                      </a:endParaRPr>
+                    </a:p>
+                  </a:txBody>
+                  <a:tcPr marL="6350" marR="6350" marT="6350" marB="0" anchor="b">
+                    <a:solidFill>
+                      <a:schemeClr val="bg2"/>
+                    </a:solidFill>
+                  </a:tcPr>
+                </a:tc>
+                <a:tc>
+                  <a:txBody>
+                    <a:bodyPr/>
+                    <a:lstStyle/>
+                    <a:p>
+                      <a:pPr algn="l" fontAlgn="b"/>
+                      <a:endParaRPr lang="en-DE" sz="800" b="0" i="0" u="none" strike="noStrike">
+                        <a:solidFill>
+                          <a:srgbClr val="000000"/>
+                        </a:solidFill>
+                        <a:effectLst/>
+                        <a:latin typeface="Courier"/>
+                      </a:endParaRPr>
+                    </a:p>
+                  </a:txBody>
+                  <a:tcPr marL="6350" marR="6350" marT="6350" marB="0" anchor="b">
+                    <a:solidFill>
+                      <a:schemeClr val="bg2"/>
+                    </a:solidFill>
+                  </a:tcPr>
+                </a:tc>
+                <a:tc>
+                  <a:txBody>
+                    <a:bodyPr/>
+                    <a:lstStyle/>
+                    <a:p>
+                      <a:pPr algn="l" fontAlgn="b"/>
+                      <a:endParaRPr lang="en-DE" sz="800" b="0" i="0" u="none" strike="noStrike">
+                        <a:solidFill>
+                          <a:srgbClr val="000000"/>
+                        </a:solidFill>
+                        <a:effectLst/>
+                        <a:latin typeface="Courier"/>
+                      </a:endParaRPr>
+                    </a:p>
+                  </a:txBody>
+                  <a:tcPr marL="6350" marR="6350" marT="6350" marB="0" anchor="b">
+                    <a:solidFill>
+                      <a:schemeClr val="bg2"/>
+                    </a:solidFill>
+                  </a:tcPr>
+                </a:tc>
+                <a:tc>
+                  <a:txBody>
+                    <a:bodyPr/>
+                    <a:lstStyle/>
+                    <a:p>
+                      <a:pPr algn="l" fontAlgn="b"/>
+                      <a:endParaRPr lang="en-DE" sz="800" b="0" i="0" u="none" strike="noStrike" dirty="0">
+                        <a:solidFill>
+                          <a:srgbClr val="000000"/>
+                        </a:solidFill>
+                        <a:effectLst/>
+                        <a:latin typeface="Courier"/>
+                      </a:endParaRPr>
+                    </a:p>
+                  </a:txBody>
+                  <a:tcPr marL="6350" marR="6350" marT="6350" marB="0" anchor="b">
+                    <a:solidFill>
+                      <a:schemeClr val="bg2"/>
+                    </a:solidFill>
+                  </a:tcPr>
+                </a:tc>
+                <a:extLst>
+                  <a:ext uri="{0D108BD9-81ED-4DB2-BD59-A6C34878D82A}">
+                    <a16:rowId xmlns:a16="http://schemas.microsoft.com/office/drawing/2014/main" val="3653312017"/>
+                  </a:ext>
+                </a:extLst>
+              </a:tr>
+            </a:tbl>
+          </a:graphicData>
+        </a:graphic>
+      </p:graphicFrame>
+      <p:cxnSp>
+        <p:nvCxnSpPr>
+          <p:cNvPr id="14" name="Straight Arrow Connector 13">
+            <a:extLst>
+              <a:ext uri="{FF2B5EF4-FFF2-40B4-BE49-F238E27FC236}">
+                <a16:creationId xmlns:a16="http://schemas.microsoft.com/office/drawing/2014/main" id="{B2C3CC2B-0C08-45FC-B694-E564C60DF5F2}"/>
+              </a:ext>
+            </a:extLst>
+          </p:cNvPr>
+          <p:cNvCxnSpPr>
+            <a:cxnSpLocks/>
+          </p:cNvCxnSpPr>
           <p:nvPr/>
-        </p:nvPicPr>
-        <p:blipFill>
-          <a:blip r:embed="rId3"/>
-          <a:stretch>
-            <a:fillRect/>
-          </a:stretch>
-        </p:blipFill>
+        </p:nvCxnSpPr>
         <p:spPr>
           <a:xfrm>
-            <a:off x="3613349" y="845719"/>
-            <a:ext cx="2729330" cy="2106530"/>
+            <a:off x="4141258" y="1716617"/>
+            <a:ext cx="1044575" cy="0"/>
           </a:xfrm>
-          <a:prstGeom prst="rect">
+          <a:prstGeom prst="straightConnector1">
             <a:avLst/>
           </a:prstGeom>
+          <a:ln>
+            <a:solidFill>
+              <a:schemeClr val="tx1"/>
+            </a:solidFill>
+            <a:tailEnd type="triangle"/>
+          </a:ln>
         </p:spPr>
-      </p:pic>
-      <p:pic>
-        <p:nvPicPr>
-          <p:cNvPr id="6" name="Picture 5">
-            <a:extLst>
-              <a:ext uri="{FF2B5EF4-FFF2-40B4-BE49-F238E27FC236}">
-                <a16:creationId xmlns:a16="http://schemas.microsoft.com/office/drawing/2014/main" id="{DA849E51-9833-294D-BE0C-AB785D34A3DA}"/>
-              </a:ext>
-            </a:extLst>
-          </p:cNvPr>
-          <p:cNvPicPr>
-            <a:picLocks noChangeAspect="1"/>
-          </p:cNvPicPr>
+        <p:style>
+          <a:lnRef idx="1">
+            <a:schemeClr val="accent1"/>
+          </a:lnRef>
+          <a:fillRef idx="0">
+            <a:schemeClr val="accent1"/>
+          </a:fillRef>
+          <a:effectRef idx="0">
+            <a:schemeClr val="accent1"/>
+          </a:effectRef>
+          <a:fontRef idx="minor">
+            <a:schemeClr val="tx1"/>
+          </a:fontRef>
+        </p:style>
+      </p:cxnSp>
+      <p:cxnSp>
+        <p:nvCxnSpPr>
+          <p:cNvPr id="16" name="Straight Arrow Connector 15">
+            <a:extLst>
+              <a:ext uri="{FF2B5EF4-FFF2-40B4-BE49-F238E27FC236}">
+                <a16:creationId xmlns:a16="http://schemas.microsoft.com/office/drawing/2014/main" id="{7A6B8B1D-8868-4CC8-8F02-C33B9A2A7792}"/>
+              </a:ext>
+            </a:extLst>
+          </p:cNvPr>
+          <p:cNvCxnSpPr>
+            <a:cxnSpLocks/>
+          </p:cNvCxnSpPr>
           <p:nvPr/>
-        </p:nvPicPr>
-        <p:blipFill>
-          <a:blip r:embed="rId4"/>
-          <a:stretch>
-            <a:fillRect/>
-          </a:stretch>
-        </p:blipFill>
+        </p:nvCxnSpPr>
         <p:spPr>
           <a:xfrm>
-            <a:off x="1895977" y="4922621"/>
-            <a:ext cx="7581900" cy="1587500"/>
+            <a:off x="2720362" y="1709209"/>
+            <a:ext cx="679005" cy="0"/>
           </a:xfrm>
-          <a:prstGeom prst="rect">
+          <a:prstGeom prst="straightConnector1">
             <a:avLst/>
           </a:prstGeom>
+          <a:ln>
+            <a:solidFill>
+              <a:schemeClr val="tx1"/>
+            </a:solidFill>
+            <a:tailEnd type="triangle"/>
+          </a:ln>
         </p:spPr>
-      </p:pic>
-      <p:pic>
-        <p:nvPicPr>
-          <p:cNvPr id="7" name="Picture 6">
-            <a:extLst>
-              <a:ext uri="{FF2B5EF4-FFF2-40B4-BE49-F238E27FC236}">
-                <a16:creationId xmlns:a16="http://schemas.microsoft.com/office/drawing/2014/main" id="{D72F331E-3B43-E742-9B18-345B74287E7C}"/>
-              </a:ext>
-            </a:extLst>
-          </p:cNvPr>
-          <p:cNvPicPr>
-            <a:picLocks noChangeAspect="1"/>
-          </p:cNvPicPr>
+        <p:style>
+          <a:lnRef idx="1">
+            <a:schemeClr val="accent1"/>
+          </a:lnRef>
+          <a:fillRef idx="0">
+            <a:schemeClr val="accent1"/>
+          </a:fillRef>
+          <a:effectRef idx="0">
+            <a:schemeClr val="accent1"/>
+          </a:effectRef>
+          <a:fontRef idx="minor">
+            <a:schemeClr val="tx1"/>
+          </a:fontRef>
+        </p:style>
+      </p:cxnSp>
+      <p:sp>
+        <p:nvSpPr>
+          <p:cNvPr id="3" name="Rectangle 2">
+            <a:extLst>
+              <a:ext uri="{FF2B5EF4-FFF2-40B4-BE49-F238E27FC236}">
+                <a16:creationId xmlns:a16="http://schemas.microsoft.com/office/drawing/2014/main" id="{1875F2C4-2264-449C-8D81-711D9F5187FE}"/>
+              </a:ext>
+            </a:extLst>
+          </p:cNvPr>
+          <p:cNvSpPr/>
           <p:nvPr/>
-        </p:nvPicPr>
-        <p:blipFill>
-          <a:blip r:embed="rId5"/>
-          <a:stretch>
-            <a:fillRect/>
-          </a:stretch>
-        </p:blipFill>
+        </p:nvSpPr>
         <p:spPr>
           <a:xfrm>
-            <a:off x="1895977" y="3295650"/>
-            <a:ext cx="7581900" cy="1587500"/>
-          </a:xfrm>
-          <a:prstGeom prst="rect">
-            <a:avLst/>
-          </a:prstGeom>
-        </p:spPr>
-      </p:pic>
-      <p:pic>
-        <p:nvPicPr>
-          <p:cNvPr id="8" name="Picture 8" descr="https://lh6.googleusercontent.com/YMOKCP1y16XQZ9HRW5tlMFXI4CBNI25trjedysK16l4ZS_7NYx121uE4m5SLho-5EEP-zYjp6gU9mxhwvmW097OlJj22CQp2YNjL56TwN8E3uR3aTLrqZ2uG_5hr8vArglJUhwK-">
-            <a:extLst>
-              <a:ext uri="{FF2B5EF4-FFF2-40B4-BE49-F238E27FC236}">
-                <a16:creationId xmlns:a16="http://schemas.microsoft.com/office/drawing/2014/main" id="{204E6FF5-B72B-094D-9AAA-849F45960BAE}"/>
-              </a:ext>
-            </a:extLst>
-          </p:cNvPr>
-          <p:cNvPicPr>
-            <a:picLocks noChangeAspect="1" noChangeArrowheads="1"/>
-          </p:cNvPicPr>
-          <p:nvPr/>
-        </p:nvPicPr>
-        <p:blipFill>
-          <a:blip r:embed="rId6">
-            <a:extLst>
-              <a:ext uri="{28A0092B-C50C-407E-A947-70E740481C1C}">
-                <a14:useLocalDpi xmlns:a14="http://schemas.microsoft.com/office/drawing/2010/main" val="0"/>
-              </a:ext>
-            </a:extLst>
-          </a:blip>
-          <a:srcRect/>
-          <a:stretch>
-            <a:fillRect/>
-          </a:stretch>
-        </p:blipFill>
-        <p:spPr bwMode="auto">
-          <a:xfrm>
-            <a:off x="5989890" y="1012468"/>
-            <a:ext cx="3524083" cy="1596380"/>
+            <a:off x="2260599" y="1638303"/>
+            <a:ext cx="143933" cy="141810"/>
           </a:xfrm>
           <a:prstGeom prst="rect">
             <a:avLst/>
           </a:prstGeom>
           <a:noFill/>
-          <a:extLst>
-            <a:ext uri="{909E8E84-426E-40DD-AFC4-6F175D3DCCD1}">
-              <a14:hiddenFill xmlns:a14="http://schemas.microsoft.com/office/drawing/2010/main">
+          <a:ln>
+            <a:solidFill>
+              <a:schemeClr val="accent2"/>
+            </a:solidFill>
+          </a:ln>
+        </p:spPr>
+        <p:style>
+          <a:lnRef idx="2">
+            <a:schemeClr val="accent1">
+              <a:shade val="50000"/>
+            </a:schemeClr>
+          </a:lnRef>
+          <a:fillRef idx="1">
+            <a:schemeClr val="accent1"/>
+          </a:fillRef>
+          <a:effectRef idx="0">
+            <a:schemeClr val="accent1"/>
+          </a:effectRef>
+          <a:fontRef idx="minor">
+            <a:schemeClr val="lt1"/>
+          </a:fontRef>
+        </p:style>
+        <p:txBody>
+          <a:bodyPr rtlCol="0" anchor="ctr"/>
+          <a:lstStyle/>
+          <a:p>
+            <a:pPr algn="ctr"/>
+            <a:endParaRPr lang="en-DE"/>
+          </a:p>
+        </p:txBody>
+      </p:sp>
+      <p:sp>
+        <p:nvSpPr>
+          <p:cNvPr id="15" name="TextBox 14">
+            <a:extLst>
+              <a:ext uri="{FF2B5EF4-FFF2-40B4-BE49-F238E27FC236}">
+                <a16:creationId xmlns:a16="http://schemas.microsoft.com/office/drawing/2014/main" id="{ADB52FE6-B690-40FB-915E-0CFF18134944}"/>
+              </a:ext>
+            </a:extLst>
+          </p:cNvPr>
+          <p:cNvSpPr txBox="1"/>
+          <p:nvPr/>
+        </p:nvSpPr>
+        <p:spPr>
+          <a:xfrm>
+            <a:off x="4362169" y="1432210"/>
+            <a:ext cx="316112" cy="276999"/>
+          </a:xfrm>
+          <a:prstGeom prst="rect">
+            <a:avLst/>
+          </a:prstGeom>
+          <a:noFill/>
+        </p:spPr>
+        <p:txBody>
+          <a:bodyPr wrap="none" rtlCol="0">
+            <a:spAutoFit/>
+          </a:bodyPr>
+          <a:lstStyle/>
+          <a:p>
+            <a:r>
+              <a:rPr lang="en-US" sz="1200" i="1" dirty="0">
+                <a:latin typeface="Bell MT" panose="02020503060305020303" pitchFamily="18" charset="0"/>
+                <a:ea typeface="Batang" panose="020B0503020000020004" pitchFamily="18" charset="-127"/>
+              </a:rPr>
+              <a:t>op</a:t>
+            </a:r>
+            <a:endParaRPr lang="en-DE" sz="1200" i="1" dirty="0">
+              <a:latin typeface="Bell MT" panose="02020503060305020303" pitchFamily="18" charset="0"/>
+              <a:ea typeface="Batang" panose="020B0503020000020004" pitchFamily="18" charset="-127"/>
+            </a:endParaRPr>
+          </a:p>
+        </p:txBody>
+      </p:sp>
+      <p:sp>
+        <p:nvSpPr>
+          <p:cNvPr id="26" name="TextBox 25">
+            <a:extLst>
+              <a:ext uri="{FF2B5EF4-FFF2-40B4-BE49-F238E27FC236}">
+                <a16:creationId xmlns:a16="http://schemas.microsoft.com/office/drawing/2014/main" id="{55CF0707-AB10-4446-8031-B9FEFF1FFCC7}"/>
+              </a:ext>
+            </a:extLst>
+          </p:cNvPr>
+          <p:cNvSpPr txBox="1"/>
+          <p:nvPr/>
+        </p:nvSpPr>
+        <p:spPr>
+          <a:xfrm>
+            <a:off x="4482125" y="1846341"/>
+            <a:ext cx="1217775" cy="461665"/>
+          </a:xfrm>
+          <a:prstGeom prst="rect">
+            <a:avLst/>
+          </a:prstGeom>
+          <a:solidFill>
+            <a:schemeClr val="bg1"/>
+          </a:solidFill>
+          <a:ln>
+            <a:solidFill>
+              <a:schemeClr val="tx1"/>
+            </a:solidFill>
+          </a:ln>
+        </p:spPr>
+        <p:txBody>
+          <a:bodyPr wrap="square" rtlCol="0">
+            <a:spAutoFit/>
+          </a:bodyPr>
+          <a:lstStyle/>
+          <a:p>
+            <a:r>
+              <a:rPr lang="en-US" sz="800" i="1" dirty="0">
+                <a:latin typeface="Bell MT" panose="02020503060305020303" pitchFamily="18" charset="0"/>
+                <a:ea typeface="Batang" panose="020B0503020000020004" pitchFamily="18" charset="-127"/>
+              </a:rPr>
+              <a:t>op</a:t>
+            </a:r>
+            <a:r>
+              <a:rPr lang="en-US" sz="800" dirty="0">
+                <a:ea typeface="Batang" panose="020B0503020000020004" pitchFamily="18" charset="-127"/>
+              </a:rPr>
+              <a:t> = max, </a:t>
+            </a:r>
+            <a:r>
+              <a:rPr lang="en-US" sz="800" b="1" i="0" u="none" strike="noStrike" dirty="0">
                 <a:solidFill>
-                  <a:srgbClr val="FFFFFF"/>
+                  <a:schemeClr val="accent6">
+                    <a:lumMod val="75000"/>
+                  </a:schemeClr>
                 </a:solidFill>
-              </a14:hiddenFill>
-            </a:ext>
-          </a:extLst>
+                <a:effectLst/>
+                <a:latin typeface="Courier"/>
+              </a:rPr>
+              <a:t>X</a:t>
+            </a:r>
+            <a:r>
+              <a:rPr lang="en-US" sz="800" dirty="0">
+                <a:ea typeface="Batang" panose="020B0503020000020004" pitchFamily="18" charset="-127"/>
+              </a:rPr>
+              <a:t> = 90</a:t>
+            </a:r>
+          </a:p>
+          <a:p>
+            <a:r>
+              <a:rPr lang="en-US" sz="800" i="1" dirty="0">
+                <a:latin typeface="Bell MT" panose="02020503060305020303" pitchFamily="18" charset="0"/>
+                <a:ea typeface="Batang" panose="020B0503020000020004" pitchFamily="18" charset="-127"/>
+              </a:rPr>
+              <a:t>op</a:t>
+            </a:r>
+            <a:r>
+              <a:rPr lang="en-US" sz="800" dirty="0">
+                <a:ea typeface="Batang" panose="020B0503020000020004" pitchFamily="18" charset="-127"/>
+              </a:rPr>
+              <a:t> = mean, </a:t>
+            </a:r>
+            <a:r>
+              <a:rPr lang="en-US" sz="800" b="1" i="0" u="none" strike="noStrike" dirty="0">
+                <a:solidFill>
+                  <a:schemeClr val="accent6">
+                    <a:lumMod val="75000"/>
+                  </a:schemeClr>
+                </a:solidFill>
+                <a:effectLst/>
+                <a:latin typeface="Courier"/>
+              </a:rPr>
+              <a:t>X</a:t>
+            </a:r>
+            <a:r>
+              <a:rPr lang="en-US" sz="800" dirty="0">
+                <a:ea typeface="Batang" panose="020B0503020000020004" pitchFamily="18" charset="-127"/>
+              </a:rPr>
+              <a:t> = 65.24</a:t>
+            </a:r>
+          </a:p>
+          <a:p>
+            <a:r>
+              <a:rPr lang="en-US" sz="800" i="1" dirty="0">
+                <a:latin typeface="Bell MT" panose="02020503060305020303" pitchFamily="18" charset="0"/>
+                <a:ea typeface="Batang" panose="020B0503020000020004" pitchFamily="18" charset="-127"/>
+              </a:rPr>
+              <a:t>op</a:t>
+            </a:r>
+            <a:r>
+              <a:rPr lang="en-US" sz="800" dirty="0">
+                <a:ea typeface="Batang" panose="020B0503020000020004" pitchFamily="18" charset="-127"/>
+              </a:rPr>
+              <a:t> = variance, </a:t>
+            </a:r>
+            <a:r>
+              <a:rPr lang="en-US" sz="800" b="1" i="0" u="none" strike="noStrike" dirty="0">
+                <a:solidFill>
+                  <a:schemeClr val="accent6">
+                    <a:lumMod val="75000"/>
+                  </a:schemeClr>
+                </a:solidFill>
+                <a:effectLst/>
+                <a:latin typeface="Courier"/>
+              </a:rPr>
+              <a:t>X</a:t>
+            </a:r>
+            <a:r>
+              <a:rPr lang="en-US" sz="800" dirty="0">
+                <a:ea typeface="Batang" panose="020B0503020000020004" pitchFamily="18" charset="-127"/>
+              </a:rPr>
+              <a:t> = 172.60</a:t>
+            </a:r>
+            <a:endParaRPr lang="en-DE" sz="800" dirty="0">
+              <a:ea typeface="Batang" panose="020B0503020000020004" pitchFamily="18" charset="-127"/>
+            </a:endParaRPr>
+          </a:p>
+        </p:txBody>
+      </p:sp>
+      <p:sp>
+        <p:nvSpPr>
+          <p:cNvPr id="5" name="TextBox 4">
+            <a:extLst>
+              <a:ext uri="{FF2B5EF4-FFF2-40B4-BE49-F238E27FC236}">
+                <a16:creationId xmlns:a16="http://schemas.microsoft.com/office/drawing/2014/main" id="{6BDB6583-8D86-4BD2-8572-7E902FB49A1F}"/>
+              </a:ext>
+            </a:extLst>
+          </p:cNvPr>
+          <p:cNvSpPr txBox="1"/>
+          <p:nvPr/>
+        </p:nvSpPr>
+        <p:spPr>
+          <a:xfrm>
+            <a:off x="1526566" y="1121532"/>
+            <a:ext cx="271228" cy="307777"/>
+          </a:xfrm>
+          <a:prstGeom prst="rect">
+            <a:avLst/>
+          </a:prstGeom>
+          <a:noFill/>
         </p:spPr>
-      </p:pic>
+        <p:txBody>
+          <a:bodyPr wrap="none" rtlCol="0">
+            <a:spAutoFit/>
+          </a:bodyPr>
+          <a:lstStyle/>
+          <a:p>
+            <a:r>
+              <a:rPr lang="en-US" sz="1400" dirty="0"/>
+              <a:t>a</a:t>
+            </a:r>
+            <a:endParaRPr lang="en-DE" sz="1400" dirty="0"/>
+          </a:p>
+        </p:txBody>
+      </p:sp>
+      <p:sp>
+        <p:nvSpPr>
+          <p:cNvPr id="33" name="TextBox 32">
+            <a:extLst>
+              <a:ext uri="{FF2B5EF4-FFF2-40B4-BE49-F238E27FC236}">
+                <a16:creationId xmlns:a16="http://schemas.microsoft.com/office/drawing/2014/main" id="{71C11DDD-E4B4-43CC-A440-532A5ED5C263}"/>
+              </a:ext>
+            </a:extLst>
+          </p:cNvPr>
+          <p:cNvSpPr txBox="1"/>
+          <p:nvPr/>
+        </p:nvSpPr>
+        <p:spPr>
+          <a:xfrm>
+            <a:off x="2974341" y="1127648"/>
+            <a:ext cx="306494" cy="307777"/>
+          </a:xfrm>
+          <a:prstGeom prst="rect">
+            <a:avLst/>
+          </a:prstGeom>
+          <a:noFill/>
+        </p:spPr>
+        <p:txBody>
+          <a:bodyPr wrap="square" rtlCol="0">
+            <a:spAutoFit/>
+          </a:bodyPr>
+          <a:lstStyle/>
+          <a:p>
+            <a:r>
+              <a:rPr lang="en-US" sz="1400" dirty="0"/>
+              <a:t>b</a:t>
+            </a:r>
+            <a:endParaRPr lang="en-DE" sz="1400" dirty="0"/>
+          </a:p>
+        </p:txBody>
+      </p:sp>
+      <p:sp>
+        <p:nvSpPr>
+          <p:cNvPr id="35" name="TextBox 34">
+            <a:extLst>
+              <a:ext uri="{FF2B5EF4-FFF2-40B4-BE49-F238E27FC236}">
+                <a16:creationId xmlns:a16="http://schemas.microsoft.com/office/drawing/2014/main" id="{67164D7B-5F5C-4732-84E8-645189C263E6}"/>
+              </a:ext>
+            </a:extLst>
+          </p:cNvPr>
+          <p:cNvSpPr txBox="1"/>
+          <p:nvPr/>
+        </p:nvSpPr>
+        <p:spPr>
+          <a:xfrm>
+            <a:off x="4482125" y="1123230"/>
+            <a:ext cx="260008" cy="307777"/>
+          </a:xfrm>
+          <a:prstGeom prst="rect">
+            <a:avLst/>
+          </a:prstGeom>
+          <a:noFill/>
+        </p:spPr>
+        <p:txBody>
+          <a:bodyPr wrap="none" rtlCol="0">
+            <a:spAutoFit/>
+          </a:bodyPr>
+          <a:lstStyle/>
+          <a:p>
+            <a:r>
+              <a:rPr lang="en-US" sz="1400" dirty="0"/>
+              <a:t>c</a:t>
+            </a:r>
+            <a:endParaRPr lang="en-DE" sz="1400" dirty="0"/>
+          </a:p>
+        </p:txBody>
+      </p:sp>
+      <p:grpSp>
+        <p:nvGrpSpPr>
+          <p:cNvPr id="2" name="Group 1">
+            <a:extLst>
+              <a:ext uri="{FF2B5EF4-FFF2-40B4-BE49-F238E27FC236}">
+                <a16:creationId xmlns:a16="http://schemas.microsoft.com/office/drawing/2014/main" id="{74822C40-2463-4CB6-8A8E-F9A7B2F45742}"/>
+              </a:ext>
+            </a:extLst>
+          </p:cNvPr>
+          <p:cNvGrpSpPr/>
+          <p:nvPr/>
+        </p:nvGrpSpPr>
+        <p:grpSpPr>
+          <a:xfrm>
+            <a:off x="1528154" y="2561558"/>
+            <a:ext cx="4389129" cy="2097128"/>
+            <a:chOff x="1569822" y="2967958"/>
+            <a:chExt cx="4389129" cy="2097128"/>
+          </a:xfrm>
+        </p:grpSpPr>
+        <p:grpSp>
+          <p:nvGrpSpPr>
+            <p:cNvPr id="8" name="Group 7">
+              <a:extLst>
+                <a:ext uri="{FF2B5EF4-FFF2-40B4-BE49-F238E27FC236}">
+                  <a16:creationId xmlns:a16="http://schemas.microsoft.com/office/drawing/2014/main" id="{28E2851A-CAA3-44E6-B917-D28329098FDF}"/>
+                </a:ext>
+              </a:extLst>
+            </p:cNvPr>
+            <p:cNvGrpSpPr/>
+            <p:nvPr/>
+          </p:nvGrpSpPr>
+          <p:grpSpPr>
+            <a:xfrm>
+              <a:off x="1773283" y="3032444"/>
+              <a:ext cx="4185668" cy="2032642"/>
+              <a:chOff x="1773283" y="3032444"/>
+              <a:chExt cx="4185668" cy="2032642"/>
+            </a:xfrm>
+          </p:grpSpPr>
+          <p:pic>
+            <p:nvPicPr>
+              <p:cNvPr id="19" name="Picture 4" descr="https://lh4.googleusercontent.com/9pWurBawAwNNlPMPQTegROoQUDLMfrHTqBPovSBiY2_xjTBkfPYA-riGF8Svi9AN3PkcC-BdPQfTScNEZg6D7cYmkuL0uXX_73Au56NjmDo0YUq_mG84YVt9TB01Hb0fNHkgRlit">
+                <a:extLst>
+                  <a:ext uri="{FF2B5EF4-FFF2-40B4-BE49-F238E27FC236}">
+                    <a16:creationId xmlns:a16="http://schemas.microsoft.com/office/drawing/2014/main" id="{ECCF762F-6153-47C6-AAFF-D4C13D2D4DB7}"/>
+                  </a:ext>
+                </a:extLst>
+              </p:cNvPr>
+              <p:cNvPicPr>
+                <a:picLocks noChangeAspect="1" noChangeArrowheads="1"/>
+              </p:cNvPicPr>
+              <p:nvPr/>
+            </p:nvPicPr>
+            <p:blipFill>
+              <a:blip r:embed="rId3">
+                <a:extLst>
+                  <a:ext uri="{28A0092B-C50C-407E-A947-70E740481C1C}">
+                    <a14:useLocalDpi xmlns:a14="http://schemas.microsoft.com/office/drawing/2010/main" val="0"/>
+                  </a:ext>
+                </a:extLst>
+              </a:blip>
+              <a:srcRect/>
+              <a:stretch>
+                <a:fillRect/>
+              </a:stretch>
+            </p:blipFill>
+            <p:spPr bwMode="auto">
+              <a:xfrm>
+                <a:off x="1773283" y="3032444"/>
+                <a:ext cx="1971749" cy="994294"/>
+              </a:xfrm>
+              <a:prstGeom prst="rect">
+                <a:avLst/>
+              </a:prstGeom>
+              <a:noFill/>
+              <a:extLst>
+                <a:ext uri="{909E8E84-426E-40DD-AFC4-6F175D3DCCD1}">
+                  <a14:hiddenFill xmlns:a14="http://schemas.microsoft.com/office/drawing/2010/main">
+                    <a:solidFill>
+                      <a:srgbClr val="FFFFFF"/>
+                    </a:solidFill>
+                  </a14:hiddenFill>
+                </a:ext>
+              </a:extLst>
+            </p:spPr>
+          </p:pic>
+          <p:pic>
+            <p:nvPicPr>
+              <p:cNvPr id="24" name="Picture 10" descr="https://lh4.googleusercontent.com/2zq8Mbs_-v6c4oIxhz3zZeH9bDS6IN9iFZ97polk2GwAsJ8cWtIQuY92cI33d82BuMIyzWmMI7n9KuvI2FvX81_D-ibhGSMAMm9i7soKSGCZDKBlITNK8wjFBmNhv7ZI-C7aUntg">
+                <a:extLst>
+                  <a:ext uri="{FF2B5EF4-FFF2-40B4-BE49-F238E27FC236}">
+                    <a16:creationId xmlns:a16="http://schemas.microsoft.com/office/drawing/2014/main" id="{4B78DDE6-9DF6-4273-A482-7754E6B33795}"/>
+                  </a:ext>
+                </a:extLst>
+              </p:cNvPr>
+              <p:cNvPicPr>
+                <a:picLocks noChangeAspect="1" noChangeArrowheads="1"/>
+              </p:cNvPicPr>
+              <p:nvPr/>
+            </p:nvPicPr>
+            <p:blipFill>
+              <a:blip r:embed="rId4">
+                <a:extLst>
+                  <a:ext uri="{28A0092B-C50C-407E-A947-70E740481C1C}">
+                    <a14:useLocalDpi xmlns:a14="http://schemas.microsoft.com/office/drawing/2010/main" val="0"/>
+                  </a:ext>
+                </a:extLst>
+              </a:blip>
+              <a:srcRect/>
+              <a:stretch>
+                <a:fillRect/>
+              </a:stretch>
+            </p:blipFill>
+            <p:spPr bwMode="auto">
+              <a:xfrm>
+                <a:off x="1773283" y="4067527"/>
+                <a:ext cx="1955785" cy="956049"/>
+              </a:xfrm>
+              <a:prstGeom prst="rect">
+                <a:avLst/>
+              </a:prstGeom>
+              <a:noFill/>
+              <a:extLst>
+                <a:ext uri="{909E8E84-426E-40DD-AFC4-6F175D3DCCD1}">
+                  <a14:hiddenFill xmlns:a14="http://schemas.microsoft.com/office/drawing/2010/main">
+                    <a:solidFill>
+                      <a:srgbClr val="FFFFFF"/>
+                    </a:solidFill>
+                  </a14:hiddenFill>
+                </a:ext>
+              </a:extLst>
+            </p:spPr>
+          </p:pic>
+          <p:pic>
+            <p:nvPicPr>
+              <p:cNvPr id="25" name="Picture 12" descr="https://lh6.googleusercontent.com/M1CGm8y4JM7WYvCku1zowPPhx5tpxaPemANcWJlBIxQBzFzC1M2L-OJ1R2AVTkMW1n30XbGfI6-xfZKLxLx41TG__MtouOjcnwlQm57CoWlQA-bC1zlhWbXVrZxt1yDSlNAqq51q">
+                <a:extLst>
+                  <a:ext uri="{FF2B5EF4-FFF2-40B4-BE49-F238E27FC236}">
+                    <a16:creationId xmlns:a16="http://schemas.microsoft.com/office/drawing/2014/main" id="{5C56F040-BD7F-4A69-A6E8-D84F18500865}"/>
+                  </a:ext>
+                </a:extLst>
+              </p:cNvPr>
+              <p:cNvPicPr>
+                <a:picLocks noChangeAspect="1" noChangeArrowheads="1"/>
+              </p:cNvPicPr>
+              <p:nvPr/>
+            </p:nvPicPr>
+            <p:blipFill rotWithShape="1">
+              <a:blip r:embed="rId5">
+                <a:extLst>
+                  <a:ext uri="{28A0092B-C50C-407E-A947-70E740481C1C}">
+                    <a14:useLocalDpi xmlns:a14="http://schemas.microsoft.com/office/drawing/2010/main" val="0"/>
+                  </a:ext>
+                </a:extLst>
+              </a:blip>
+              <a:srcRect/>
+              <a:stretch/>
+            </p:blipFill>
+            <p:spPr bwMode="auto">
+              <a:xfrm>
+                <a:off x="3923198" y="4026739"/>
+                <a:ext cx="2035753" cy="1038347"/>
+              </a:xfrm>
+              <a:prstGeom prst="rect">
+                <a:avLst/>
+              </a:prstGeom>
+              <a:noFill/>
+              <a:extLst>
+                <a:ext uri="{909E8E84-426E-40DD-AFC4-6F175D3DCCD1}">
+                  <a14:hiddenFill xmlns:a14="http://schemas.microsoft.com/office/drawing/2010/main">
+                    <a:solidFill>
+                      <a:srgbClr val="FFFFFF"/>
+                    </a:solidFill>
+                  </a14:hiddenFill>
+                </a:ext>
+              </a:extLst>
+            </p:spPr>
+          </p:pic>
+        </p:grpSp>
+        <p:grpSp>
+          <p:nvGrpSpPr>
+            <p:cNvPr id="11" name="Group 10">
+              <a:extLst>
+                <a:ext uri="{FF2B5EF4-FFF2-40B4-BE49-F238E27FC236}">
+                  <a16:creationId xmlns:a16="http://schemas.microsoft.com/office/drawing/2014/main" id="{00AE1284-14F9-43D6-AA2F-ECADDF71EEE6}"/>
+                </a:ext>
+              </a:extLst>
+            </p:cNvPr>
+            <p:cNvGrpSpPr/>
+            <p:nvPr/>
+          </p:nvGrpSpPr>
+          <p:grpSpPr>
+            <a:xfrm>
+              <a:off x="3923198" y="2967958"/>
+              <a:ext cx="1996182" cy="1025743"/>
+              <a:chOff x="3923198" y="2967958"/>
+              <a:chExt cx="1996182" cy="1025743"/>
+            </a:xfrm>
+          </p:grpSpPr>
+          <p:pic>
+            <p:nvPicPr>
+              <p:cNvPr id="30" name="Picture 6" descr="https://lh5.googleusercontent.com/E6Kz826YFbCpYWle0WdY0ICP_3W5YlmSch2AAh4lsjKoXW1GTHxNZjKn3b-S-CofEny3-aMVMGTFDkHhEZokUM1E3D5GnsKD79EYNlsobh1tQfP97eUFxaOaTa7qNbD2Cf6N6EnK">
+                <a:extLst>
+                  <a:ext uri="{FF2B5EF4-FFF2-40B4-BE49-F238E27FC236}">
+                    <a16:creationId xmlns:a16="http://schemas.microsoft.com/office/drawing/2014/main" id="{5960D57C-71B8-4B37-BEB5-88467D9655F6}"/>
+                  </a:ext>
+                </a:extLst>
+              </p:cNvPr>
+              <p:cNvPicPr>
+                <a:picLocks noChangeAspect="1" noChangeArrowheads="1"/>
+              </p:cNvPicPr>
+              <p:nvPr/>
+            </p:nvPicPr>
+            <p:blipFill>
+              <a:blip r:embed="rId6">
+                <a:extLst>
+                  <a:ext uri="{28A0092B-C50C-407E-A947-70E740481C1C}">
+                    <a14:useLocalDpi xmlns:a14="http://schemas.microsoft.com/office/drawing/2010/main" val="0"/>
+                  </a:ext>
+                </a:extLst>
+              </a:blip>
+              <a:srcRect/>
+              <a:stretch>
+                <a:fillRect/>
+              </a:stretch>
+            </p:blipFill>
+            <p:spPr bwMode="auto">
+              <a:xfrm>
+                <a:off x="3965836" y="2999408"/>
+                <a:ext cx="1953544" cy="994293"/>
+              </a:xfrm>
+              <a:prstGeom prst="rect">
+                <a:avLst/>
+              </a:prstGeom>
+              <a:noFill/>
+              <a:extLst>
+                <a:ext uri="{909E8E84-426E-40DD-AFC4-6F175D3DCCD1}">
+                  <a14:hiddenFill xmlns:a14="http://schemas.microsoft.com/office/drawing/2010/main">
+                    <a:solidFill>
+                      <a:srgbClr val="FFFFFF"/>
+                    </a:solidFill>
+                  </a14:hiddenFill>
+                </a:ext>
+              </a:extLst>
+            </p:spPr>
+          </p:pic>
+          <p:sp>
+            <p:nvSpPr>
+              <p:cNvPr id="31" name="Rectangle 30">
+                <a:extLst>
+                  <a:ext uri="{FF2B5EF4-FFF2-40B4-BE49-F238E27FC236}">
+                    <a16:creationId xmlns:a16="http://schemas.microsoft.com/office/drawing/2014/main" id="{FF7CA060-8877-4968-846E-D15AFC88D4CE}"/>
+                  </a:ext>
+                </a:extLst>
+              </p:cNvPr>
+              <p:cNvSpPr/>
+              <p:nvPr/>
+            </p:nvSpPr>
+            <p:spPr>
+              <a:xfrm>
+                <a:off x="3923198" y="2967958"/>
+                <a:ext cx="292863" cy="314161"/>
+              </a:xfrm>
+              <a:prstGeom prst="rect">
+                <a:avLst/>
+              </a:prstGeom>
+              <a:noFill/>
+              <a:ln>
+                <a:prstDash val="sysDot"/>
+              </a:ln>
+            </p:spPr>
+            <p:style>
+              <a:lnRef idx="2">
+                <a:schemeClr val="accent1">
+                  <a:shade val="50000"/>
+                </a:schemeClr>
+              </a:lnRef>
+              <a:fillRef idx="1">
+                <a:schemeClr val="accent1"/>
+              </a:fillRef>
+              <a:effectRef idx="0">
+                <a:schemeClr val="accent1"/>
+              </a:effectRef>
+              <a:fontRef idx="minor">
+                <a:schemeClr val="lt1"/>
+              </a:fontRef>
+            </p:style>
+            <p:txBody>
+              <a:bodyPr rtlCol="0" anchor="ctr"/>
+              <a:lstStyle/>
+              <a:p>
+                <a:pPr algn="ctr"/>
+                <a:endParaRPr lang="en-DE"/>
+              </a:p>
+            </p:txBody>
+          </p:sp>
+        </p:grpSp>
+        <p:sp>
+          <p:nvSpPr>
+            <p:cNvPr id="36" name="TextBox 35">
+              <a:extLst>
+                <a:ext uri="{FF2B5EF4-FFF2-40B4-BE49-F238E27FC236}">
+                  <a16:creationId xmlns:a16="http://schemas.microsoft.com/office/drawing/2014/main" id="{2075293B-7859-4306-9660-047AD768B1EE}"/>
+                </a:ext>
+              </a:extLst>
+            </p:cNvPr>
+            <p:cNvSpPr txBox="1"/>
+            <p:nvPr/>
+          </p:nvSpPr>
+          <p:spPr>
+            <a:xfrm>
+              <a:off x="1569822" y="3079924"/>
+              <a:ext cx="279244" cy="307777"/>
+            </a:xfrm>
+            <a:prstGeom prst="rect">
+              <a:avLst/>
+            </a:prstGeom>
+            <a:noFill/>
+          </p:spPr>
+          <p:txBody>
+            <a:bodyPr wrap="none" rtlCol="0">
+              <a:spAutoFit/>
+            </a:bodyPr>
+            <a:lstStyle/>
+            <a:p>
+              <a:r>
+                <a:rPr lang="en-US" sz="1400" dirty="0"/>
+                <a:t>d</a:t>
+              </a:r>
+              <a:endParaRPr lang="en-DE" sz="1400" dirty="0"/>
+            </a:p>
+          </p:txBody>
+        </p:sp>
+      </p:grpSp>
+      <p:sp>
+        <p:nvSpPr>
+          <p:cNvPr id="6" name="Rectangle 5">
+            <a:extLst>
+              <a:ext uri="{FF2B5EF4-FFF2-40B4-BE49-F238E27FC236}">
+                <a16:creationId xmlns:a16="http://schemas.microsoft.com/office/drawing/2014/main" id="{E57DBAE2-4C00-4043-8BE1-F56801EE5087}"/>
+              </a:ext>
+            </a:extLst>
+          </p:cNvPr>
+          <p:cNvSpPr/>
+          <p:nvPr/>
+        </p:nvSpPr>
+        <p:spPr>
+          <a:xfrm>
+            <a:off x="1940269" y="1333501"/>
+            <a:ext cx="780094" cy="742950"/>
+          </a:xfrm>
+          <a:prstGeom prst="rect">
+            <a:avLst/>
+          </a:prstGeom>
+          <a:noFill/>
+          <a:ln w="25400">
+            <a:solidFill>
+              <a:srgbClr val="92D050"/>
+            </a:solidFill>
+          </a:ln>
+        </p:spPr>
+        <p:style>
+          <a:lnRef idx="2">
+            <a:schemeClr val="accent1">
+              <a:shade val="50000"/>
+            </a:schemeClr>
+          </a:lnRef>
+          <a:fillRef idx="1">
+            <a:schemeClr val="accent1"/>
+          </a:fillRef>
+          <a:effectRef idx="0">
+            <a:schemeClr val="accent1"/>
+          </a:effectRef>
+          <a:fontRef idx="minor">
+            <a:schemeClr val="lt1"/>
+          </a:fontRef>
+        </p:style>
+        <p:txBody>
+          <a:bodyPr rtlCol="0" anchor="ctr"/>
+          <a:lstStyle/>
+          <a:p>
+            <a:pPr algn="ctr"/>
+            <a:endParaRPr lang="en-DE"/>
+          </a:p>
+        </p:txBody>
+      </p:sp>
     </p:spTree>
     <p:extLst>
       <p:ext uri="{BB962C8B-B14F-4D97-AF65-F5344CB8AC3E}">

</xml_diff>